<commit_message>
Finished the Presentation of Fase 4
</commit_message>
<xml_diff>
--- a/Editables/Fase 4 - Implementação.pptx
+++ b/Editables/Fase 4 - Implementação.pptx
@@ -5,24 +5,25 @@
     <p:sldMasterId id="2147483708" r:id="rId4"/>
   </p:sldMasterIdLst>
   <p:notesMasterIdLst>
-    <p:notesMasterId r:id="rId17"/>
+    <p:notesMasterId r:id="rId18"/>
   </p:notesMasterIdLst>
   <p:handoutMasterIdLst>
-    <p:handoutMasterId r:id="rId18"/>
+    <p:handoutMasterId r:id="rId19"/>
   </p:handoutMasterIdLst>
   <p:sldIdLst>
     <p:sldId id="256" r:id="rId5"/>
     <p:sldId id="279" r:id="rId6"/>
     <p:sldId id="272" r:id="rId7"/>
-    <p:sldId id="287" r:id="rId8"/>
-    <p:sldId id="280" r:id="rId9"/>
-    <p:sldId id="282" r:id="rId10"/>
-    <p:sldId id="281" r:id="rId11"/>
-    <p:sldId id="277" r:id="rId12"/>
-    <p:sldId id="284" r:id="rId13"/>
+    <p:sldId id="280" r:id="rId8"/>
+    <p:sldId id="287" r:id="rId9"/>
+    <p:sldId id="289" r:id="rId10"/>
+    <p:sldId id="290" r:id="rId11"/>
+    <p:sldId id="291" r:id="rId12"/>
+    <p:sldId id="281" r:id="rId13"/>
     <p:sldId id="286" r:id="rId14"/>
-    <p:sldId id="288" r:id="rId15"/>
-    <p:sldId id="267" r:id="rId16"/>
+    <p:sldId id="292" r:id="rId15"/>
+    <p:sldId id="288" r:id="rId16"/>
+    <p:sldId id="267" r:id="rId17"/>
   </p:sldIdLst>
   <p:sldSz cx="12192000" cy="6858000"/>
   <p:notesSz cx="6858000" cy="9144000"/>
@@ -146,7 +147,7 @@
 <file path=ppt/revisionInfo.xml><?xml version="1.0" encoding="utf-8"?>
 <p1510:revInfo xmlns:a="http://schemas.openxmlformats.org/drawingml/2006/main" xmlns:r="http://schemas.openxmlformats.org/officeDocument/2006/relationships" xmlns:p1510="http://schemas.microsoft.com/office/powerpoint/2015/10/main">
   <p1510:revLst>
-    <p1510:client id="{E6087568-9E66-4C67-8420-88369500C5DA}" v="306" dt="2023-05-17T18:33:46.986"/>
+    <p1510:client id="{7F501EE3-BA3E-4F2E-8F95-0FA7922C07FC}" v="4" dt="2023-05-31T12:08:43.604"/>
   </p1510:revLst>
 </p1510:revInfo>
 </file>
@@ -1717,6 +1718,296 @@
       </pc:sldChg>
     </pc:docChg>
   </pc:docChgLst>
+  <pc:docChgLst>
+    <pc:chgData name="Tiago Fonseca" userId="0bf00240-3020-4d01-a24b-06825a2f49d7" providerId="ADAL" clId="{7F501EE3-BA3E-4F2E-8F95-0FA7922C07FC}"/>
+    <pc:docChg chg="undo custSel addSld delSld modSld sldOrd">
+      <pc:chgData name="Tiago Fonseca" userId="0bf00240-3020-4d01-a24b-06825a2f49d7" providerId="ADAL" clId="{7F501EE3-BA3E-4F2E-8F95-0FA7922C07FC}" dt="2023-05-31T12:12:02.691" v="388"/>
+      <pc:docMkLst>
+        <pc:docMk/>
+      </pc:docMkLst>
+      <pc:sldChg chg="modSp mod">
+        <pc:chgData name="Tiago Fonseca" userId="0bf00240-3020-4d01-a24b-06825a2f49d7" providerId="ADAL" clId="{7F501EE3-BA3E-4F2E-8F95-0FA7922C07FC}" dt="2023-05-31T12:03:16.827" v="24" actId="20577"/>
+        <pc:sldMkLst>
+          <pc:docMk/>
+          <pc:sldMk cId="300101176" sldId="256"/>
+        </pc:sldMkLst>
+        <pc:spChg chg="mod">
+          <ac:chgData name="Tiago Fonseca" userId="0bf00240-3020-4d01-a24b-06825a2f49d7" providerId="ADAL" clId="{7F501EE3-BA3E-4F2E-8F95-0FA7922C07FC}" dt="2023-05-31T12:03:16.827" v="24" actId="20577"/>
+          <ac:spMkLst>
+            <pc:docMk/>
+            <pc:sldMk cId="300101176" sldId="256"/>
+            <ac:spMk id="3" creationId="{1D090625-51CE-4ECB-81A4-C4905F3FBFE9}"/>
+          </ac:spMkLst>
+        </pc:spChg>
+      </pc:sldChg>
+      <pc:sldChg chg="modSp mod">
+        <pc:chgData name="Tiago Fonseca" userId="0bf00240-3020-4d01-a24b-06825a2f49d7" providerId="ADAL" clId="{7F501EE3-BA3E-4F2E-8F95-0FA7922C07FC}" dt="2023-05-31T12:04:17.140" v="101" actId="20577"/>
+        <pc:sldMkLst>
+          <pc:docMk/>
+          <pc:sldMk cId="3065993080" sldId="272"/>
+        </pc:sldMkLst>
+        <pc:spChg chg="mod">
+          <ac:chgData name="Tiago Fonseca" userId="0bf00240-3020-4d01-a24b-06825a2f49d7" providerId="ADAL" clId="{7F501EE3-BA3E-4F2E-8F95-0FA7922C07FC}" dt="2023-05-31T12:03:39.018" v="84" actId="20577"/>
+          <ac:spMkLst>
+            <pc:docMk/>
+            <pc:sldMk cId="3065993080" sldId="272"/>
+            <ac:spMk id="2" creationId="{98A32DE6-6B29-7489-635B-950DAAB3B577}"/>
+          </ac:spMkLst>
+        </pc:spChg>
+        <pc:spChg chg="mod">
+          <ac:chgData name="Tiago Fonseca" userId="0bf00240-3020-4d01-a24b-06825a2f49d7" providerId="ADAL" clId="{7F501EE3-BA3E-4F2E-8F95-0FA7922C07FC}" dt="2023-05-31T12:04:17.140" v="101" actId="20577"/>
+          <ac:spMkLst>
+            <pc:docMk/>
+            <pc:sldMk cId="3065993080" sldId="272"/>
+            <ac:spMk id="7" creationId="{4CDF2A1F-BDE4-7ECC-7CEB-42822AAE7A2D}"/>
+          </ac:spMkLst>
+        </pc:spChg>
+      </pc:sldChg>
+      <pc:sldChg chg="del">
+        <pc:chgData name="Tiago Fonseca" userId="0bf00240-3020-4d01-a24b-06825a2f49d7" providerId="ADAL" clId="{7F501EE3-BA3E-4F2E-8F95-0FA7922C07FC}" dt="2023-05-31T12:10:19.904" v="320" actId="47"/>
+        <pc:sldMkLst>
+          <pc:docMk/>
+          <pc:sldMk cId="1489756019" sldId="277"/>
+        </pc:sldMkLst>
+      </pc:sldChg>
+      <pc:sldChg chg="modSp mod">
+        <pc:chgData name="Tiago Fonseca" userId="0bf00240-3020-4d01-a24b-06825a2f49d7" providerId="ADAL" clId="{7F501EE3-BA3E-4F2E-8F95-0FA7922C07FC}" dt="2023-05-31T12:03:29.301" v="53" actId="20577"/>
+        <pc:sldMkLst>
+          <pc:docMk/>
+          <pc:sldMk cId="996926825" sldId="279"/>
+        </pc:sldMkLst>
+        <pc:spChg chg="mod">
+          <ac:chgData name="Tiago Fonseca" userId="0bf00240-3020-4d01-a24b-06825a2f49d7" providerId="ADAL" clId="{7F501EE3-BA3E-4F2E-8F95-0FA7922C07FC}" dt="2023-05-31T12:03:29.301" v="53" actId="20577"/>
+          <ac:spMkLst>
+            <pc:docMk/>
+            <pc:sldMk cId="996926825" sldId="279"/>
+            <ac:spMk id="2" creationId="{E734342C-2173-4B23-9C3C-2950C6A3983D}"/>
+          </ac:spMkLst>
+        </pc:spChg>
+      </pc:sldChg>
+      <pc:sldChg chg="modSp mod">
+        <pc:chgData name="Tiago Fonseca" userId="0bf00240-3020-4d01-a24b-06825a2f49d7" providerId="ADAL" clId="{7F501EE3-BA3E-4F2E-8F95-0FA7922C07FC}" dt="2023-05-31T12:04:44.606" v="117" actId="20577"/>
+        <pc:sldMkLst>
+          <pc:docMk/>
+          <pc:sldMk cId="825530817" sldId="280"/>
+        </pc:sldMkLst>
+        <pc:spChg chg="mod">
+          <ac:chgData name="Tiago Fonseca" userId="0bf00240-3020-4d01-a24b-06825a2f49d7" providerId="ADAL" clId="{7F501EE3-BA3E-4F2E-8F95-0FA7922C07FC}" dt="2023-05-31T12:04:44.606" v="117" actId="20577"/>
+          <ac:spMkLst>
+            <pc:docMk/>
+            <pc:sldMk cId="825530817" sldId="280"/>
+            <ac:spMk id="2" creationId="{E734342C-2173-4B23-9C3C-2950C6A3983D}"/>
+          </ac:spMkLst>
+        </pc:spChg>
+      </pc:sldChg>
+      <pc:sldChg chg="modSp mod">
+        <pc:chgData name="Tiago Fonseca" userId="0bf00240-3020-4d01-a24b-06825a2f49d7" providerId="ADAL" clId="{7F501EE3-BA3E-4F2E-8F95-0FA7922C07FC}" dt="2023-05-31T12:10:16.280" v="319" actId="20577"/>
+        <pc:sldMkLst>
+          <pc:docMk/>
+          <pc:sldMk cId="1850968765" sldId="281"/>
+        </pc:sldMkLst>
+        <pc:spChg chg="mod">
+          <ac:chgData name="Tiago Fonseca" userId="0bf00240-3020-4d01-a24b-06825a2f49d7" providerId="ADAL" clId="{7F501EE3-BA3E-4F2E-8F95-0FA7922C07FC}" dt="2023-05-31T12:10:16.280" v="319" actId="20577"/>
+          <ac:spMkLst>
+            <pc:docMk/>
+            <pc:sldMk cId="1850968765" sldId="281"/>
+            <ac:spMk id="2" creationId="{E734342C-2173-4B23-9C3C-2950C6A3983D}"/>
+          </ac:spMkLst>
+        </pc:spChg>
+      </pc:sldChg>
+      <pc:sldChg chg="del">
+        <pc:chgData name="Tiago Fonseca" userId="0bf00240-3020-4d01-a24b-06825a2f49d7" providerId="ADAL" clId="{7F501EE3-BA3E-4F2E-8F95-0FA7922C07FC}" dt="2023-05-31T12:09:49.820" v="271" actId="47"/>
+        <pc:sldMkLst>
+          <pc:docMk/>
+          <pc:sldMk cId="2855269777" sldId="282"/>
+        </pc:sldMkLst>
+      </pc:sldChg>
+      <pc:sldChg chg="del">
+        <pc:chgData name="Tiago Fonseca" userId="0bf00240-3020-4d01-a24b-06825a2f49d7" providerId="ADAL" clId="{7F501EE3-BA3E-4F2E-8F95-0FA7922C07FC}" dt="2023-05-31T12:10:20.591" v="321" actId="47"/>
+        <pc:sldMkLst>
+          <pc:docMk/>
+          <pc:sldMk cId="1498194460" sldId="284"/>
+        </pc:sldMkLst>
+      </pc:sldChg>
+      <pc:sldChg chg="modSp mod">
+        <pc:chgData name="Tiago Fonseca" userId="0bf00240-3020-4d01-a24b-06825a2f49d7" providerId="ADAL" clId="{7F501EE3-BA3E-4F2E-8F95-0FA7922C07FC}" dt="2023-05-31T12:10:56.538" v="350"/>
+        <pc:sldMkLst>
+          <pc:docMk/>
+          <pc:sldMk cId="4239780882" sldId="286"/>
+        </pc:sldMkLst>
+        <pc:spChg chg="mod">
+          <ac:chgData name="Tiago Fonseca" userId="0bf00240-3020-4d01-a24b-06825a2f49d7" providerId="ADAL" clId="{7F501EE3-BA3E-4F2E-8F95-0FA7922C07FC}" dt="2023-05-31T12:10:30.839" v="344" actId="20577"/>
+          <ac:spMkLst>
+            <pc:docMk/>
+            <pc:sldMk cId="4239780882" sldId="286"/>
+            <ac:spMk id="2" creationId="{931451AD-4895-B705-D9DD-AE4EECD87102}"/>
+          </ac:spMkLst>
+        </pc:spChg>
+        <pc:spChg chg="mod">
+          <ac:chgData name="Tiago Fonseca" userId="0bf00240-3020-4d01-a24b-06825a2f49d7" providerId="ADAL" clId="{7F501EE3-BA3E-4F2E-8F95-0FA7922C07FC}" dt="2023-05-31T12:10:56.538" v="350"/>
+          <ac:spMkLst>
+            <pc:docMk/>
+            <pc:sldMk cId="4239780882" sldId="286"/>
+            <ac:spMk id="7" creationId="{3781BB72-06CF-6EC3-7E08-64DE68C0CE29}"/>
+          </ac:spMkLst>
+        </pc:spChg>
+      </pc:sldChg>
+      <pc:sldChg chg="modSp mod ord">
+        <pc:chgData name="Tiago Fonseca" userId="0bf00240-3020-4d01-a24b-06825a2f49d7" providerId="ADAL" clId="{7F501EE3-BA3E-4F2E-8F95-0FA7922C07FC}" dt="2023-05-31T12:05:45.622" v="165" actId="20577"/>
+        <pc:sldMkLst>
+          <pc:docMk/>
+          <pc:sldMk cId="831434331" sldId="287"/>
+        </pc:sldMkLst>
+        <pc:spChg chg="mod">
+          <ac:chgData name="Tiago Fonseca" userId="0bf00240-3020-4d01-a24b-06825a2f49d7" providerId="ADAL" clId="{7F501EE3-BA3E-4F2E-8F95-0FA7922C07FC}" dt="2023-05-31T12:04:58.901" v="154" actId="20577"/>
+          <ac:spMkLst>
+            <pc:docMk/>
+            <pc:sldMk cId="831434331" sldId="287"/>
+            <ac:spMk id="2" creationId="{98A32DE6-6B29-7489-635B-950DAAB3B577}"/>
+          </ac:spMkLst>
+        </pc:spChg>
+        <pc:spChg chg="mod">
+          <ac:chgData name="Tiago Fonseca" userId="0bf00240-3020-4d01-a24b-06825a2f49d7" providerId="ADAL" clId="{7F501EE3-BA3E-4F2E-8F95-0FA7922C07FC}" dt="2023-05-31T12:05:45.622" v="165" actId="20577"/>
+          <ac:spMkLst>
+            <pc:docMk/>
+            <pc:sldMk cId="831434331" sldId="287"/>
+            <ac:spMk id="7" creationId="{4CDF2A1F-BDE4-7ECC-7CEB-42822AAE7A2D}"/>
+          </ac:spMkLst>
+        </pc:spChg>
+      </pc:sldChg>
+      <pc:sldChg chg="modSp mod">
+        <pc:chgData name="Tiago Fonseca" userId="0bf00240-3020-4d01-a24b-06825a2f49d7" providerId="ADAL" clId="{7F501EE3-BA3E-4F2E-8F95-0FA7922C07FC}" dt="2023-05-31T12:12:02.691" v="388"/>
+        <pc:sldMkLst>
+          <pc:docMk/>
+          <pc:sldMk cId="2100602676" sldId="288"/>
+        </pc:sldMkLst>
+        <pc:spChg chg="mod">
+          <ac:chgData name="Tiago Fonseca" userId="0bf00240-3020-4d01-a24b-06825a2f49d7" providerId="ADAL" clId="{7F501EE3-BA3E-4F2E-8F95-0FA7922C07FC}" dt="2023-05-31T12:11:39.574" v="377" actId="20577"/>
+          <ac:spMkLst>
+            <pc:docMk/>
+            <pc:sldMk cId="2100602676" sldId="288"/>
+            <ac:spMk id="2" creationId="{931451AD-4895-B705-D9DD-AE4EECD87102}"/>
+          </ac:spMkLst>
+        </pc:spChg>
+        <pc:spChg chg="mod">
+          <ac:chgData name="Tiago Fonseca" userId="0bf00240-3020-4d01-a24b-06825a2f49d7" providerId="ADAL" clId="{7F501EE3-BA3E-4F2E-8F95-0FA7922C07FC}" dt="2023-05-31T12:12:02.691" v="388"/>
+          <ac:spMkLst>
+            <pc:docMk/>
+            <pc:sldMk cId="2100602676" sldId="288"/>
+            <ac:spMk id="7" creationId="{3781BB72-06CF-6EC3-7E08-64DE68C0CE29}"/>
+          </ac:spMkLst>
+        </pc:spChg>
+      </pc:sldChg>
+      <pc:sldChg chg="modSp add mod">
+        <pc:chgData name="Tiago Fonseca" userId="0bf00240-3020-4d01-a24b-06825a2f49d7" providerId="ADAL" clId="{7F501EE3-BA3E-4F2E-8F95-0FA7922C07FC}" dt="2023-05-31T12:06:29.333" v="198"/>
+        <pc:sldMkLst>
+          <pc:docMk/>
+          <pc:sldMk cId="1519722166" sldId="289"/>
+        </pc:sldMkLst>
+        <pc:spChg chg="mod">
+          <ac:chgData name="Tiago Fonseca" userId="0bf00240-3020-4d01-a24b-06825a2f49d7" providerId="ADAL" clId="{7F501EE3-BA3E-4F2E-8F95-0FA7922C07FC}" dt="2023-05-31T12:06:02.281" v="183" actId="20577"/>
+          <ac:spMkLst>
+            <pc:docMk/>
+            <pc:sldMk cId="1519722166" sldId="289"/>
+            <ac:spMk id="2" creationId="{98A32DE6-6B29-7489-635B-950DAAB3B577}"/>
+          </ac:spMkLst>
+        </pc:spChg>
+        <pc:spChg chg="mod">
+          <ac:chgData name="Tiago Fonseca" userId="0bf00240-3020-4d01-a24b-06825a2f49d7" providerId="ADAL" clId="{7F501EE3-BA3E-4F2E-8F95-0FA7922C07FC}" dt="2023-05-31T12:06:29.333" v="198"/>
+          <ac:spMkLst>
+            <pc:docMk/>
+            <pc:sldMk cId="1519722166" sldId="289"/>
+            <ac:spMk id="7" creationId="{4CDF2A1F-BDE4-7ECC-7CEB-42822AAE7A2D}"/>
+          </ac:spMkLst>
+        </pc:spChg>
+      </pc:sldChg>
+      <pc:sldChg chg="modSp add mod">
+        <pc:chgData name="Tiago Fonseca" userId="0bf00240-3020-4d01-a24b-06825a2f49d7" providerId="ADAL" clId="{7F501EE3-BA3E-4F2E-8F95-0FA7922C07FC}" dt="2023-05-31T12:07:08.513" v="210" actId="20577"/>
+        <pc:sldMkLst>
+          <pc:docMk/>
+          <pc:sldMk cId="2509704459" sldId="290"/>
+        </pc:sldMkLst>
+        <pc:spChg chg="mod">
+          <ac:chgData name="Tiago Fonseca" userId="0bf00240-3020-4d01-a24b-06825a2f49d7" providerId="ADAL" clId="{7F501EE3-BA3E-4F2E-8F95-0FA7922C07FC}" dt="2023-05-31T12:06:46.744" v="201" actId="20577"/>
+          <ac:spMkLst>
+            <pc:docMk/>
+            <pc:sldMk cId="2509704459" sldId="290"/>
+            <ac:spMk id="2" creationId="{98A32DE6-6B29-7489-635B-950DAAB3B577}"/>
+          </ac:spMkLst>
+        </pc:spChg>
+        <pc:spChg chg="mod">
+          <ac:chgData name="Tiago Fonseca" userId="0bf00240-3020-4d01-a24b-06825a2f49d7" providerId="ADAL" clId="{7F501EE3-BA3E-4F2E-8F95-0FA7922C07FC}" dt="2023-05-31T12:07:08.513" v="210" actId="20577"/>
+          <ac:spMkLst>
+            <pc:docMk/>
+            <pc:sldMk cId="2509704459" sldId="290"/>
+            <ac:spMk id="7" creationId="{4CDF2A1F-BDE4-7ECC-7CEB-42822AAE7A2D}"/>
+          </ac:spMkLst>
+        </pc:spChg>
+      </pc:sldChg>
+      <pc:sldChg chg="addSp delSp modSp add mod">
+        <pc:chgData name="Tiago Fonseca" userId="0bf00240-3020-4d01-a24b-06825a2f49d7" providerId="ADAL" clId="{7F501EE3-BA3E-4F2E-8F95-0FA7922C07FC}" dt="2023-05-31T12:09:32.601" v="270" actId="1076"/>
+        <pc:sldMkLst>
+          <pc:docMk/>
+          <pc:sldMk cId="4192160152" sldId="291"/>
+        </pc:sldMkLst>
+        <pc:spChg chg="mod">
+          <ac:chgData name="Tiago Fonseca" userId="0bf00240-3020-4d01-a24b-06825a2f49d7" providerId="ADAL" clId="{7F501EE3-BA3E-4F2E-8F95-0FA7922C07FC}" dt="2023-05-31T12:07:22.599" v="212"/>
+          <ac:spMkLst>
+            <pc:docMk/>
+            <pc:sldMk cId="4192160152" sldId="291"/>
+            <ac:spMk id="2" creationId="{98A32DE6-6B29-7489-635B-950DAAB3B577}"/>
+          </ac:spMkLst>
+        </pc:spChg>
+        <pc:spChg chg="add mod">
+          <ac:chgData name="Tiago Fonseca" userId="0bf00240-3020-4d01-a24b-06825a2f49d7" providerId="ADAL" clId="{7F501EE3-BA3E-4F2E-8F95-0FA7922C07FC}" dt="2023-05-31T12:08:28.868" v="239" actId="14100"/>
+          <ac:spMkLst>
+            <pc:docMk/>
+            <pc:sldMk cId="4192160152" sldId="291"/>
+            <ac:spMk id="3" creationId="{BF09446D-C6D8-006A-8A01-D7A4D8A7B490}"/>
+          </ac:spMkLst>
+        </pc:spChg>
+        <pc:spChg chg="add del mod">
+          <ac:chgData name="Tiago Fonseca" userId="0bf00240-3020-4d01-a24b-06825a2f49d7" providerId="ADAL" clId="{7F501EE3-BA3E-4F2E-8F95-0FA7922C07FC}" dt="2023-05-31T12:08:36.293" v="242"/>
+          <ac:spMkLst>
+            <pc:docMk/>
+            <pc:sldMk cId="4192160152" sldId="291"/>
+            <ac:spMk id="4" creationId="{2E51F97A-CD76-D142-AB40-3019E23A934B}"/>
+          </ac:spMkLst>
+        </pc:spChg>
+        <pc:spChg chg="add mod">
+          <ac:chgData name="Tiago Fonseca" userId="0bf00240-3020-4d01-a24b-06825a2f49d7" providerId="ADAL" clId="{7F501EE3-BA3E-4F2E-8F95-0FA7922C07FC}" dt="2023-05-31T12:09:23.023" v="269" actId="20577"/>
+          <ac:spMkLst>
+            <pc:docMk/>
+            <pc:sldMk cId="4192160152" sldId="291"/>
+            <ac:spMk id="5" creationId="{2AF94BD6-0FDD-D65A-10FD-994322D200A9}"/>
+          </ac:spMkLst>
+        </pc:spChg>
+        <pc:spChg chg="add del mod">
+          <ac:chgData name="Tiago Fonseca" userId="0bf00240-3020-4d01-a24b-06825a2f49d7" providerId="ADAL" clId="{7F501EE3-BA3E-4F2E-8F95-0FA7922C07FC}" dt="2023-05-31T12:09:32.601" v="270" actId="1076"/>
+          <ac:spMkLst>
+            <pc:docMk/>
+            <pc:sldMk cId="4192160152" sldId="291"/>
+            <ac:spMk id="7" creationId="{4CDF2A1F-BDE4-7ECC-7CEB-42822AAE7A2D}"/>
+          </ac:spMkLst>
+        </pc:spChg>
+      </pc:sldChg>
+      <pc:sldChg chg="modSp add mod">
+        <pc:chgData name="Tiago Fonseca" userId="0bf00240-3020-4d01-a24b-06825a2f49d7" providerId="ADAL" clId="{7F501EE3-BA3E-4F2E-8F95-0FA7922C07FC}" dt="2023-05-31T12:11:20.163" v="357" actId="20577"/>
+        <pc:sldMkLst>
+          <pc:docMk/>
+          <pc:sldMk cId="2775588976" sldId="292"/>
+        </pc:sldMkLst>
+        <pc:spChg chg="mod">
+          <ac:chgData name="Tiago Fonseca" userId="0bf00240-3020-4d01-a24b-06825a2f49d7" providerId="ADAL" clId="{7F501EE3-BA3E-4F2E-8F95-0FA7922C07FC}" dt="2023-05-31T12:11:20.163" v="357" actId="20577"/>
+          <ac:spMkLst>
+            <pc:docMk/>
+            <pc:sldMk cId="2775588976" sldId="292"/>
+            <ac:spMk id="7" creationId="{3781BB72-06CF-6EC3-7E08-64DE68C0CE29}"/>
+          </ac:spMkLst>
+        </pc:spChg>
+      </pc:sldChg>
+    </pc:docChg>
+  </pc:docChgLst>
 </pc:chgInfo>
 </file>
 
@@ -1814,7 +2105,7 @@
           <a:p>
             <a:fld id="{D2D36A62-A875-4277-8A16-493F38412961}" type="datetime1">
               <a:rPr lang="pt-PT" smtClean="0"/>
-              <a:t>17/05/2023</a:t>
+              <a:t>31/05/2023</a:t>
             </a:fld>
             <a:endParaRPr lang="pt-PT" dirty="0"/>
           </a:p>
@@ -1992,7 +2283,7 @@
             <a:fld id="{972DF3F9-B67B-4F27-BE75-227E70802F2F}" type="datetime1">
               <a:rPr lang="pt-PT" smtClean="0"/>
               <a:pPr/>
-              <a:t>17/05/2023</a:t>
+              <a:t>31/05/2023</a:t>
             </a:fld>
             <a:endParaRPr lang="pt-PT" dirty="0"/>
           </a:p>
@@ -2492,7 +2783,7 @@
           <a:p>
             <a:fld id="{44525C07-A26B-43C4-826F-2469C0661D24}" type="slidenum">
               <a:rPr lang="pt-PT" smtClean="0"/>
-              <a:t>5</a:t>
+              <a:t>4</a:t>
             </a:fld>
             <a:endParaRPr lang="pt-PT"/>
           </a:p>
@@ -2576,7 +2867,7 @@
           <a:p>
             <a:fld id="{44525C07-A26B-43C4-826F-2469C0661D24}" type="slidenum">
               <a:rPr lang="pt-PT" smtClean="0"/>
-              <a:t>7</a:t>
+              <a:t>9</a:t>
             </a:fld>
             <a:endParaRPr lang="pt-PT"/>
           </a:p>
@@ -2660,91 +2951,7 @@
           <a:p>
             <a:fld id="{44525C07-A26B-43C4-826F-2469C0661D24}" type="slidenum">
               <a:rPr lang="pt-PT" smtClean="0"/>
-              <a:t>9</a:t>
-            </a:fld>
-            <a:endParaRPr lang="pt-PT"/>
-          </a:p>
-        </p:txBody>
-      </p:sp>
-    </p:spTree>
-    <p:extLst>
-      <p:ext uri="{BB962C8B-B14F-4D97-AF65-F5344CB8AC3E}">
-        <p14:creationId xmlns:p14="http://schemas.microsoft.com/office/powerpoint/2010/main" val="212567503"/>
-      </p:ext>
-    </p:extLst>
-  </p:cSld>
-  <p:clrMapOvr>
-    <a:masterClrMapping/>
-  </p:clrMapOvr>
-</p:notes>
-</file>
-
-<file path=ppt/notesSlides/notesSlide6.xml><?xml version="1.0" encoding="utf-8"?>
-<p:notes xmlns:a="http://schemas.openxmlformats.org/drawingml/2006/main" xmlns:r="http://schemas.openxmlformats.org/officeDocument/2006/relationships" xmlns:p="http://schemas.openxmlformats.org/presentationml/2006/main">
-  <p:cSld>
-    <p:spTree>
-      <p:nvGrpSpPr>
-        <p:cNvPr id="1" name=""/>
-        <p:cNvGrpSpPr/>
-        <p:nvPr/>
-      </p:nvGrpSpPr>
-      <p:grpSpPr>
-        <a:xfrm>
-          <a:off x="0" y="0"/>
-          <a:ext cx="0" cy="0"/>
-          <a:chOff x="0" y="0"/>
-          <a:chExt cx="0" cy="0"/>
-        </a:xfrm>
-      </p:grpSpPr>
-      <p:sp>
-        <p:nvSpPr>
-          <p:cNvPr id="2" name="Marcador de Posição da Imagem do Diapositivo 1"/>
-          <p:cNvSpPr>
-            <a:spLocks noGrp="1" noRot="1" noChangeAspect="1"/>
-          </p:cNvSpPr>
-          <p:nvPr>
-            <p:ph type="sldImg"/>
-          </p:nvPr>
-        </p:nvSpPr>
-        <p:spPr/>
-      </p:sp>
-      <p:sp>
-        <p:nvSpPr>
-          <p:cNvPr id="3" name="Marcador de Posição de Notas 2"/>
-          <p:cNvSpPr>
-            <a:spLocks noGrp="1"/>
-          </p:cNvSpPr>
-          <p:nvPr>
-            <p:ph type="body" idx="1"/>
-          </p:nvPr>
-        </p:nvSpPr>
-        <p:spPr/>
-        <p:txBody>
-          <a:bodyPr/>
-          <a:lstStyle/>
-          <a:p>
-            <a:endParaRPr lang="pt-PT" dirty="0"/>
-          </a:p>
-        </p:txBody>
-      </p:sp>
-      <p:sp>
-        <p:nvSpPr>
-          <p:cNvPr id="4" name="Marcador de Posição do Número do Diapositivo 3"/>
-          <p:cNvSpPr>
-            <a:spLocks noGrp="1"/>
-          </p:cNvSpPr>
-          <p:nvPr>
-            <p:ph type="sldNum" sz="quarter" idx="5"/>
-          </p:nvPr>
-        </p:nvSpPr>
-        <p:spPr/>
-        <p:txBody>
-          <a:bodyPr/>
-          <a:lstStyle/>
-          <a:p>
-            <a:fld id="{44525C07-A26B-43C4-826F-2469C0661D24}" type="slidenum">
-              <a:rPr lang="pt-PT" smtClean="0"/>
-              <a:t>12</a:t>
+              <a:t>13</a:t>
             </a:fld>
             <a:endParaRPr lang="pt-PT"/>
           </a:p>
@@ -2903,7 +3110,7 @@
             <a:pPr rtl="0"/>
             <a:fld id="{C8F587F8-FA17-455A-8A00-703CCEE25921}" type="datetime1">
               <a:rPr lang="pt-PT" noProof="0" smtClean="0"/>
-              <a:t>17/05/2023</a:t>
+              <a:t>31/05/2023</a:t>
             </a:fld>
             <a:endParaRPr lang="pt-PT" noProof="0"/>
           </a:p>
@@ -3116,7 +3323,7 @@
             <a:pPr rtl="0"/>
             <a:fld id="{0DD3EE91-6B45-4017-AD42-B2329289C442}" type="datetime1">
               <a:rPr lang="pt-PT" noProof="0" smtClean="0"/>
-              <a:t>17/05/2023</a:t>
+              <a:t>31/05/2023</a:t>
             </a:fld>
             <a:endParaRPr lang="pt-PT" noProof="0"/>
           </a:p>
@@ -3333,7 +3540,7 @@
             <a:pPr rtl="0"/>
             <a:fld id="{86E0D85C-D33A-4C75-B1F4-90B4B43E0A2E}" type="datetime1">
               <a:rPr lang="pt-PT" noProof="0" smtClean="0"/>
-              <a:t>17/05/2023</a:t>
+              <a:t>31/05/2023</a:t>
             </a:fld>
             <a:endParaRPr lang="pt-PT" noProof="0"/>
           </a:p>
@@ -3536,7 +3743,7 @@
             <a:pPr rtl="0"/>
             <a:fld id="{69E31215-3AA2-4E07-BD89-8366B4EADC19}" type="datetime1">
               <a:rPr lang="pt-PT" noProof="0" smtClean="0"/>
-              <a:t>17/05/2023</a:t>
+              <a:t>31/05/2023</a:t>
             </a:fld>
             <a:endParaRPr lang="pt-PT" noProof="0"/>
           </a:p>
@@ -3818,7 +4025,7 @@
             <a:pPr rtl="0"/>
             <a:fld id="{ECA80334-0323-4E20-AD7A-8ACCF6B591D0}" type="datetime1">
               <a:rPr lang="pt-PT" noProof="0" smtClean="0"/>
-              <a:t>17/05/2023</a:t>
+              <a:t>31/05/2023</a:t>
             </a:fld>
             <a:endParaRPr lang="pt-PT" noProof="0"/>
           </a:p>
@@ -4087,7 +4294,7 @@
             <a:pPr rtl="0"/>
             <a:fld id="{80F38C40-5F7E-4311-AF5A-B29D2C969CD2}" type="datetime1">
               <a:rPr lang="pt-PT" noProof="0" smtClean="0"/>
-              <a:t>17/05/2023</a:t>
+              <a:t>31/05/2023</a:t>
             </a:fld>
             <a:endParaRPr lang="pt-PT" noProof="0"/>
           </a:p>
@@ -4504,7 +4711,7 @@
             <a:pPr rtl="0"/>
             <a:fld id="{C325681A-4BE1-41EB-B484-891CF1CBCA06}" type="datetime1">
               <a:rPr lang="pt-PT" noProof="0" smtClean="0"/>
-              <a:t>17/05/2023</a:t>
+              <a:t>31/05/2023</a:t>
             </a:fld>
             <a:endParaRPr lang="pt-PT" noProof="0"/>
           </a:p>
@@ -4656,7 +4863,7 @@
             <a:pPr rtl="0"/>
             <a:fld id="{3D25063B-819E-492C-A7C2-E1829FA159C4}" type="datetime1">
               <a:rPr lang="pt-PT" noProof="0" smtClean="0"/>
-              <a:t>17/05/2023</a:t>
+              <a:t>31/05/2023</a:t>
             </a:fld>
             <a:endParaRPr lang="pt-PT" noProof="0"/>
           </a:p>
@@ -4785,7 +4992,7 @@
             <a:pPr rtl="0"/>
             <a:fld id="{38C1FFB3-F6B6-4411-A5F4-B2FC50F77E82}" type="datetime1">
               <a:rPr lang="pt-PT" noProof="0" smtClean="0"/>
-              <a:t>17/05/2023</a:t>
+              <a:t>31/05/2023</a:t>
             </a:fld>
             <a:endParaRPr lang="pt-PT" noProof="0"/>
           </a:p>
@@ -5038,7 +5245,7 @@
             <a:pPr rtl="0"/>
             <a:fld id="{F2757A85-4FE8-47BC-A31A-F7326AAD7004}" type="datetime1">
               <a:rPr lang="pt-PT" noProof="0" smtClean="0"/>
-              <a:t>17/05/2023</a:t>
+              <a:t>31/05/2023</a:t>
             </a:fld>
             <a:endParaRPr lang="pt-PT" noProof="0"/>
           </a:p>
@@ -5486,7 +5693,7 @@
             <a:pPr rtl="0"/>
             <a:fld id="{F08BED7F-40FB-4334-A984-6AEE9A357FE3}" type="datetime1">
               <a:rPr lang="pt-PT" noProof="0" smtClean="0"/>
-              <a:t>17/05/2023</a:t>
+              <a:t>31/05/2023</a:t>
             </a:fld>
             <a:endParaRPr lang="pt-PT" noProof="0"/>
           </a:p>
@@ -5815,7 +6022,7 @@
             <a:pPr rtl="0"/>
             <a:fld id="{65E81E91-8178-42DA-ACD7-17B3FDA5134B}" type="datetime1">
               <a:rPr lang="pt-PT" noProof="0" smtClean="0"/>
-              <a:t>17/05/2023</a:t>
+              <a:t>31/05/2023</a:t>
             </a:fld>
             <a:endParaRPr lang="pt-PT" noProof="0"/>
           </a:p>
@@ -6496,7 +6703,7 @@
                   <a:schemeClr val="bg2"/>
                 </a:solidFill>
               </a:rPr>
-              <a:t>Construção</a:t>
+              <a:t>Implementação</a:t>
             </a:r>
           </a:p>
         </p:txBody>
@@ -6663,13 +6870,8 @@
             <a:pPr algn="ctr"/>
             <a:r>
               <a:rPr lang="pt-PT" dirty="0"/>
-              <a:t>Estratégia </a:t>
-            </a:r>
-            <a:r>
-              <a:rPr lang="pt-PT"/>
-              <a:t>de implementação</a:t>
-            </a:r>
-            <a:endParaRPr lang="pt-PT" dirty="0"/>
+              <a:t>Desenvolvimento ágil</a:t>
+            </a:r>
           </a:p>
         </p:txBody>
       </p:sp>
@@ -6703,67 +6905,19 @@
           <a:p>
             <a:r>
               <a:rPr lang="pt-PT" dirty="0"/>
-              <a:t>Uso de </a:t>
-            </a:r>
-            <a:r>
-              <a:rPr lang="pt-PT" dirty="0" err="1"/>
-              <a:t>Python</a:t>
-            </a:r>
+              <a:t>Foram usadas plataformas de gestão do projeto (Jira e GitHub) que permitiram uma maior flexibilidade e colaboração entre os membros do projeto;</a:t>
+            </a:r>
+          </a:p>
+          <a:p>
             <a:r>
               <a:rPr lang="pt-PT" dirty="0"/>
-              <a:t>, para a construção do “</a:t>
-            </a:r>
-            <a:r>
-              <a:rPr lang="pt-PT" dirty="0" err="1"/>
-              <a:t>backend</a:t>
-            </a:r>
+              <a:t>Cada iteração do projeto correspondeu à implementação de uma funcionalidade principal, devido a iterações curtas e focadas em aspetos críticos da plataforma;</a:t>
+            </a:r>
+          </a:p>
+          <a:p>
             <a:r>
               <a:rPr lang="pt-PT" dirty="0"/>
-              <a:t>”, devido à sua simplicidade, legibilidade e vasta biblioteca de “</a:t>
-            </a:r>
-            <a:r>
-              <a:rPr lang="pt-PT" dirty="0" err="1"/>
-              <a:t>frameworks</a:t>
-            </a:r>
-            <a:r>
-              <a:rPr lang="pt-PT" dirty="0"/>
-              <a:t>” que facilitam o desenvolvimento WEB</a:t>
-            </a:r>
-          </a:p>
-          <a:p>
-            <a:r>
-              <a:rPr lang="pt-PT" dirty="0"/>
-              <a:t>Uso de </a:t>
-            </a:r>
-            <a:r>
-              <a:rPr lang="pt-PT" dirty="0" err="1"/>
-              <a:t>Flask</a:t>
-            </a:r>
-            <a:r>
-              <a:rPr lang="pt-PT" dirty="0"/>
-              <a:t>, como “</a:t>
-            </a:r>
-            <a:r>
-              <a:rPr lang="pt-PT" dirty="0" err="1"/>
-              <a:t>framework</a:t>
-            </a:r>
-            <a:r>
-              <a:rPr lang="pt-PT" dirty="0"/>
-              <a:t>” designada, devido à sua facilidade de uso, permitindo o desenvolvimento rápido e flexível</a:t>
-            </a:r>
-          </a:p>
-          <a:p>
-            <a:r>
-              <a:rPr lang="pt-PT" dirty="0"/>
-              <a:t>Uso de HTML, CSS e JAVA, para a construção do “</a:t>
-            </a:r>
-            <a:r>
-              <a:rPr lang="pt-PT" dirty="0" err="1"/>
-              <a:t>frontend</a:t>
-            </a:r>
-            <a:r>
-              <a:rPr lang="pt-PT" dirty="0"/>
-              <a:t>”, devido à sua versatilidade e rápida reutilização</a:t>
+              <a:t>Para cada iteração foi feita uma revisão(sprint), que permitiu detetar possíveis melhorias na plataforma;</a:t>
             </a:r>
           </a:p>
         </p:txBody>
@@ -6822,13 +6976,8 @@
             <a:pPr algn="ctr"/>
             <a:r>
               <a:rPr lang="pt-PT" dirty="0"/>
-              <a:t>Estratégia </a:t>
-            </a:r>
-            <a:r>
-              <a:rPr lang="pt-PT"/>
-              <a:t>de implementação</a:t>
-            </a:r>
-            <a:endParaRPr lang="pt-PT" dirty="0"/>
+              <a:t>Desenvolvimento ágil</a:t>
+            </a:r>
           </a:p>
         </p:txBody>
       </p:sp>
@@ -6856,81 +7005,125 @@
         </p:spPr>
         <p:txBody>
           <a:bodyPr>
-            <a:normAutofit lnSpcReduction="10000"/>
+            <a:normAutofit/>
           </a:bodyPr>
           <a:lstStyle/>
           <a:p>
             <a:r>
               <a:rPr lang="pt-PT" dirty="0"/>
-              <a:t>Para a coordenação do desenvolvimento do software, foi utilizado o </a:t>
-            </a:r>
-            <a:r>
-              <a:rPr lang="pt-PT" dirty="0" err="1"/>
-              <a:t>Github</a:t>
-            </a:r>
+              <a:t>A priorização dos requisitos permitiu decisões eficazes no desenvolvimento da plataforma;</a:t>
+            </a:r>
+          </a:p>
+          <a:p>
             <a:r>
               <a:rPr lang="pt-PT" dirty="0"/>
-              <a:t>, de forma a manter um alto controlo de versões.</a:t>
-            </a:r>
-          </a:p>
-          <a:p>
+              <a:t>A entrega sequencial de software funcional permitiu um feedback continuo, que se refletiu em mudanças no projeto.</a:t>
+            </a:r>
+          </a:p>
+        </p:txBody>
+      </p:sp>
+    </p:spTree>
+    <p:extLst>
+      <p:ext uri="{BB962C8B-B14F-4D97-AF65-F5344CB8AC3E}">
+        <p14:creationId xmlns:p14="http://schemas.microsoft.com/office/powerpoint/2010/main" val="2775588976"/>
+      </p:ext>
+    </p:extLst>
+  </p:cSld>
+  <p:clrMapOvr>
+    <a:masterClrMapping/>
+  </p:clrMapOvr>
+</p:sld>
+</file>
+
+<file path=ppt/slides/slide12.xml><?xml version="1.0" encoding="utf-8"?>
+<p:sld xmlns:a="http://schemas.openxmlformats.org/drawingml/2006/main" xmlns:r="http://schemas.openxmlformats.org/officeDocument/2006/relationships" xmlns:p="http://schemas.openxmlformats.org/presentationml/2006/main">
+  <p:cSld>
+    <p:spTree>
+      <p:nvGrpSpPr>
+        <p:cNvPr id="1" name=""/>
+        <p:cNvGrpSpPr/>
+        <p:nvPr/>
+      </p:nvGrpSpPr>
+      <p:grpSpPr>
+        <a:xfrm>
+          <a:off x="0" y="0"/>
+          <a:ext cx="0" cy="0"/>
+          <a:chOff x="0" y="0"/>
+          <a:chExt cx="0" cy="0"/>
+        </a:xfrm>
+      </p:grpSpPr>
+      <p:sp>
+        <p:nvSpPr>
+          <p:cNvPr id="2" name="Título 1">
+            <a:extLst>
+              <a:ext uri="{FF2B5EF4-FFF2-40B4-BE49-F238E27FC236}">
+                <a16:creationId xmlns:a16="http://schemas.microsoft.com/office/drawing/2014/main" id="{931451AD-4895-B705-D9DD-AE4EECD87102}"/>
+              </a:ext>
+            </a:extLst>
+          </p:cNvPr>
+          <p:cNvSpPr>
+            <a:spLocks noGrp="1"/>
+          </p:cNvSpPr>
+          <p:nvPr>
+            <p:ph type="title"/>
+          </p:nvPr>
+        </p:nvSpPr>
+        <p:spPr/>
+        <p:txBody>
+          <a:bodyPr/>
+          <a:lstStyle/>
+          <a:p>
+            <a:pPr algn="ctr"/>
             <a:r>
               <a:rPr lang="pt-PT" dirty="0"/>
-              <a:t>“</a:t>
-            </a:r>
-            <a:r>
-              <a:rPr lang="pt-PT" dirty="0" err="1"/>
-              <a:t>Frontend</a:t>
-            </a:r>
+              <a:t>Lições aprendidas</a:t>
+            </a:r>
+          </a:p>
+        </p:txBody>
+      </p:sp>
+      <p:sp>
+        <p:nvSpPr>
+          <p:cNvPr id="7" name="Marcador de Posição de Conteúdo 6">
+            <a:extLst>
+              <a:ext uri="{FF2B5EF4-FFF2-40B4-BE49-F238E27FC236}">
+                <a16:creationId xmlns:a16="http://schemas.microsoft.com/office/drawing/2014/main" id="{3781BB72-06CF-6EC3-7E08-64DE68C0CE29}"/>
+              </a:ext>
+            </a:extLst>
+          </p:cNvPr>
+          <p:cNvSpPr>
+            <a:spLocks noGrp="1"/>
+          </p:cNvSpPr>
+          <p:nvPr>
+            <p:ph sz="half" idx="2"/>
+          </p:nvPr>
+        </p:nvSpPr>
+        <p:spPr>
+          <a:xfrm>
+            <a:off x="1447191" y="2244606"/>
+            <a:ext cx="9697059" cy="2645802"/>
+          </a:xfrm>
+        </p:spPr>
+        <p:txBody>
+          <a:bodyPr>
+            <a:normAutofit/>
+          </a:bodyPr>
+          <a:lstStyle/>
+          <a:p>
             <a:r>
               <a:rPr lang="pt-PT" dirty="0"/>
-              <a:t>” (HTML) : Lucas Matos</a:t>
+              <a:t>Uma boa organização permite o desenvolvimento rápido e funcional de um projeto;</a:t>
             </a:r>
           </a:p>
           <a:p>
             <a:r>
               <a:rPr lang="pt-PT" dirty="0"/>
-              <a:t>“</a:t>
-            </a:r>
-            <a:r>
-              <a:rPr lang="pt-PT" dirty="0" err="1"/>
-              <a:t>Frontend</a:t>
-            </a:r>
+              <a:t>A priorização de aspetos importantes tem um grande impacto na arquitetura de um projeto;</a:t>
+            </a:r>
+          </a:p>
+          <a:p>
             <a:r>
               <a:rPr lang="pt-PT" dirty="0"/>
-              <a:t>” (JS e CSS) : Hugo Xavier</a:t>
-            </a:r>
-          </a:p>
-          <a:p>
-            <a:r>
-              <a:rPr lang="pt-PT" dirty="0"/>
-              <a:t>“</a:t>
-            </a:r>
-            <a:r>
-              <a:rPr lang="pt-PT" dirty="0" err="1"/>
-              <a:t>Backend</a:t>
-            </a:r>
-            <a:r>
-              <a:rPr lang="pt-PT" dirty="0"/>
-              <a:t>” (Autenticações) : Filipe Sousa</a:t>
-            </a:r>
-          </a:p>
-          <a:p>
-            <a:r>
-              <a:rPr lang="pt-PT" dirty="0"/>
-              <a:t>“</a:t>
-            </a:r>
-            <a:r>
-              <a:rPr lang="pt-PT" dirty="0" err="1"/>
-              <a:t>Backend</a:t>
-            </a:r>
-            <a:r>
-              <a:rPr lang="pt-PT" dirty="0"/>
-              <a:t>” (Base de Dados) : </a:t>
-            </a:r>
-            <a:r>
-              <a:rPr lang="pt-PT"/>
-              <a:t>Tiago Fonseca</a:t>
+              <a:t>O feedback e pesquisa anexada ao projeto permite a entrega de uma plataforma que vai de encontro com as expectativas.</a:t>
             </a:r>
           </a:p>
         </p:txBody>
@@ -6948,7 +7141,7 @@
 </p:sld>
 </file>
 
-<file path=ppt/slides/slide12.xml><?xml version="1.0" encoding="utf-8"?>
+<file path=ppt/slides/slide13.xml><?xml version="1.0" encoding="utf-8"?>
 <p:sld xmlns:a="http://schemas.openxmlformats.org/drawingml/2006/main" xmlns:r="http://schemas.openxmlformats.org/officeDocument/2006/relationships" xmlns:p="http://schemas.openxmlformats.org/presentationml/2006/main">
   <p:cSld>
     <p:bg>
@@ -7907,7 +8100,7 @@
                   <a:srgbClr val="FFFFFE"/>
                 </a:solidFill>
               </a:rPr>
-              <a:t>Objetivos</a:t>
+              <a:t>Transformação digital</a:t>
             </a:r>
           </a:p>
         </p:txBody>
@@ -8013,10 +8206,9 @@
           <a:p>
             <a:pPr algn="ctr"/>
             <a:r>
-              <a:rPr lang="pt-PT" dirty="0" err="1"/>
-              <a:t>qUalidades</a:t>
-            </a:r>
-            <a:endParaRPr lang="pt-PT" dirty="0"/>
+              <a:rPr lang="pt-PT" dirty="0"/>
+              <a:t>Transformação digital</a:t>
+            </a:r>
           </a:p>
         </p:txBody>
       </p:sp>
@@ -8048,19 +8240,25 @@
           <a:p>
             <a:r>
               <a:rPr lang="pt-PT" dirty="0"/>
-              <a:t>Facilidade de acesso em todo o lado e a qualquer momento, sem necessidade de instalação de qualquer tipo de “software”</a:t>
+              <a:t>Introduzir a empresa ao mercado digital, através da inovação nos seus serviços; </a:t>
             </a:r>
           </a:p>
           <a:p>
             <a:r>
               <a:rPr lang="pt-PT" dirty="0"/>
-              <a:t>Toda a informação e dados dos utilizadores são mantidos internamente, garantindo assim um nível de segurança elevado</a:t>
+              <a:t>Espaço para inovação nos serviços financeiros;</a:t>
             </a:r>
           </a:p>
           <a:p>
             <a:r>
               <a:rPr lang="pt-PT" dirty="0"/>
-              <a:t>Os utilizadores devem ser capazes de importar os extratos de outros bancos sem qualquer tipo de adaptação nos mesmos</a:t>
+              <a:t>Aumentar o poder negocial da organização;</a:t>
+            </a:r>
+          </a:p>
+          <a:p>
+            <a:r>
+              <a:rPr lang="pt-PT" dirty="0"/>
+              <a:t>Expandir a carteira de clientes.</a:t>
             </a:r>
           </a:p>
         </p:txBody>
@@ -8079,110 +8277,6 @@
 </file>
 
 <file path=ppt/slides/slide4.xml><?xml version="1.0" encoding="utf-8"?>
-<p:sld xmlns:a="http://schemas.openxmlformats.org/drawingml/2006/main" xmlns:r="http://schemas.openxmlformats.org/officeDocument/2006/relationships" xmlns:p="http://schemas.openxmlformats.org/presentationml/2006/main">
-  <p:cSld>
-    <p:spTree>
-      <p:nvGrpSpPr>
-        <p:cNvPr id="1" name=""/>
-        <p:cNvGrpSpPr/>
-        <p:nvPr/>
-      </p:nvGrpSpPr>
-      <p:grpSpPr>
-        <a:xfrm>
-          <a:off x="0" y="0"/>
-          <a:ext cx="0" cy="0"/>
-          <a:chOff x="0" y="0"/>
-          <a:chExt cx="0" cy="0"/>
-        </a:xfrm>
-      </p:grpSpPr>
-      <p:sp>
-        <p:nvSpPr>
-          <p:cNvPr id="2" name="Título 1">
-            <a:extLst>
-              <a:ext uri="{FF2B5EF4-FFF2-40B4-BE49-F238E27FC236}">
-                <a16:creationId xmlns:a16="http://schemas.microsoft.com/office/drawing/2014/main" id="{98A32DE6-6B29-7489-635B-950DAAB3B577}"/>
-              </a:ext>
-            </a:extLst>
-          </p:cNvPr>
-          <p:cNvSpPr>
-            <a:spLocks noGrp="1"/>
-          </p:cNvSpPr>
-          <p:nvPr>
-            <p:ph type="title"/>
-          </p:nvPr>
-        </p:nvSpPr>
-        <p:spPr/>
-        <p:txBody>
-          <a:bodyPr/>
-          <a:lstStyle/>
-          <a:p>
-            <a:pPr algn="ctr"/>
-            <a:r>
-              <a:rPr lang="pt-PT" dirty="0"/>
-              <a:t>Restrições</a:t>
-            </a:r>
-          </a:p>
-        </p:txBody>
-      </p:sp>
-      <p:sp>
-        <p:nvSpPr>
-          <p:cNvPr id="7" name="Marcador de Posição de Conteúdo 6">
-            <a:extLst>
-              <a:ext uri="{FF2B5EF4-FFF2-40B4-BE49-F238E27FC236}">
-                <a16:creationId xmlns:a16="http://schemas.microsoft.com/office/drawing/2014/main" id="{4CDF2A1F-BDE4-7ECC-7CEB-42822AAE7A2D}"/>
-              </a:ext>
-            </a:extLst>
-          </p:cNvPr>
-          <p:cNvSpPr>
-            <a:spLocks noGrp="1"/>
-          </p:cNvSpPr>
-          <p:nvPr>
-            <p:ph idx="1"/>
-          </p:nvPr>
-        </p:nvSpPr>
-        <p:spPr>
-          <a:xfrm>
-            <a:off x="1451579" y="2106386"/>
-            <a:ext cx="9603275" cy="3359959"/>
-          </a:xfrm>
-        </p:spPr>
-        <p:txBody>
-          <a:bodyPr/>
-          <a:lstStyle/>
-          <a:p>
-            <a:r>
-              <a:rPr lang="pt-PT" dirty="0"/>
-              <a:t>Apenas será possível importar os extratos de uma reduzida quantidade de bancos</a:t>
-            </a:r>
-          </a:p>
-          <a:p>
-            <a:r>
-              <a:rPr lang="pt-PT" dirty="0"/>
-              <a:t>De forma a aumentar a segurança dos utilizadores e dos seus dados, o utilizador terá de interagir pelo menos 1 vez a cada 10 minutos com a plataforma, senão a sua sessão será revogada</a:t>
-            </a:r>
-          </a:p>
-          <a:p>
-            <a:r>
-              <a:rPr lang="pt-PT" dirty="0"/>
-              <a:t>Para evitar contas duplicadas, cada nome de utilizador e email serão únicos a cada utilizador</a:t>
-            </a:r>
-          </a:p>
-        </p:txBody>
-      </p:sp>
-    </p:spTree>
-    <p:extLst>
-      <p:ext uri="{BB962C8B-B14F-4D97-AF65-F5344CB8AC3E}">
-        <p14:creationId xmlns:p14="http://schemas.microsoft.com/office/powerpoint/2010/main" val="831434331"/>
-      </p:ext>
-    </p:extLst>
-  </p:cSld>
-  <p:clrMapOvr>
-    <a:masterClrMapping/>
-  </p:clrMapOvr>
-</p:sld>
-</file>
-
-<file path=ppt/slides/slide5.xml><?xml version="1.0" encoding="utf-8"?>
 <p:sld xmlns:a="http://schemas.openxmlformats.org/drawingml/2006/main" xmlns:r="http://schemas.openxmlformats.org/officeDocument/2006/relationships" xmlns:p="http://schemas.openxmlformats.org/presentationml/2006/main">
   <p:cSld>
     <p:bg>
@@ -8573,7 +8667,7 @@
                   <a:srgbClr val="FFFFFE"/>
                 </a:solidFill>
               </a:rPr>
-              <a:t>Modelo tecnológico</a:t>
+              <a:t>Produto</a:t>
             </a:r>
           </a:p>
         </p:txBody>
@@ -8639,6 +8733,116 @@
 </p:sld>
 </file>
 
+<file path=ppt/slides/slide5.xml><?xml version="1.0" encoding="utf-8"?>
+<p:sld xmlns:a="http://schemas.openxmlformats.org/drawingml/2006/main" xmlns:r="http://schemas.openxmlformats.org/officeDocument/2006/relationships" xmlns:p="http://schemas.openxmlformats.org/presentationml/2006/main">
+  <p:cSld>
+    <p:spTree>
+      <p:nvGrpSpPr>
+        <p:cNvPr id="1" name=""/>
+        <p:cNvGrpSpPr/>
+        <p:nvPr/>
+      </p:nvGrpSpPr>
+      <p:grpSpPr>
+        <a:xfrm>
+          <a:off x="0" y="0"/>
+          <a:ext cx="0" cy="0"/>
+          <a:chOff x="0" y="0"/>
+          <a:chExt cx="0" cy="0"/>
+        </a:xfrm>
+      </p:grpSpPr>
+      <p:sp>
+        <p:nvSpPr>
+          <p:cNvPr id="2" name="Título 1">
+            <a:extLst>
+              <a:ext uri="{FF2B5EF4-FFF2-40B4-BE49-F238E27FC236}">
+                <a16:creationId xmlns:a16="http://schemas.microsoft.com/office/drawing/2014/main" id="{98A32DE6-6B29-7489-635B-950DAAB3B577}"/>
+              </a:ext>
+            </a:extLst>
+          </p:cNvPr>
+          <p:cNvSpPr>
+            <a:spLocks noGrp="1"/>
+          </p:cNvSpPr>
+          <p:nvPr>
+            <p:ph type="title"/>
+          </p:nvPr>
+        </p:nvSpPr>
+        <p:spPr/>
+        <p:txBody>
+          <a:bodyPr/>
+          <a:lstStyle/>
+          <a:p>
+            <a:pPr algn="ctr"/>
+            <a:r>
+              <a:rPr lang="pt-PT" dirty="0"/>
+              <a:t>Funcionalidades principais</a:t>
+            </a:r>
+          </a:p>
+        </p:txBody>
+      </p:sp>
+      <p:sp>
+        <p:nvSpPr>
+          <p:cNvPr id="7" name="Marcador de Posição de Conteúdo 6">
+            <a:extLst>
+              <a:ext uri="{FF2B5EF4-FFF2-40B4-BE49-F238E27FC236}">
+                <a16:creationId xmlns:a16="http://schemas.microsoft.com/office/drawing/2014/main" id="{4CDF2A1F-BDE4-7ECC-7CEB-42822AAE7A2D}"/>
+              </a:ext>
+            </a:extLst>
+          </p:cNvPr>
+          <p:cNvSpPr>
+            <a:spLocks noGrp="1"/>
+          </p:cNvSpPr>
+          <p:nvPr>
+            <p:ph idx="1"/>
+          </p:nvPr>
+        </p:nvSpPr>
+        <p:spPr>
+          <a:xfrm>
+            <a:off x="1451579" y="2106386"/>
+            <a:ext cx="9603275" cy="3359959"/>
+          </a:xfrm>
+        </p:spPr>
+        <p:txBody>
+          <a:bodyPr/>
+          <a:lstStyle/>
+          <a:p>
+            <a:r>
+              <a:rPr lang="pt-PT" dirty="0"/>
+              <a:t>Calendário com datas importantes sobre o seu empréstimo ou outra situação financeira; </a:t>
+            </a:r>
+          </a:p>
+          <a:p>
+            <a:r>
+              <a:rPr lang="pt-PT" dirty="0"/>
+              <a:t>Consulta com especialistas financeiros através de Chat;</a:t>
+            </a:r>
+          </a:p>
+          <a:p>
+            <a:r>
+              <a:rPr lang="pt-PT" dirty="0"/>
+              <a:t>Importação de extratos de bancos parceiros; </a:t>
+            </a:r>
+          </a:p>
+          <a:p>
+            <a:r>
+              <a:rPr lang="pt-PT" dirty="0"/>
+              <a:t>Análise instantânea dos extratos do utilizador (nativos ou importados).</a:t>
+            </a:r>
+          </a:p>
+        </p:txBody>
+      </p:sp>
+    </p:spTree>
+    <p:extLst>
+      <p:ext uri="{BB962C8B-B14F-4D97-AF65-F5344CB8AC3E}">
+        <p14:creationId xmlns:p14="http://schemas.microsoft.com/office/powerpoint/2010/main" val="831434331"/>
+      </p:ext>
+    </p:extLst>
+  </p:cSld>
+  <p:clrMapOvr>
+    <a:masterClrMapping/>
+  </p:clrMapOvr>
+</p:sld>
+</file>
+
 <file path=ppt/slides/slide6.xml><?xml version="1.0" encoding="utf-8"?>
 <p:sld xmlns:a="http://schemas.openxmlformats.org/drawingml/2006/main" xmlns:r="http://schemas.openxmlformats.org/officeDocument/2006/relationships" xmlns:p="http://schemas.openxmlformats.org/presentationml/2006/main">
   <p:cSld>
@@ -8680,357 +8884,66 @@
             <a:pPr algn="ctr"/>
             <a:r>
               <a:rPr lang="pt-PT" dirty="0"/>
-              <a:t>Modelo tecnológico</a:t>
-            </a:r>
-          </a:p>
-        </p:txBody>
-      </p:sp>
-      <p:pic>
-        <p:nvPicPr>
-          <p:cNvPr id="8" name="Google Shape;262;p26">
+              <a:t>Valor/beneficio</a:t>
+            </a:r>
+          </a:p>
+        </p:txBody>
+      </p:sp>
+      <p:sp>
+        <p:nvSpPr>
+          <p:cNvPr id="7" name="Marcador de Posição de Conteúdo 6">
             <a:extLst>
               <a:ext uri="{FF2B5EF4-FFF2-40B4-BE49-F238E27FC236}">
-                <a16:creationId xmlns:a16="http://schemas.microsoft.com/office/drawing/2014/main" id="{A0483AA2-5778-A9BA-0090-1DE993A20FAA}"/>
+                <a16:creationId xmlns:a16="http://schemas.microsoft.com/office/drawing/2014/main" id="{4CDF2A1F-BDE4-7ECC-7CEB-42822AAE7A2D}"/>
               </a:ext>
             </a:extLst>
           </p:cNvPr>
-          <p:cNvPicPr preferRelativeResize="0">
-            <a:picLocks noGrp="1"/>
-          </p:cNvPicPr>
+          <p:cNvSpPr>
+            <a:spLocks noGrp="1"/>
+          </p:cNvSpPr>
           <p:nvPr>
             <p:ph idx="1"/>
           </p:nvPr>
-        </p:nvPicPr>
-        <p:blipFill>
-          <a:blip r:embed="rId2">
-            <a:alphaModFix/>
-          </a:blip>
-          <a:stretch>
-            <a:fillRect/>
-          </a:stretch>
-        </p:blipFill>
+        </p:nvSpPr>
         <p:spPr>
           <a:xfrm>
-            <a:off x="1913201" y="2155370"/>
-            <a:ext cx="1287199" cy="1273629"/>
+            <a:off x="1451579" y="2106386"/>
+            <a:ext cx="9603275" cy="3359959"/>
           </a:xfrm>
-          <a:prstGeom prst="rect">
-            <a:avLst/>
-          </a:prstGeom>
-          <a:noFill/>
-          <a:ln>
-            <a:noFill/>
-          </a:ln>
         </p:spPr>
-      </p:pic>
-      <p:pic>
-        <p:nvPicPr>
-          <p:cNvPr id="18" name="Imagem 17" descr="Uma imagem com logótipo, símbolo, Gráficos, design&#10;&#10;Descrição gerada automaticamente">
-            <a:extLst>
-              <a:ext uri="{FF2B5EF4-FFF2-40B4-BE49-F238E27FC236}">
-                <a16:creationId xmlns:a16="http://schemas.microsoft.com/office/drawing/2014/main" id="{7DCB987D-7684-AD7D-58E6-89941F2AD818}"/>
-              </a:ext>
-            </a:extLst>
-          </p:cNvPr>
-          <p:cNvPicPr>
-            <a:picLocks noChangeAspect="1"/>
-          </p:cNvPicPr>
-          <p:nvPr/>
-        </p:nvPicPr>
-        <p:blipFill>
-          <a:blip r:embed="rId3">
-            <a:extLst>
-              <a:ext uri="{BEBA8EAE-BF5A-486C-A8C5-ECC9F3942E4B}">
-                <a14:imgProps xmlns:a14="http://schemas.microsoft.com/office/drawing/2010/main">
-                  <a14:imgLayer r:embed="rId4">
-                    <a14:imgEffect>
-                      <a14:backgroundRemoval t="8228" b="91139" l="9916" r="89662">
-                        <a14:foregroundMark x1="56329" y1="40506" x2="56329" y2="40506"/>
-                        <a14:foregroundMark x1="54219" y1="46835" x2="57384" y2="43671"/>
-                        <a14:foregroundMark x1="56751" y1="56118" x2="61181" y2="57173"/>
-                        <a14:foregroundMark x1="48312" y1="8228" x2="49789" y2="9072"/>
-                        <a14:foregroundMark x1="63291" y1="9072" x2="65401" y2="8650"/>
-                        <a14:foregroundMark x1="34599" y1="9072" x2="37131" y2="9072"/>
-                        <a14:foregroundMark x1="52954" y1="91139" x2="47679" y2="90717"/>
-                        <a14:foregroundMark x1="59283" y1="34599" x2="61181" y2="62658"/>
-                      </a14:backgroundRemoval>
-                    </a14:imgEffect>
-                  </a14:imgLayer>
-                </a14:imgProps>
-              </a:ext>
-            </a:extLst>
-          </a:blip>
-          <a:stretch>
-            <a:fillRect/>
-          </a:stretch>
-        </p:blipFill>
-        <p:spPr>
-          <a:xfrm>
-            <a:off x="3552826" y="1943100"/>
-            <a:ext cx="1729469" cy="1729469"/>
-          </a:xfrm>
-          <a:prstGeom prst="rect">
-            <a:avLst/>
-          </a:prstGeom>
-        </p:spPr>
-      </p:pic>
-      <p:pic>
-        <p:nvPicPr>
-          <p:cNvPr id="20" name="Imagem 19" descr="Uma imagem com Gráficos, logótipo, design gráfico, Tipo de letra&#10;&#10;Descrição gerada automaticamente">
-            <a:extLst>
-              <a:ext uri="{FF2B5EF4-FFF2-40B4-BE49-F238E27FC236}">
-                <a16:creationId xmlns:a16="http://schemas.microsoft.com/office/drawing/2014/main" id="{9FB24E0D-6FB9-03DD-E86D-CC648A1CE684}"/>
-              </a:ext>
-            </a:extLst>
-          </p:cNvPr>
-          <p:cNvPicPr>
-            <a:picLocks noChangeAspect="1"/>
-          </p:cNvPicPr>
-          <p:nvPr/>
-        </p:nvPicPr>
-        <p:blipFill rotWithShape="1">
-          <a:blip r:embed="rId5">
-            <a:extLst>
-              <a:ext uri="{BEBA8EAE-BF5A-486C-A8C5-ECC9F3942E4B}">
-                <a14:imgProps xmlns:a14="http://schemas.microsoft.com/office/drawing/2010/main">
-                  <a14:imgLayer r:embed="rId6">
-                    <a14:imgEffect>
-                      <a14:backgroundRemoval t="10000" b="90000" l="10000" r="90000">
-                        <a14:foregroundMark x1="46063" y1="12700" x2="47188" y2="12400"/>
-                        <a14:foregroundMark x1="42313" y1="14500" x2="42063" y2="16300"/>
-                        <a14:foregroundMark x1="52875" y1="14300" x2="53125" y2="14800"/>
-                        <a14:foregroundMark x1="58938" y1="13500" x2="58938" y2="15700"/>
-                      </a14:backgroundRemoval>
-                    </a14:imgEffect>
-                  </a14:imgLayer>
-                </a14:imgProps>
-              </a:ext>
-            </a:extLst>
-          </a:blip>
-          <a:srcRect l="22993" t="4258" r="25490" b="13317"/>
-          <a:stretch/>
-        </p:blipFill>
-        <p:spPr>
-          <a:xfrm>
-            <a:off x="5282295" y="1943100"/>
-            <a:ext cx="1729469" cy="1729469"/>
-          </a:xfrm>
-          <a:prstGeom prst="rect">
-            <a:avLst/>
-          </a:prstGeom>
-        </p:spPr>
-      </p:pic>
-      <p:pic>
-        <p:nvPicPr>
-          <p:cNvPr id="22" name="Imagem 21" descr="Uma imagem com logótipo, símbolo, design, Gráficos&#10;&#10;Descrição gerada automaticamente">
-            <a:extLst>
-              <a:ext uri="{FF2B5EF4-FFF2-40B4-BE49-F238E27FC236}">
-                <a16:creationId xmlns:a16="http://schemas.microsoft.com/office/drawing/2014/main" id="{FF220D31-1EB1-3986-1338-BE16F72102AD}"/>
-              </a:ext>
-            </a:extLst>
-          </p:cNvPr>
-          <p:cNvPicPr>
-            <a:picLocks noChangeAspect="1"/>
-          </p:cNvPicPr>
-          <p:nvPr/>
-        </p:nvPicPr>
-        <p:blipFill rotWithShape="1">
-          <a:blip r:embed="rId7">
-            <a:extLst>
-              <a:ext uri="{BEBA8EAE-BF5A-486C-A8C5-ECC9F3942E4B}">
-                <a14:imgProps xmlns:a14="http://schemas.microsoft.com/office/drawing/2010/main">
-                  <a14:imgLayer r:embed="rId8">
-                    <a14:imgEffect>
-                      <a14:backgroundRemoval t="10000" b="90000" l="10000" r="90000">
-                        <a14:foregroundMark x1="54852" y1="36287" x2="62447" y2="36709"/>
-                        <a14:foregroundMark x1="57384" y1="55907" x2="63502" y2="56118"/>
-                        <a14:foregroundMark x1="54641" y1="12658" x2="56118" y2="13924"/>
-                        <a14:foregroundMark x1="46835" y1="11392" x2="45992" y2="14135"/>
-                      </a14:backgroundRemoval>
-                    </a14:imgEffect>
-                  </a14:imgLayer>
-                </a14:imgProps>
-              </a:ext>
-            </a:extLst>
-          </a:blip>
-          <a:srcRect t="-243" r="4681" b="4923"/>
-          <a:stretch/>
-        </p:blipFill>
-        <p:spPr>
-          <a:xfrm>
-            <a:off x="7011764" y="1943100"/>
-            <a:ext cx="1729469" cy="1729469"/>
-          </a:xfrm>
-          <a:prstGeom prst="rect">
-            <a:avLst/>
-          </a:prstGeom>
-        </p:spPr>
-      </p:pic>
-      <p:pic>
-        <p:nvPicPr>
-          <p:cNvPr id="24" name="Imagem 23" descr="Uma imagem com desenho, texto, esboço, ilustração&#10;&#10;Descrição gerada automaticamente">
-            <a:extLst>
-              <a:ext uri="{FF2B5EF4-FFF2-40B4-BE49-F238E27FC236}">
-                <a16:creationId xmlns:a16="http://schemas.microsoft.com/office/drawing/2014/main" id="{511D8B16-8B9E-628C-23BB-CDF52DB39E38}"/>
-              </a:ext>
-            </a:extLst>
-          </p:cNvPr>
-          <p:cNvPicPr>
-            <a:picLocks noChangeAspect="1"/>
-          </p:cNvPicPr>
-          <p:nvPr/>
-        </p:nvPicPr>
-        <p:blipFill>
-          <a:blip r:embed="rId9">
-            <a:extLst>
-              <a:ext uri="{BEBA8EAE-BF5A-486C-A8C5-ECC9F3942E4B}">
-                <a14:imgProps xmlns:a14="http://schemas.microsoft.com/office/drawing/2010/main">
-                  <a14:imgLayer r:embed="rId10">
-                    <a14:imgEffect>
-                      <a14:backgroundRemoval t="6902" b="91483" l="10000" r="90000">
-                        <a14:foregroundMark x1="37674" y1="27166" x2="37907" y2="29809"/>
-                        <a14:foregroundMark x1="36047" y1="20705" x2="37674" y2="20117"/>
-                        <a14:foregroundMark x1="29535" y1="7048" x2="28953" y2="7342"/>
-                        <a14:foregroundMark x1="35233" y1="46549" x2="36628" y2="47430"/>
-                        <a14:foregroundMark x1="37326" y1="56828" x2="37326" y2="56828"/>
-                        <a14:foregroundMark x1="25465" y1="78561" x2="25000" y2="79883"/>
-                        <a14:foregroundMark x1="39186" y1="80323" x2="39419" y2="82526"/>
-                        <a14:foregroundMark x1="45000" y1="89868" x2="45233" y2="90896"/>
-                        <a14:foregroundMark x1="45233" y1="91483" x2="45233" y2="91483"/>
-                        <a14:foregroundMark x1="58605" y1="87518" x2="60233" y2="88399"/>
-                        <a14:foregroundMark x1="67791" y1="85022" x2="67674" y2="85903"/>
-                        <a14:foregroundMark x1="51628" y1="58590" x2="35814" y2="46843"/>
-                      </a14:backgroundRemoval>
-                    </a14:imgEffect>
-                  </a14:imgLayer>
-                </a14:imgProps>
-              </a:ext>
-            </a:extLst>
-          </a:blip>
-          <a:stretch>
-            <a:fillRect/>
-          </a:stretch>
-        </p:blipFill>
-        <p:spPr>
-          <a:xfrm>
-            <a:off x="8741232" y="2055358"/>
-            <a:ext cx="2042293" cy="1617211"/>
-          </a:xfrm>
-          <a:prstGeom prst="rect">
-            <a:avLst/>
-          </a:prstGeom>
-        </p:spPr>
-      </p:pic>
-      <p:sp>
-        <p:nvSpPr>
-          <p:cNvPr id="25" name="CaixaDeTexto 24">
-            <a:extLst>
-              <a:ext uri="{FF2B5EF4-FFF2-40B4-BE49-F238E27FC236}">
-                <a16:creationId xmlns:a16="http://schemas.microsoft.com/office/drawing/2014/main" id="{755E53B2-5520-6E8D-8CAB-B271D144BFA6}"/>
-              </a:ext>
-            </a:extLst>
-          </p:cNvPr>
-          <p:cNvSpPr txBox="1"/>
-          <p:nvPr/>
-        </p:nvSpPr>
-        <p:spPr>
-          <a:xfrm>
-            <a:off x="1379764" y="3780064"/>
-            <a:ext cx="9675090" cy="1477328"/>
-          </a:xfrm>
-          <a:prstGeom prst="rect">
-            <a:avLst/>
-          </a:prstGeom>
-          <a:noFill/>
-        </p:spPr>
-        <p:txBody>
-          <a:bodyPr wrap="square" rtlCol="0">
-            <a:spAutoFit/>
-          </a:bodyPr>
+        <p:txBody>
+          <a:bodyPr/>
           <a:lstStyle/>
           <a:p>
-            <a:pPr marL="285750" indent="-285750">
-              <a:buFont typeface="Arial" panose="020B0604020202020204" pitchFamily="34" charset="0"/>
-              <a:buChar char="•"/>
-            </a:pPr>
-            <a:r>
-              <a:rPr lang="pt-PT" dirty="0" err="1"/>
-              <a:t>Python</a:t>
-            </a:r>
             <a:r>
               <a:rPr lang="pt-PT" dirty="0"/>
-              <a:t> para linguagem principal do “</a:t>
-            </a:r>
-            <a:r>
-              <a:rPr lang="pt-PT" dirty="0" err="1"/>
-              <a:t>backend</a:t>
-            </a:r>
+              <a:t>Ampliação das oportunidades de negócio (stakeholders);</a:t>
+            </a:r>
+          </a:p>
+          <a:p>
             <a:r>
               <a:rPr lang="pt-PT" dirty="0"/>
-              <a:t>”</a:t>
-            </a:r>
-          </a:p>
-          <a:p>
-            <a:pPr marL="285750" indent="-285750">
-              <a:buFont typeface="Arial" panose="020B0604020202020204" pitchFamily="34" charset="0"/>
-              <a:buChar char="•"/>
-            </a:pPr>
-            <a:r>
-              <a:rPr lang="pt-PT" dirty="0" err="1"/>
-              <a:t>Flask</a:t>
-            </a:r>
+              <a:t>Promove a responsabilidade e o crescimento económico dos clientes (clientes);</a:t>
+            </a:r>
+          </a:p>
+          <a:p>
             <a:r>
               <a:rPr lang="pt-PT" dirty="0"/>
-              <a:t> como “</a:t>
-            </a:r>
-            <a:r>
-              <a:rPr lang="pt-PT" dirty="0" err="1"/>
-              <a:t>framework</a:t>
-            </a:r>
+              <a:t>Aumenta a exposição dos bancos parceiros (stakeholders); </a:t>
+            </a:r>
+          </a:p>
+          <a:p>
             <a:r>
               <a:rPr lang="pt-PT" dirty="0"/>
-              <a:t>” designada</a:t>
-            </a:r>
-          </a:p>
-          <a:p>
-            <a:pPr marL="285750" indent="-285750">
-              <a:buFont typeface="Arial" panose="020B0604020202020204" pitchFamily="34" charset="0"/>
-              <a:buChar char="•"/>
-            </a:pPr>
-            <a:r>
-              <a:rPr lang="pt-PT" dirty="0"/>
-              <a:t>HTML, CSS e JS como linguagem principal de “</a:t>
-            </a:r>
-            <a:r>
-              <a:rPr lang="pt-PT" dirty="0" err="1"/>
-              <a:t>frontend</a:t>
-            </a:r>
-            <a:r>
-              <a:rPr lang="pt-PT" dirty="0"/>
-              <a:t>”</a:t>
-            </a:r>
-          </a:p>
-          <a:p>
-            <a:pPr marL="285750" indent="-285750">
-              <a:buFont typeface="Arial" panose="020B0604020202020204" pitchFamily="34" charset="0"/>
-              <a:buChar char="•"/>
-            </a:pPr>
-            <a:r>
-              <a:rPr lang="pt-PT" dirty="0"/>
-              <a:t>CSV e JSON como formatos de dados, de forma a manter uma base de dados consistente </a:t>
-            </a:r>
-            <a:r>
-              <a:rPr lang="pt-PT"/>
-              <a:t>e adequada</a:t>
-            </a:r>
-            <a:endParaRPr lang="pt-PT" dirty="0"/>
+              <a:t>Acessibilidade e melhores condições nos créditos (clientes).</a:t>
+            </a:r>
           </a:p>
         </p:txBody>
       </p:sp>
     </p:spTree>
     <p:extLst>
       <p:ext uri="{BB962C8B-B14F-4D97-AF65-F5344CB8AC3E}">
-        <p14:creationId xmlns:p14="http://schemas.microsoft.com/office/powerpoint/2010/main" val="2855269777"/>
+        <p14:creationId xmlns:p14="http://schemas.microsoft.com/office/powerpoint/2010/main" val="1519722166"/>
       </p:ext>
     </p:extLst>
   </p:cSld>
@@ -9041,6 +8954,861 @@
 </file>
 
 <file path=ppt/slides/slide7.xml><?xml version="1.0" encoding="utf-8"?>
+<p:sld xmlns:a="http://schemas.openxmlformats.org/drawingml/2006/main" xmlns:r="http://schemas.openxmlformats.org/officeDocument/2006/relationships" xmlns:p="http://schemas.openxmlformats.org/presentationml/2006/main">
+  <p:cSld>
+    <p:spTree>
+      <p:nvGrpSpPr>
+        <p:cNvPr id="1" name=""/>
+        <p:cNvGrpSpPr/>
+        <p:nvPr/>
+      </p:nvGrpSpPr>
+      <p:grpSpPr>
+        <a:xfrm>
+          <a:off x="0" y="0"/>
+          <a:ext cx="0" cy="0"/>
+          <a:chOff x="0" y="0"/>
+          <a:chExt cx="0" cy="0"/>
+        </a:xfrm>
+      </p:grpSpPr>
+      <p:sp>
+        <p:nvSpPr>
+          <p:cNvPr id="2" name="Título 1">
+            <a:extLst>
+              <a:ext uri="{FF2B5EF4-FFF2-40B4-BE49-F238E27FC236}">
+                <a16:creationId xmlns:a16="http://schemas.microsoft.com/office/drawing/2014/main" id="{98A32DE6-6B29-7489-635B-950DAAB3B577}"/>
+              </a:ext>
+            </a:extLst>
+          </p:cNvPr>
+          <p:cNvSpPr>
+            <a:spLocks noGrp="1"/>
+          </p:cNvSpPr>
+          <p:nvPr>
+            <p:ph type="title"/>
+          </p:nvPr>
+        </p:nvSpPr>
+        <p:spPr/>
+        <p:txBody>
+          <a:bodyPr/>
+          <a:lstStyle/>
+          <a:p>
+            <a:pPr algn="ctr"/>
+            <a:r>
+              <a:rPr lang="pt-PT" dirty="0"/>
+              <a:t>Diferenças face a alternativas</a:t>
+            </a:r>
+          </a:p>
+        </p:txBody>
+      </p:sp>
+      <p:sp>
+        <p:nvSpPr>
+          <p:cNvPr id="7" name="Marcador de Posição de Conteúdo 6">
+            <a:extLst>
+              <a:ext uri="{FF2B5EF4-FFF2-40B4-BE49-F238E27FC236}">
+                <a16:creationId xmlns:a16="http://schemas.microsoft.com/office/drawing/2014/main" id="{4CDF2A1F-BDE4-7ECC-7CEB-42822AAE7A2D}"/>
+              </a:ext>
+            </a:extLst>
+          </p:cNvPr>
+          <p:cNvSpPr>
+            <a:spLocks noGrp="1"/>
+          </p:cNvSpPr>
+          <p:nvPr>
+            <p:ph idx="1"/>
+          </p:nvPr>
+        </p:nvSpPr>
+        <p:spPr>
+          <a:xfrm>
+            <a:off x="1451579" y="2106386"/>
+            <a:ext cx="9603275" cy="3359959"/>
+          </a:xfrm>
+        </p:spPr>
+        <p:txBody>
+          <a:bodyPr/>
+          <a:lstStyle/>
+          <a:p>
+            <a:r>
+              <a:rPr lang="pt-PT" dirty="0"/>
+              <a:t>Permite a exportação do extrato de outros bancos;</a:t>
+            </a:r>
+          </a:p>
+          <a:p>
+            <a:r>
+              <a:rPr lang="pt-PT" dirty="0"/>
+              <a:t>Promove o crescimento económico dos clientes, através do acompanhamento e análise dos extratos;</a:t>
+            </a:r>
+          </a:p>
+          <a:p>
+            <a:r>
+              <a:rPr lang="pt-PT" dirty="0"/>
+              <a:t>O calendário do cliente permite-lhe estar a par das suas obrigações financeiras, permitindo-lhe assim planear com antecedência as suas finanças.</a:t>
+            </a:r>
+          </a:p>
+        </p:txBody>
+      </p:sp>
+    </p:spTree>
+    <p:extLst>
+      <p:ext uri="{BB962C8B-B14F-4D97-AF65-F5344CB8AC3E}">
+        <p14:creationId xmlns:p14="http://schemas.microsoft.com/office/powerpoint/2010/main" val="2509704459"/>
+      </p:ext>
+    </p:extLst>
+  </p:cSld>
+  <p:clrMapOvr>
+    <a:masterClrMapping/>
+  </p:clrMapOvr>
+</p:sld>
+</file>
+
+<file path=ppt/slides/slide8.xml><?xml version="1.0" encoding="utf-8"?>
+<p:sld xmlns:a="http://schemas.openxmlformats.org/drawingml/2006/main" xmlns:r="http://schemas.openxmlformats.org/officeDocument/2006/relationships" xmlns:p="http://schemas.openxmlformats.org/presentationml/2006/main">
+  <p:cSld>
+    <p:spTree>
+      <p:nvGrpSpPr>
+        <p:cNvPr id="1" name=""/>
+        <p:cNvGrpSpPr/>
+        <p:nvPr/>
+      </p:nvGrpSpPr>
+      <p:grpSpPr>
+        <a:xfrm>
+          <a:off x="0" y="0"/>
+          <a:ext cx="0" cy="0"/>
+          <a:chOff x="0" y="0"/>
+          <a:chExt cx="0" cy="0"/>
+        </a:xfrm>
+      </p:grpSpPr>
+      <p:sp>
+        <p:nvSpPr>
+          <p:cNvPr id="2" name="Título 1">
+            <a:extLst>
+              <a:ext uri="{FF2B5EF4-FFF2-40B4-BE49-F238E27FC236}">
+                <a16:creationId xmlns:a16="http://schemas.microsoft.com/office/drawing/2014/main" id="{98A32DE6-6B29-7489-635B-950DAAB3B577}"/>
+              </a:ext>
+            </a:extLst>
+          </p:cNvPr>
+          <p:cNvSpPr>
+            <a:spLocks noGrp="1"/>
+          </p:cNvSpPr>
+          <p:nvPr>
+            <p:ph type="title"/>
+          </p:nvPr>
+        </p:nvSpPr>
+        <p:spPr/>
+        <p:txBody>
+          <a:bodyPr/>
+          <a:lstStyle/>
+          <a:p>
+            <a:pPr algn="ctr"/>
+            <a:r>
+              <a:rPr lang="pt-PT" dirty="0"/>
+              <a:t>Incremento Implementado</a:t>
+            </a:r>
+          </a:p>
+        </p:txBody>
+      </p:sp>
+      <p:sp>
+        <p:nvSpPr>
+          <p:cNvPr id="7" name="Marcador de Posição de Conteúdo 6">
+            <a:extLst>
+              <a:ext uri="{FF2B5EF4-FFF2-40B4-BE49-F238E27FC236}">
+                <a16:creationId xmlns:a16="http://schemas.microsoft.com/office/drawing/2014/main" id="{4CDF2A1F-BDE4-7ECC-7CEB-42822AAE7A2D}"/>
+              </a:ext>
+            </a:extLst>
+          </p:cNvPr>
+          <p:cNvSpPr>
+            <a:spLocks noGrp="1"/>
+          </p:cNvSpPr>
+          <p:nvPr>
+            <p:ph idx="1"/>
+          </p:nvPr>
+        </p:nvSpPr>
+        <p:spPr>
+          <a:xfrm>
+            <a:off x="2994630" y="2871108"/>
+            <a:ext cx="2916314" cy="2706816"/>
+          </a:xfrm>
+        </p:spPr>
+        <p:txBody>
+          <a:bodyPr/>
+          <a:lstStyle/>
+          <a:p>
+            <a:pPr marL="228600" indent="-228600" algn="l" rtl="0" eaLnBrk="1" latinLnBrk="0" hangingPunct="1">
+              <a:lnSpc>
+                <a:spcPct val="120000"/>
+              </a:lnSpc>
+              <a:spcBef>
+                <a:spcPts val="1000"/>
+              </a:spcBef>
+              <a:spcAft>
+                <a:spcPts val="0"/>
+              </a:spcAft>
+              <a:buClr>
+                <a:schemeClr val="accent1"/>
+              </a:buClr>
+              <a:buSzPct val="100000"/>
+              <a:buFont typeface="Arial" panose="020B0604020202020204" pitchFamily="34" charset="0"/>
+              <a:buChar char="•"/>
+            </a:pPr>
+            <a:r>
+              <a:rPr lang="pt-PT" sz="1800" kern="1200" dirty="0">
+                <a:solidFill>
+                  <a:srgbClr val="000000"/>
+                </a:solidFill>
+                <a:effectLst/>
+                <a:latin typeface="Gill Sans MT" panose="020B0502020104020203" pitchFamily="34" charset="0"/>
+                <a:ea typeface="+mn-ea"/>
+                <a:cs typeface="+mn-cs"/>
+              </a:rPr>
+              <a:t>Autenticação;</a:t>
+            </a:r>
+            <a:endParaRPr lang="pt-PT" sz="1800" dirty="0">
+              <a:effectLst/>
+            </a:endParaRPr>
+          </a:p>
+          <a:p>
+            <a:pPr marL="228600" indent="-228600" algn="l" rtl="0" eaLnBrk="1" latinLnBrk="0" hangingPunct="1">
+              <a:lnSpc>
+                <a:spcPct val="120000"/>
+              </a:lnSpc>
+              <a:spcBef>
+                <a:spcPts val="1000"/>
+              </a:spcBef>
+              <a:spcAft>
+                <a:spcPts val="0"/>
+              </a:spcAft>
+            </a:pPr>
+            <a:r>
+              <a:rPr lang="pt-PT" sz="1800" kern="1200" dirty="0">
+                <a:solidFill>
+                  <a:srgbClr val="000000"/>
+                </a:solidFill>
+                <a:effectLst/>
+                <a:latin typeface="Gill Sans MT" panose="020B0502020104020203" pitchFamily="34" charset="0"/>
+                <a:ea typeface="+mn-ea"/>
+                <a:cs typeface="+mn-cs"/>
+              </a:rPr>
+              <a:t>Personalização;</a:t>
+            </a:r>
+            <a:endParaRPr lang="pt-PT" dirty="0">
+              <a:effectLst/>
+            </a:endParaRPr>
+          </a:p>
+          <a:p>
+            <a:pPr marL="228600" indent="-228600" algn="l" rtl="0" eaLnBrk="1" latinLnBrk="0" hangingPunct="1">
+              <a:lnSpc>
+                <a:spcPct val="120000"/>
+              </a:lnSpc>
+              <a:spcBef>
+                <a:spcPts val="1000"/>
+              </a:spcBef>
+              <a:spcAft>
+                <a:spcPts val="0"/>
+              </a:spcAft>
+            </a:pPr>
+            <a:r>
+              <a:rPr lang="pt-PT" sz="1800" kern="1200" dirty="0">
+                <a:solidFill>
+                  <a:srgbClr val="000000"/>
+                </a:solidFill>
+                <a:effectLst/>
+                <a:latin typeface="Gill Sans MT" panose="020B0502020104020203" pitchFamily="34" charset="0"/>
+                <a:ea typeface="+mn-ea"/>
+                <a:cs typeface="+mn-cs"/>
+              </a:rPr>
+              <a:t>Depósito e Levantamento;</a:t>
+            </a:r>
+            <a:endParaRPr lang="pt-PT" dirty="0">
+              <a:effectLst/>
+            </a:endParaRPr>
+          </a:p>
+          <a:p>
+            <a:pPr marL="228600" indent="-228600" algn="l" rtl="0" eaLnBrk="1" latinLnBrk="0" hangingPunct="1">
+              <a:lnSpc>
+                <a:spcPct val="120000"/>
+              </a:lnSpc>
+              <a:spcBef>
+                <a:spcPts val="1000"/>
+              </a:spcBef>
+              <a:spcAft>
+                <a:spcPts val="0"/>
+              </a:spcAft>
+            </a:pPr>
+            <a:r>
+              <a:rPr lang="pt-PT" sz="1800" kern="1200" dirty="0">
+                <a:solidFill>
+                  <a:srgbClr val="000000"/>
+                </a:solidFill>
+                <a:effectLst/>
+                <a:latin typeface="Gill Sans MT" panose="020B0502020104020203" pitchFamily="34" charset="0"/>
+                <a:ea typeface="+mn-ea"/>
+                <a:cs typeface="+mn-cs"/>
+              </a:rPr>
+              <a:t>Calendário.</a:t>
+            </a:r>
+            <a:endParaRPr lang="pt-PT" dirty="0">
+              <a:effectLst/>
+            </a:endParaRPr>
+          </a:p>
+          <a:p>
+            <a:endParaRPr lang="pt-PT" dirty="0"/>
+          </a:p>
+        </p:txBody>
+      </p:sp>
+      <p:sp>
+        <p:nvSpPr>
+          <p:cNvPr id="3" name="Marcador de Posição de Conteúdo 6">
+            <a:extLst>
+              <a:ext uri="{FF2B5EF4-FFF2-40B4-BE49-F238E27FC236}">
+                <a16:creationId xmlns:a16="http://schemas.microsoft.com/office/drawing/2014/main" id="{BF09446D-C6D8-006A-8A01-D7A4D8A7B490}"/>
+              </a:ext>
+            </a:extLst>
+          </p:cNvPr>
+          <p:cNvSpPr txBox="1">
+            <a:spLocks/>
+          </p:cNvSpPr>
+          <p:nvPr/>
+        </p:nvSpPr>
+        <p:spPr>
+          <a:xfrm>
+            <a:off x="1603979" y="2258786"/>
+            <a:ext cx="9603275" cy="500743"/>
+          </a:xfrm>
+          <a:prstGeom prst="rect">
+            <a:avLst/>
+          </a:prstGeom>
+        </p:spPr>
+        <p:txBody>
+          <a:bodyPr vert="horz" lIns="91440" tIns="45720" rIns="91440" bIns="45720" rtlCol="0" anchor="t">
+            <a:normAutofit/>
+          </a:bodyPr>
+          <a:lstStyle>
+            <a:lvl1pPr marL="228600" indent="-228600" algn="l" defTabSz="914400" rtl="0" eaLnBrk="1" latinLnBrk="0" hangingPunct="1">
+              <a:lnSpc>
+                <a:spcPct val="120000"/>
+              </a:lnSpc>
+              <a:spcBef>
+                <a:spcPts val="1000"/>
+              </a:spcBef>
+              <a:buClr>
+                <a:schemeClr val="accent1"/>
+              </a:buClr>
+              <a:buSzPct val="100000"/>
+              <a:buFont typeface="Arial" panose="020B0604020202020204" pitchFamily="34" charset="0"/>
+              <a:buChar char="•"/>
+              <a:defRPr sz="2000" kern="1200">
+                <a:solidFill>
+                  <a:schemeClr val="tx1"/>
+                </a:solidFill>
+                <a:effectLst/>
+                <a:latin typeface="+mn-lt"/>
+                <a:ea typeface="+mn-ea"/>
+                <a:cs typeface="+mn-cs"/>
+              </a:defRPr>
+            </a:lvl1pPr>
+            <a:lvl2pPr marL="685800" indent="-228600" algn="l" defTabSz="914400" rtl="0" eaLnBrk="1" latinLnBrk="0" hangingPunct="1">
+              <a:lnSpc>
+                <a:spcPct val="120000"/>
+              </a:lnSpc>
+              <a:spcBef>
+                <a:spcPts val="500"/>
+              </a:spcBef>
+              <a:buClr>
+                <a:schemeClr val="accent1"/>
+              </a:buClr>
+              <a:buSzPct val="100000"/>
+              <a:buFont typeface="Arial" panose="020B0604020202020204" pitchFamily="34" charset="0"/>
+              <a:buChar char="•"/>
+              <a:defRPr sz="1800" kern="1200" cap="none" baseline="0">
+                <a:solidFill>
+                  <a:schemeClr val="tx1"/>
+                </a:solidFill>
+                <a:effectLst/>
+                <a:latin typeface="+mn-lt"/>
+                <a:ea typeface="+mn-ea"/>
+                <a:cs typeface="+mn-cs"/>
+              </a:defRPr>
+            </a:lvl2pPr>
+            <a:lvl3pPr marL="1143000" indent="-228600" algn="l" defTabSz="914400" rtl="0" eaLnBrk="1" latinLnBrk="0" hangingPunct="1">
+              <a:lnSpc>
+                <a:spcPct val="120000"/>
+              </a:lnSpc>
+              <a:spcBef>
+                <a:spcPts val="500"/>
+              </a:spcBef>
+              <a:buClr>
+                <a:schemeClr val="accent1"/>
+              </a:buClr>
+              <a:buSzPct val="100000"/>
+              <a:buFont typeface="Arial" panose="020B0604020202020204" pitchFamily="34" charset="0"/>
+              <a:buChar char="•"/>
+              <a:defRPr sz="1600" kern="1200">
+                <a:solidFill>
+                  <a:schemeClr val="tx1"/>
+                </a:solidFill>
+                <a:effectLst/>
+                <a:latin typeface="+mn-lt"/>
+                <a:ea typeface="+mn-ea"/>
+                <a:cs typeface="+mn-cs"/>
+              </a:defRPr>
+            </a:lvl3pPr>
+            <a:lvl4pPr marL="1600200" indent="-228600" algn="l" defTabSz="914400" rtl="0" eaLnBrk="1" latinLnBrk="0" hangingPunct="1">
+              <a:lnSpc>
+                <a:spcPct val="120000"/>
+              </a:lnSpc>
+              <a:spcBef>
+                <a:spcPts val="500"/>
+              </a:spcBef>
+              <a:buClr>
+                <a:schemeClr val="accent1"/>
+              </a:buClr>
+              <a:buSzPct val="100000"/>
+              <a:buFont typeface="Arial" panose="020B0604020202020204" pitchFamily="34" charset="0"/>
+              <a:buChar char="•"/>
+              <a:defRPr sz="1400" kern="1200" cap="none" baseline="0">
+                <a:solidFill>
+                  <a:schemeClr val="tx1"/>
+                </a:solidFill>
+                <a:effectLst/>
+                <a:latin typeface="+mn-lt"/>
+                <a:ea typeface="+mn-ea"/>
+                <a:cs typeface="+mn-cs"/>
+              </a:defRPr>
+            </a:lvl4pPr>
+            <a:lvl5pPr marL="2057400" indent="-228600" algn="l" defTabSz="914400" rtl="0" eaLnBrk="1" latinLnBrk="0" hangingPunct="1">
+              <a:lnSpc>
+                <a:spcPct val="120000"/>
+              </a:lnSpc>
+              <a:spcBef>
+                <a:spcPts val="500"/>
+              </a:spcBef>
+              <a:buClr>
+                <a:schemeClr val="accent1"/>
+              </a:buClr>
+              <a:buSzPct val="100000"/>
+              <a:buFont typeface="Arial" panose="020B0604020202020204" pitchFamily="34" charset="0"/>
+              <a:buChar char="•"/>
+              <a:defRPr sz="1200" kern="1200">
+                <a:solidFill>
+                  <a:schemeClr val="tx1"/>
+                </a:solidFill>
+                <a:effectLst/>
+                <a:latin typeface="+mn-lt"/>
+                <a:ea typeface="+mn-ea"/>
+                <a:cs typeface="+mn-cs"/>
+              </a:defRPr>
+            </a:lvl5pPr>
+            <a:lvl6pPr marL="2514600" indent="-228600" algn="l" defTabSz="914400" rtl="0" eaLnBrk="1" latinLnBrk="0" hangingPunct="1">
+              <a:lnSpc>
+                <a:spcPct val="120000"/>
+              </a:lnSpc>
+              <a:spcBef>
+                <a:spcPts val="500"/>
+              </a:spcBef>
+              <a:buClr>
+                <a:schemeClr val="accent1"/>
+              </a:buClr>
+              <a:buSzPct val="100000"/>
+              <a:buFont typeface="Arial" panose="020B0604020202020204" pitchFamily="34" charset="0"/>
+              <a:buChar char="•"/>
+              <a:defRPr sz="1200" kern="1200">
+                <a:solidFill>
+                  <a:schemeClr val="tx1"/>
+                </a:solidFill>
+                <a:effectLst/>
+                <a:latin typeface="+mn-lt"/>
+                <a:ea typeface="+mn-ea"/>
+                <a:cs typeface="+mn-cs"/>
+              </a:defRPr>
+            </a:lvl6pPr>
+            <a:lvl7pPr marL="2971800" indent="-228600" algn="l" defTabSz="914400" rtl="0" eaLnBrk="1" latinLnBrk="0" hangingPunct="1">
+              <a:lnSpc>
+                <a:spcPct val="120000"/>
+              </a:lnSpc>
+              <a:spcBef>
+                <a:spcPts val="500"/>
+              </a:spcBef>
+              <a:buClr>
+                <a:schemeClr val="accent1"/>
+              </a:buClr>
+              <a:buSzPct val="100000"/>
+              <a:buFont typeface="Arial" panose="020B0604020202020204" pitchFamily="34" charset="0"/>
+              <a:buChar char="•"/>
+              <a:defRPr sz="1200" kern="1200">
+                <a:solidFill>
+                  <a:schemeClr val="tx1"/>
+                </a:solidFill>
+                <a:effectLst/>
+                <a:latin typeface="+mn-lt"/>
+                <a:ea typeface="+mn-ea"/>
+                <a:cs typeface="+mn-cs"/>
+              </a:defRPr>
+            </a:lvl7pPr>
+            <a:lvl8pPr marL="3429000" indent="-228600" algn="l" defTabSz="914400" rtl="0" eaLnBrk="1" latinLnBrk="0" hangingPunct="1">
+              <a:lnSpc>
+                <a:spcPct val="120000"/>
+              </a:lnSpc>
+              <a:spcBef>
+                <a:spcPts val="500"/>
+              </a:spcBef>
+              <a:buClr>
+                <a:schemeClr val="accent1"/>
+              </a:buClr>
+              <a:buSzPct val="100000"/>
+              <a:buFont typeface="Arial" panose="020B0604020202020204" pitchFamily="34" charset="0"/>
+              <a:buChar char="•"/>
+              <a:defRPr sz="1200" kern="1200" baseline="0">
+                <a:solidFill>
+                  <a:schemeClr val="tx1"/>
+                </a:solidFill>
+                <a:effectLst/>
+                <a:latin typeface="+mn-lt"/>
+                <a:ea typeface="+mn-ea"/>
+                <a:cs typeface="+mn-cs"/>
+              </a:defRPr>
+            </a:lvl8pPr>
+            <a:lvl9pPr marL="3886200" indent="-228600" algn="l" defTabSz="914400" rtl="0" eaLnBrk="1" latinLnBrk="0" hangingPunct="1">
+              <a:lnSpc>
+                <a:spcPct val="120000"/>
+              </a:lnSpc>
+              <a:spcBef>
+                <a:spcPts val="500"/>
+              </a:spcBef>
+              <a:buClr>
+                <a:schemeClr val="accent1"/>
+              </a:buClr>
+              <a:buSzPct val="100000"/>
+              <a:buFont typeface="Arial" panose="020B0604020202020204" pitchFamily="34" charset="0"/>
+              <a:buChar char="•"/>
+              <a:defRPr sz="1200" kern="1200" baseline="0">
+                <a:solidFill>
+                  <a:schemeClr val="tx1"/>
+                </a:solidFill>
+                <a:effectLst/>
+                <a:latin typeface="+mn-lt"/>
+                <a:ea typeface="+mn-ea"/>
+                <a:cs typeface="+mn-cs"/>
+              </a:defRPr>
+            </a:lvl9pPr>
+          </a:lstStyle>
+          <a:p>
+            <a:r>
+              <a:rPr lang="pt-PT" dirty="0"/>
+              <a:t>Todas as partes do sistema foram implementadas;</a:t>
+            </a:r>
+          </a:p>
+        </p:txBody>
+      </p:sp>
+      <p:sp>
+        <p:nvSpPr>
+          <p:cNvPr id="5" name="Marcador de Posição de Conteúdo 6">
+            <a:extLst>
+              <a:ext uri="{FF2B5EF4-FFF2-40B4-BE49-F238E27FC236}">
+                <a16:creationId xmlns:a16="http://schemas.microsoft.com/office/drawing/2014/main" id="{2AF94BD6-0FDD-D65A-10FD-994322D200A9}"/>
+              </a:ext>
+            </a:extLst>
+          </p:cNvPr>
+          <p:cNvSpPr txBox="1">
+            <a:spLocks/>
+          </p:cNvSpPr>
+          <p:nvPr/>
+        </p:nvSpPr>
+        <p:spPr>
+          <a:xfrm>
+            <a:off x="6096000" y="2871108"/>
+            <a:ext cx="2916314" cy="2706816"/>
+          </a:xfrm>
+          <a:prstGeom prst="rect">
+            <a:avLst/>
+          </a:prstGeom>
+        </p:spPr>
+        <p:txBody>
+          <a:bodyPr vert="horz" lIns="91440" tIns="45720" rIns="91440" bIns="45720" rtlCol="0" anchor="t">
+            <a:normAutofit/>
+          </a:bodyPr>
+          <a:lstStyle>
+            <a:lvl1pPr marL="228600" indent="-228600" algn="l" defTabSz="914400" rtl="0" eaLnBrk="1" latinLnBrk="0" hangingPunct="1">
+              <a:lnSpc>
+                <a:spcPct val="120000"/>
+              </a:lnSpc>
+              <a:spcBef>
+                <a:spcPts val="1000"/>
+              </a:spcBef>
+              <a:buClr>
+                <a:schemeClr val="accent1"/>
+              </a:buClr>
+              <a:buSzPct val="100000"/>
+              <a:buFont typeface="Arial" panose="020B0604020202020204" pitchFamily="34" charset="0"/>
+              <a:buChar char="•"/>
+              <a:defRPr sz="2000" kern="1200">
+                <a:solidFill>
+                  <a:schemeClr val="tx1"/>
+                </a:solidFill>
+                <a:effectLst/>
+                <a:latin typeface="+mn-lt"/>
+                <a:ea typeface="+mn-ea"/>
+                <a:cs typeface="+mn-cs"/>
+              </a:defRPr>
+            </a:lvl1pPr>
+            <a:lvl2pPr marL="685800" indent="-228600" algn="l" defTabSz="914400" rtl="0" eaLnBrk="1" latinLnBrk="0" hangingPunct="1">
+              <a:lnSpc>
+                <a:spcPct val="120000"/>
+              </a:lnSpc>
+              <a:spcBef>
+                <a:spcPts val="500"/>
+              </a:spcBef>
+              <a:buClr>
+                <a:schemeClr val="accent1"/>
+              </a:buClr>
+              <a:buSzPct val="100000"/>
+              <a:buFont typeface="Arial" panose="020B0604020202020204" pitchFamily="34" charset="0"/>
+              <a:buChar char="•"/>
+              <a:defRPr sz="1800" kern="1200" cap="none" baseline="0">
+                <a:solidFill>
+                  <a:schemeClr val="tx1"/>
+                </a:solidFill>
+                <a:effectLst/>
+                <a:latin typeface="+mn-lt"/>
+                <a:ea typeface="+mn-ea"/>
+                <a:cs typeface="+mn-cs"/>
+              </a:defRPr>
+            </a:lvl2pPr>
+            <a:lvl3pPr marL="1143000" indent="-228600" algn="l" defTabSz="914400" rtl="0" eaLnBrk="1" latinLnBrk="0" hangingPunct="1">
+              <a:lnSpc>
+                <a:spcPct val="120000"/>
+              </a:lnSpc>
+              <a:spcBef>
+                <a:spcPts val="500"/>
+              </a:spcBef>
+              <a:buClr>
+                <a:schemeClr val="accent1"/>
+              </a:buClr>
+              <a:buSzPct val="100000"/>
+              <a:buFont typeface="Arial" panose="020B0604020202020204" pitchFamily="34" charset="0"/>
+              <a:buChar char="•"/>
+              <a:defRPr sz="1600" kern="1200">
+                <a:solidFill>
+                  <a:schemeClr val="tx1"/>
+                </a:solidFill>
+                <a:effectLst/>
+                <a:latin typeface="+mn-lt"/>
+                <a:ea typeface="+mn-ea"/>
+                <a:cs typeface="+mn-cs"/>
+              </a:defRPr>
+            </a:lvl3pPr>
+            <a:lvl4pPr marL="1600200" indent="-228600" algn="l" defTabSz="914400" rtl="0" eaLnBrk="1" latinLnBrk="0" hangingPunct="1">
+              <a:lnSpc>
+                <a:spcPct val="120000"/>
+              </a:lnSpc>
+              <a:spcBef>
+                <a:spcPts val="500"/>
+              </a:spcBef>
+              <a:buClr>
+                <a:schemeClr val="accent1"/>
+              </a:buClr>
+              <a:buSzPct val="100000"/>
+              <a:buFont typeface="Arial" panose="020B0604020202020204" pitchFamily="34" charset="0"/>
+              <a:buChar char="•"/>
+              <a:defRPr sz="1400" kern="1200" cap="none" baseline="0">
+                <a:solidFill>
+                  <a:schemeClr val="tx1"/>
+                </a:solidFill>
+                <a:effectLst/>
+                <a:latin typeface="+mn-lt"/>
+                <a:ea typeface="+mn-ea"/>
+                <a:cs typeface="+mn-cs"/>
+              </a:defRPr>
+            </a:lvl4pPr>
+            <a:lvl5pPr marL="2057400" indent="-228600" algn="l" defTabSz="914400" rtl="0" eaLnBrk="1" latinLnBrk="0" hangingPunct="1">
+              <a:lnSpc>
+                <a:spcPct val="120000"/>
+              </a:lnSpc>
+              <a:spcBef>
+                <a:spcPts val="500"/>
+              </a:spcBef>
+              <a:buClr>
+                <a:schemeClr val="accent1"/>
+              </a:buClr>
+              <a:buSzPct val="100000"/>
+              <a:buFont typeface="Arial" panose="020B0604020202020204" pitchFamily="34" charset="0"/>
+              <a:buChar char="•"/>
+              <a:defRPr sz="1200" kern="1200">
+                <a:solidFill>
+                  <a:schemeClr val="tx1"/>
+                </a:solidFill>
+                <a:effectLst/>
+                <a:latin typeface="+mn-lt"/>
+                <a:ea typeface="+mn-ea"/>
+                <a:cs typeface="+mn-cs"/>
+              </a:defRPr>
+            </a:lvl5pPr>
+            <a:lvl6pPr marL="2514600" indent="-228600" algn="l" defTabSz="914400" rtl="0" eaLnBrk="1" latinLnBrk="0" hangingPunct="1">
+              <a:lnSpc>
+                <a:spcPct val="120000"/>
+              </a:lnSpc>
+              <a:spcBef>
+                <a:spcPts val="500"/>
+              </a:spcBef>
+              <a:buClr>
+                <a:schemeClr val="accent1"/>
+              </a:buClr>
+              <a:buSzPct val="100000"/>
+              <a:buFont typeface="Arial" panose="020B0604020202020204" pitchFamily="34" charset="0"/>
+              <a:buChar char="•"/>
+              <a:defRPr sz="1200" kern="1200">
+                <a:solidFill>
+                  <a:schemeClr val="tx1"/>
+                </a:solidFill>
+                <a:effectLst/>
+                <a:latin typeface="+mn-lt"/>
+                <a:ea typeface="+mn-ea"/>
+                <a:cs typeface="+mn-cs"/>
+              </a:defRPr>
+            </a:lvl6pPr>
+            <a:lvl7pPr marL="2971800" indent="-228600" algn="l" defTabSz="914400" rtl="0" eaLnBrk="1" latinLnBrk="0" hangingPunct="1">
+              <a:lnSpc>
+                <a:spcPct val="120000"/>
+              </a:lnSpc>
+              <a:spcBef>
+                <a:spcPts val="500"/>
+              </a:spcBef>
+              <a:buClr>
+                <a:schemeClr val="accent1"/>
+              </a:buClr>
+              <a:buSzPct val="100000"/>
+              <a:buFont typeface="Arial" panose="020B0604020202020204" pitchFamily="34" charset="0"/>
+              <a:buChar char="•"/>
+              <a:defRPr sz="1200" kern="1200">
+                <a:solidFill>
+                  <a:schemeClr val="tx1"/>
+                </a:solidFill>
+                <a:effectLst/>
+                <a:latin typeface="+mn-lt"/>
+                <a:ea typeface="+mn-ea"/>
+                <a:cs typeface="+mn-cs"/>
+              </a:defRPr>
+            </a:lvl7pPr>
+            <a:lvl8pPr marL="3429000" indent="-228600" algn="l" defTabSz="914400" rtl="0" eaLnBrk="1" latinLnBrk="0" hangingPunct="1">
+              <a:lnSpc>
+                <a:spcPct val="120000"/>
+              </a:lnSpc>
+              <a:spcBef>
+                <a:spcPts val="500"/>
+              </a:spcBef>
+              <a:buClr>
+                <a:schemeClr val="accent1"/>
+              </a:buClr>
+              <a:buSzPct val="100000"/>
+              <a:buFont typeface="Arial" panose="020B0604020202020204" pitchFamily="34" charset="0"/>
+              <a:buChar char="•"/>
+              <a:defRPr sz="1200" kern="1200" baseline="0">
+                <a:solidFill>
+                  <a:schemeClr val="tx1"/>
+                </a:solidFill>
+                <a:effectLst/>
+                <a:latin typeface="+mn-lt"/>
+                <a:ea typeface="+mn-ea"/>
+                <a:cs typeface="+mn-cs"/>
+              </a:defRPr>
+            </a:lvl8pPr>
+            <a:lvl9pPr marL="3886200" indent="-228600" algn="l" defTabSz="914400" rtl="0" eaLnBrk="1" latinLnBrk="0" hangingPunct="1">
+              <a:lnSpc>
+                <a:spcPct val="120000"/>
+              </a:lnSpc>
+              <a:spcBef>
+                <a:spcPts val="500"/>
+              </a:spcBef>
+              <a:buClr>
+                <a:schemeClr val="accent1"/>
+              </a:buClr>
+              <a:buSzPct val="100000"/>
+              <a:buFont typeface="Arial" panose="020B0604020202020204" pitchFamily="34" charset="0"/>
+              <a:buChar char="•"/>
+              <a:defRPr sz="1200" kern="1200" baseline="0">
+                <a:solidFill>
+                  <a:schemeClr val="tx1"/>
+                </a:solidFill>
+                <a:effectLst/>
+                <a:latin typeface="+mn-lt"/>
+                <a:ea typeface="+mn-ea"/>
+                <a:cs typeface="+mn-cs"/>
+              </a:defRPr>
+            </a:lvl9pPr>
+          </a:lstStyle>
+          <a:p>
+            <a:r>
+              <a:rPr lang="pt-PT" sz="1800" kern="1200" dirty="0">
+                <a:solidFill>
+                  <a:srgbClr val="000000"/>
+                </a:solidFill>
+                <a:effectLst/>
+                <a:latin typeface="Gill Sans MT" panose="020B0502020104020203" pitchFamily="34" charset="0"/>
+                <a:ea typeface="+mn-ea"/>
+                <a:cs typeface="+mn-cs"/>
+              </a:rPr>
+              <a:t>Importação de Extrato;</a:t>
+            </a:r>
+          </a:p>
+          <a:p>
+            <a:r>
+              <a:rPr lang="pt-PT" sz="1800" kern="1200" dirty="0">
+                <a:solidFill>
+                  <a:srgbClr val="000000"/>
+                </a:solidFill>
+                <a:effectLst/>
+                <a:latin typeface="Gill Sans MT" panose="020B0502020104020203" pitchFamily="34" charset="0"/>
+                <a:ea typeface="+mn-ea"/>
+                <a:cs typeface="+mn-cs"/>
+              </a:rPr>
+              <a:t>Análise de Extrato;</a:t>
+            </a:r>
+          </a:p>
+          <a:p>
+            <a:r>
+              <a:rPr lang="pt-PT" sz="1800" kern="1200" dirty="0">
+                <a:solidFill>
+                  <a:srgbClr val="000000"/>
+                </a:solidFill>
+                <a:effectLst/>
+                <a:latin typeface="Gill Sans MT" panose="020B0502020104020203" pitchFamily="34" charset="0"/>
+                <a:ea typeface="+mn-ea"/>
+                <a:cs typeface="+mn-cs"/>
+              </a:rPr>
+              <a:t>Relatórios Económicos;</a:t>
+            </a:r>
+          </a:p>
+          <a:p>
+            <a:r>
+              <a:rPr lang="pt-PT" sz="1800" kern="1200" dirty="0">
+                <a:solidFill>
+                  <a:srgbClr val="000000"/>
+                </a:solidFill>
+                <a:effectLst/>
+                <a:latin typeface="Gill Sans MT" panose="020B0502020104020203" pitchFamily="34" charset="0"/>
+                <a:ea typeface="+mn-ea"/>
+                <a:cs typeface="+mn-cs"/>
+              </a:rPr>
+              <a:t>Chat.</a:t>
+            </a:r>
+            <a:endParaRPr lang="pt-PT" sz="1800" dirty="0">
+              <a:effectLst/>
+            </a:endParaRPr>
+          </a:p>
+          <a:p>
+            <a:endParaRPr lang="pt-PT" dirty="0"/>
+          </a:p>
+        </p:txBody>
+      </p:sp>
+    </p:spTree>
+    <p:extLst>
+      <p:ext uri="{BB962C8B-B14F-4D97-AF65-F5344CB8AC3E}">
+        <p14:creationId xmlns:p14="http://schemas.microsoft.com/office/powerpoint/2010/main" val="4192160152"/>
+      </p:ext>
+    </p:extLst>
+  </p:cSld>
+  <p:clrMapOvr>
+    <a:masterClrMapping/>
+  </p:clrMapOvr>
+</p:sld>
+</file>
+
+<file path=ppt/slides/slide9.xml><?xml version="1.0" encoding="utf-8"?>
 <p:sld xmlns:a="http://schemas.openxmlformats.org/drawingml/2006/main" xmlns:r="http://schemas.openxmlformats.org/officeDocument/2006/relationships" xmlns:p="http://schemas.openxmlformats.org/presentationml/2006/main">
   <p:cSld>
     <p:bg>
@@ -9431,7 +10199,7 @@
                   <a:srgbClr val="FFFFFE"/>
                 </a:solidFill>
               </a:rPr>
-              <a:t>Vista lógica</a:t>
+              <a:t>Gestão do Trabalho e lições aprendidas</a:t>
             </a:r>
           </a:p>
         </p:txBody>
@@ -9488,552 +10256,6 @@
     <p:extLst>
       <p:ext uri="{BB962C8B-B14F-4D97-AF65-F5344CB8AC3E}">
         <p14:creationId xmlns:p14="http://schemas.microsoft.com/office/powerpoint/2010/main" val="1850968765"/>
-      </p:ext>
-    </p:extLst>
-  </p:cSld>
-  <p:clrMapOvr>
-    <a:masterClrMapping/>
-  </p:clrMapOvr>
-</p:sld>
-</file>
-
-<file path=ppt/slides/slide8.xml><?xml version="1.0" encoding="utf-8"?>
-<p:sld xmlns:a="http://schemas.openxmlformats.org/drawingml/2006/main" xmlns:r="http://schemas.openxmlformats.org/officeDocument/2006/relationships" xmlns:p="http://schemas.openxmlformats.org/presentationml/2006/main">
-  <p:cSld>
-    <p:spTree>
-      <p:nvGrpSpPr>
-        <p:cNvPr id="1" name=""/>
-        <p:cNvGrpSpPr/>
-        <p:nvPr/>
-      </p:nvGrpSpPr>
-      <p:grpSpPr>
-        <a:xfrm>
-          <a:off x="0" y="0"/>
-          <a:ext cx="0" cy="0"/>
-          <a:chOff x="0" y="0"/>
-          <a:chExt cx="0" cy="0"/>
-        </a:xfrm>
-      </p:grpSpPr>
-      <p:sp>
-        <p:nvSpPr>
-          <p:cNvPr id="2" name="Título 1">
-            <a:extLst>
-              <a:ext uri="{FF2B5EF4-FFF2-40B4-BE49-F238E27FC236}">
-                <a16:creationId xmlns:a16="http://schemas.microsoft.com/office/drawing/2014/main" id="{931451AD-4895-B705-D9DD-AE4EECD87102}"/>
-              </a:ext>
-            </a:extLst>
-          </p:cNvPr>
-          <p:cNvSpPr>
-            <a:spLocks noGrp="1"/>
-          </p:cNvSpPr>
-          <p:nvPr>
-            <p:ph type="title"/>
-          </p:nvPr>
-        </p:nvSpPr>
-        <p:spPr/>
-        <p:txBody>
-          <a:bodyPr/>
-          <a:lstStyle/>
-          <a:p>
-            <a:pPr algn="ctr"/>
-            <a:r>
-              <a:rPr lang="pt-PT" dirty="0"/>
-              <a:t>Vista lógica</a:t>
-            </a:r>
-          </a:p>
-        </p:txBody>
-      </p:sp>
-      <p:pic>
-        <p:nvPicPr>
-          <p:cNvPr id="9" name="Imagem 8" descr="Uma imagem com texto, diagrama, captura de ecrã, Paralelo&#10;&#10;Descrição gerada automaticamente">
-            <a:extLst>
-              <a:ext uri="{FF2B5EF4-FFF2-40B4-BE49-F238E27FC236}">
-                <a16:creationId xmlns:a16="http://schemas.microsoft.com/office/drawing/2014/main" id="{00C5EE42-8150-CB92-B759-B505AD943BCD}"/>
-              </a:ext>
-            </a:extLst>
-          </p:cNvPr>
-          <p:cNvPicPr>
-            <a:picLocks noChangeAspect="1"/>
-          </p:cNvPicPr>
-          <p:nvPr/>
-        </p:nvPicPr>
-        <p:blipFill>
-          <a:blip r:embed="rId2"/>
-          <a:stretch>
-            <a:fillRect/>
-          </a:stretch>
-        </p:blipFill>
-        <p:spPr>
-          <a:xfrm>
-            <a:off x="3755801" y="1948843"/>
-            <a:ext cx="4680397" cy="4081114"/>
-          </a:xfrm>
-          <a:prstGeom prst="rect">
-            <a:avLst/>
-          </a:prstGeom>
-        </p:spPr>
-      </p:pic>
-    </p:spTree>
-    <p:extLst>
-      <p:ext uri="{BB962C8B-B14F-4D97-AF65-F5344CB8AC3E}">
-        <p14:creationId xmlns:p14="http://schemas.microsoft.com/office/powerpoint/2010/main" val="1489756019"/>
-      </p:ext>
-    </p:extLst>
-  </p:cSld>
-  <p:clrMapOvr>
-    <a:masterClrMapping/>
-  </p:clrMapOvr>
-</p:sld>
-</file>
-
-<file path=ppt/slides/slide9.xml><?xml version="1.0" encoding="utf-8"?>
-<p:sld xmlns:a="http://schemas.openxmlformats.org/drawingml/2006/main" xmlns:r="http://schemas.openxmlformats.org/officeDocument/2006/relationships" xmlns:p="http://schemas.openxmlformats.org/presentationml/2006/main">
-  <p:cSld>
-    <p:bg>
-      <p:bgPr>
-        <a:gradFill rotWithShape="1">
-          <a:gsLst>
-            <a:gs pos="0">
-              <a:schemeClr val="bg2">
-                <a:tint val="94000"/>
-                <a:satMod val="80000"/>
-                <a:lumMod val="106000"/>
-              </a:schemeClr>
-            </a:gs>
-            <a:gs pos="100000">
-              <a:schemeClr val="bg2">
-                <a:shade val="80000"/>
-              </a:schemeClr>
-            </a:gs>
-          </a:gsLst>
-          <a:path path="circle">
-            <a:fillToRect l="43000" r="43000" b="100000"/>
-          </a:path>
-        </a:gradFill>
-        <a:effectLst/>
-      </p:bgPr>
-    </p:bg>
-    <p:spTree>
-      <p:nvGrpSpPr>
-        <p:cNvPr id="1" name=""/>
-        <p:cNvGrpSpPr/>
-        <p:nvPr/>
-      </p:nvGrpSpPr>
-      <p:grpSpPr>
-        <a:xfrm>
-          <a:off x="0" y="0"/>
-          <a:ext cx="0" cy="0"/>
-          <a:chOff x="0" y="0"/>
-          <a:chExt cx="0" cy="0"/>
-        </a:xfrm>
-      </p:grpSpPr>
-      <p:sp>
-        <p:nvSpPr>
-          <p:cNvPr id="80" name="Retângulo 79">
-            <a:extLst>
-              <a:ext uri="{FF2B5EF4-FFF2-40B4-BE49-F238E27FC236}">
-                <a16:creationId xmlns:a16="http://schemas.microsoft.com/office/drawing/2014/main" id="{1CE580D1-F917-4567-AFB4-99AA9B52ADF0}"/>
-              </a:ext>
-              <a:ext uri="{C183D7F6-B498-43B3-948B-1728B52AA6E4}">
-                <adec:decorative xmlns:adec="http://schemas.microsoft.com/office/drawing/2017/decorative" val="1"/>
-              </a:ext>
-            </a:extLst>
-          </p:cNvPr>
-          <p:cNvSpPr>
-            <a:spLocks noGrp="1" noRot="1" noChangeAspect="1" noMove="1" noResize="1" noEditPoints="1" noAdjustHandles="1" noChangeArrowheads="1" noChangeShapeType="1" noTextEdit="1"/>
-          </p:cNvSpPr>
-          <p:nvPr>
-            <p:extLst>
-              <p:ext uri="{386F3935-93C4-4BCD-93E2-E3B085C9AB24}">
-                <p16:designElem xmlns:p16="http://schemas.microsoft.com/office/powerpoint/2015/main" val="1"/>
-              </p:ext>
-            </p:extLst>
-          </p:nvPr>
-        </p:nvSpPr>
-        <p:spPr>
-          <a:xfrm>
-            <a:off x="0" y="2019476"/>
-            <a:ext cx="12192000" cy="4105941"/>
-          </a:xfrm>
-          <a:prstGeom prst="rect">
-            <a:avLst/>
-          </a:prstGeom>
-          <a:gradFill flip="none" rotWithShape="1">
-            <a:gsLst>
-              <a:gs pos="0">
-                <a:schemeClr val="bg2">
-                  <a:alpha val="0"/>
-                </a:schemeClr>
-              </a:gs>
-              <a:gs pos="100000">
-                <a:schemeClr val="bg2"/>
-              </a:gs>
-            </a:gsLst>
-            <a:lin ang="5400000" scaled="0"/>
-            <a:tileRect/>
-          </a:gradFill>
-          <a:ln>
-            <a:noFill/>
-          </a:ln>
-        </p:spPr>
-        <p:style>
-          <a:lnRef idx="2">
-            <a:schemeClr val="accent1">
-              <a:shade val="50000"/>
-            </a:schemeClr>
-          </a:lnRef>
-          <a:fillRef idx="1">
-            <a:schemeClr val="accent1"/>
-          </a:fillRef>
-          <a:effectRef idx="0">
-            <a:schemeClr val="accent1"/>
-          </a:effectRef>
-          <a:fontRef idx="minor">
-            <a:schemeClr val="lt1"/>
-          </a:fontRef>
-        </p:style>
-      </p:sp>
-      <p:pic>
-        <p:nvPicPr>
-          <p:cNvPr id="82" name="Imagem 81">
-            <a:extLst>
-              <a:ext uri="{FF2B5EF4-FFF2-40B4-BE49-F238E27FC236}">
-                <a16:creationId xmlns:a16="http://schemas.microsoft.com/office/drawing/2014/main" id="{1F5620B8-A2D8-4568-B566-F0453A0D9167}"/>
-              </a:ext>
-              <a:ext uri="{C183D7F6-B498-43B3-948B-1728B52AA6E4}">
-                <adec:decorative xmlns:adec="http://schemas.microsoft.com/office/drawing/2017/decorative" val="1"/>
-              </a:ext>
-            </a:extLst>
-          </p:cNvPr>
-          <p:cNvPicPr>
-            <a:picLocks noGrp="1" noRot="1" noChangeAspect="1" noMove="1" noResize="1" noEditPoints="1" noAdjustHandles="1" noChangeArrowheads="1" noChangeShapeType="1" noCrop="1"/>
-          </p:cNvPicPr>
-          <p:nvPr>
-            <p:extLst>
-              <p:ext uri="{386F3935-93C4-4BCD-93E2-E3B085C9AB24}">
-                <p16:designElem xmlns:p16="http://schemas.microsoft.com/office/powerpoint/2015/main" val="1"/>
-              </p:ext>
-            </p:extLst>
-          </p:nvPr>
-        </p:nvPicPr>
-        <p:blipFill rotWithShape="1">
-          <a:blip r:embed="rId3">
-            <a:extLst>
-              <a:ext uri="{28A0092B-C50C-407E-A947-70E740481C1C}">
-                <a14:useLocalDpi xmlns:a14="http://schemas.microsoft.com/office/drawing/2010/main"/>
-              </a:ext>
-            </a:extLst>
-          </a:blip>
-          <a:srcRect b="-1562"/>
-          <a:stretch/>
-        </p:blipFill>
-        <p:spPr bwMode="black">
-          <a:xfrm>
-            <a:off x="0" y="6126480"/>
-            <a:ext cx="12192000" cy="742950"/>
-          </a:xfrm>
-          <a:prstGeom prst="rect">
-            <a:avLst/>
-          </a:prstGeom>
-        </p:spPr>
-      </p:pic>
-      <p:cxnSp>
-        <p:nvCxnSpPr>
-          <p:cNvPr id="84" name="Conexão Reta 83">
-            <a:extLst>
-              <a:ext uri="{FF2B5EF4-FFF2-40B4-BE49-F238E27FC236}">
-                <a16:creationId xmlns:a16="http://schemas.microsoft.com/office/drawing/2014/main" id="{1C7D2BA4-4B7A-4596-8BCC-5CF715423894}"/>
-              </a:ext>
-              <a:ext uri="{C183D7F6-B498-43B3-948B-1728B52AA6E4}">
-                <adec:decorative xmlns:adec="http://schemas.microsoft.com/office/drawing/2017/decorative" val="1"/>
-              </a:ext>
-            </a:extLst>
-          </p:cNvPr>
-          <p:cNvCxnSpPr>
-            <a:cxnSpLocks noGrp="1" noRot="1" noChangeAspect="1" noMove="1" noResize="1" noEditPoints="1" noAdjustHandles="1" noChangeArrowheads="1" noChangeShapeType="1"/>
-          </p:cNvCxnSpPr>
-          <p:nvPr>
-            <p:extLst>
-              <p:ext uri="{386F3935-93C4-4BCD-93E2-E3B085C9AB24}">
-                <p16:designElem xmlns:p16="http://schemas.microsoft.com/office/powerpoint/2015/main" val="1"/>
-              </p:ext>
-            </p:extLst>
-          </p:nvPr>
-        </p:nvCxnSpPr>
-        <p:spPr>
-          <a:xfrm>
-            <a:off x="0" y="6128413"/>
-            <a:ext cx="12192000" cy="0"/>
-          </a:xfrm>
-          <a:prstGeom prst="line">
-            <a:avLst/>
-          </a:prstGeom>
-          <a:ln w="12700">
-            <a:solidFill>
-              <a:srgbClr val="000001">
-                <a:alpha val="20000"/>
-              </a:srgbClr>
-            </a:solidFill>
-          </a:ln>
-        </p:spPr>
-        <p:style>
-          <a:lnRef idx="1">
-            <a:schemeClr val="accent1"/>
-          </a:lnRef>
-          <a:fillRef idx="0">
-            <a:schemeClr val="accent1"/>
-          </a:fillRef>
-          <a:effectRef idx="0">
-            <a:schemeClr val="accent1"/>
-          </a:effectRef>
-          <a:fontRef idx="minor">
-            <a:schemeClr val="tx1"/>
-          </a:fontRef>
-        </p:style>
-      </p:cxnSp>
-      <p:cxnSp>
-        <p:nvCxnSpPr>
-          <p:cNvPr id="86" name="Conexão Reta 85">
-            <a:extLst>
-              <a:ext uri="{FF2B5EF4-FFF2-40B4-BE49-F238E27FC236}">
-                <a16:creationId xmlns:a16="http://schemas.microsoft.com/office/drawing/2014/main" id="{4977F1E1-2B6F-4BB6-899F-67D8764D83C5}"/>
-              </a:ext>
-              <a:ext uri="{C183D7F6-B498-43B3-948B-1728B52AA6E4}">
-                <adec:decorative xmlns:adec="http://schemas.microsoft.com/office/drawing/2017/decorative" val="1"/>
-              </a:ext>
-            </a:extLst>
-          </p:cNvPr>
-          <p:cNvCxnSpPr>
-            <a:cxnSpLocks noGrp="1" noRot="1" noChangeAspect="1" noMove="1" noResize="1" noEditPoints="1" noAdjustHandles="1" noChangeArrowheads="1" noChangeShapeType="1"/>
-          </p:cNvCxnSpPr>
-          <p:nvPr>
-            <p:extLst>
-              <p:ext uri="{386F3935-93C4-4BCD-93E2-E3B085C9AB24}">
-                <p16:designElem xmlns:p16="http://schemas.microsoft.com/office/powerpoint/2015/main" val="1"/>
-              </p:ext>
-            </p:extLst>
-          </p:nvPr>
-        </p:nvCxnSpPr>
-        <p:spPr>
-          <a:xfrm>
-            <a:off x="2417780" y="3528542"/>
-            <a:ext cx="8637072" cy="0"/>
-          </a:xfrm>
-          <a:prstGeom prst="line">
-            <a:avLst/>
-          </a:prstGeom>
-          <a:ln w="31750"/>
-        </p:spPr>
-        <p:style>
-          <a:lnRef idx="3">
-            <a:schemeClr val="accent1"/>
-          </a:lnRef>
-          <a:fillRef idx="0">
-            <a:schemeClr val="accent1"/>
-          </a:fillRef>
-          <a:effectRef idx="2">
-            <a:schemeClr val="accent1"/>
-          </a:effectRef>
-          <a:fontRef idx="minor">
-            <a:schemeClr val="tx1"/>
-          </a:fontRef>
-        </p:style>
-      </p:cxnSp>
-      <p:pic>
-        <p:nvPicPr>
-          <p:cNvPr id="5" name="Imagem 4" descr="Escadas brancas">
-            <a:extLst>
-              <a:ext uri="{FF2B5EF4-FFF2-40B4-BE49-F238E27FC236}">
-                <a16:creationId xmlns:a16="http://schemas.microsoft.com/office/drawing/2014/main" id="{BDEE4019-56F2-459C-B15D-76C0CDC216FA}"/>
-              </a:ext>
-            </a:extLst>
-          </p:cNvPr>
-          <p:cNvPicPr>
-            <a:picLocks noChangeAspect="1"/>
-          </p:cNvPicPr>
-          <p:nvPr/>
-        </p:nvPicPr>
-        <p:blipFill rotWithShape="1">
-          <a:blip r:embed="rId4">
-            <a:extLst>
-              <a:ext uri="{28A0092B-C50C-407E-A947-70E740481C1C}">
-                <a14:useLocalDpi xmlns:a14="http://schemas.microsoft.com/office/drawing/2010/main"/>
-              </a:ext>
-            </a:extLst>
-          </a:blip>
-          <a:srcRect/>
-          <a:stretch/>
-        </p:blipFill>
-        <p:spPr>
-          <a:xfrm flipH="1">
-            <a:off x="2" y="10"/>
-            <a:ext cx="12191695" cy="6857990"/>
-          </a:xfrm>
-          <a:prstGeom prst="rect">
-            <a:avLst/>
-          </a:prstGeom>
-          <a:solidFill>
-            <a:schemeClr val="bg2">
-              <a:lumMod val="90000"/>
-            </a:schemeClr>
-          </a:solidFill>
-        </p:spPr>
-      </p:pic>
-      <p:sp>
-        <p:nvSpPr>
-          <p:cNvPr id="88" name="Retângulo 87">
-            <a:extLst>
-              <a:ext uri="{FF2B5EF4-FFF2-40B4-BE49-F238E27FC236}">
-                <a16:creationId xmlns:a16="http://schemas.microsoft.com/office/drawing/2014/main" id="{6A0FFA78-985C-4F50-B21A-77045C7DF657}"/>
-              </a:ext>
-              <a:ext uri="{C183D7F6-B498-43B3-948B-1728B52AA6E4}">
-                <adec:decorative xmlns:adec="http://schemas.microsoft.com/office/drawing/2017/decorative" val="1"/>
-              </a:ext>
-            </a:extLst>
-          </p:cNvPr>
-          <p:cNvSpPr>
-            <a:spLocks noGrp="1" noRot="1" noChangeAspect="1" noMove="1" noResize="1" noEditPoints="1" noAdjustHandles="1" noChangeArrowheads="1" noChangeShapeType="1" noTextEdit="1"/>
-          </p:cNvSpPr>
-          <p:nvPr>
-            <p:extLst>
-              <p:ext uri="{386F3935-93C4-4BCD-93E2-E3B085C9AB24}">
-                <p16:designElem xmlns:p16="http://schemas.microsoft.com/office/powerpoint/2015/main" val="1"/>
-              </p:ext>
-            </p:extLst>
-          </p:nvPr>
-        </p:nvSpPr>
-        <p:spPr>
-          <a:xfrm>
-            <a:off x="3896786" y="3064931"/>
-            <a:ext cx="8295215" cy="2488568"/>
-          </a:xfrm>
-          <a:prstGeom prst="rect">
-            <a:avLst/>
-          </a:prstGeom>
-          <a:solidFill>
-            <a:srgbClr val="000001">
-              <a:alpha val="75000"/>
-            </a:srgbClr>
-          </a:solidFill>
-          <a:ln>
-            <a:noFill/>
-          </a:ln>
-        </p:spPr>
-        <p:style>
-          <a:lnRef idx="1">
-            <a:schemeClr val="accent1"/>
-          </a:lnRef>
-          <a:fillRef idx="3">
-            <a:schemeClr val="accent1"/>
-          </a:fillRef>
-          <a:effectRef idx="2">
-            <a:schemeClr val="accent1"/>
-          </a:effectRef>
-          <a:fontRef idx="minor">
-            <a:schemeClr val="lt1"/>
-          </a:fontRef>
-        </p:style>
-        <p:txBody>
-          <a:bodyPr rtlCol="0" anchor="ctr"/>
-          <a:lstStyle/>
-          <a:p>
-            <a:pPr algn="ctr" rtl="0"/>
-            <a:endParaRPr lang="pt-PT"/>
-          </a:p>
-        </p:txBody>
-      </p:sp>
-      <p:sp>
-        <p:nvSpPr>
-          <p:cNvPr id="2" name="Título 1">
-            <a:extLst>
-              <a:ext uri="{FF2B5EF4-FFF2-40B4-BE49-F238E27FC236}">
-                <a16:creationId xmlns:a16="http://schemas.microsoft.com/office/drawing/2014/main" id="{E734342C-2173-4B23-9C3C-2950C6A3983D}"/>
-              </a:ext>
-            </a:extLst>
-          </p:cNvPr>
-          <p:cNvSpPr>
-            <a:spLocks noGrp="1"/>
-          </p:cNvSpPr>
-          <p:nvPr>
-            <p:ph type="title"/>
-          </p:nvPr>
-        </p:nvSpPr>
-        <p:spPr>
-          <a:xfrm>
-            <a:off x="4065511" y="3236470"/>
-            <a:ext cx="6832500" cy="1252601"/>
-          </a:xfrm>
-        </p:spPr>
-        <p:txBody>
-          <a:bodyPr vert="horz" lIns="91440" tIns="45720" rIns="91440" bIns="0" rtlCol="0" anchor="b">
-            <a:normAutofit/>
-          </a:bodyPr>
-          <a:lstStyle/>
-          <a:p>
-            <a:pPr rtl="0"/>
-            <a:r>
-              <a:rPr lang="pt-PT" sz="3200" dirty="0">
-                <a:solidFill>
-                  <a:srgbClr val="FFFFFE"/>
-                </a:solidFill>
-              </a:rPr>
-              <a:t>Estratégia de implementação</a:t>
-            </a:r>
-          </a:p>
-        </p:txBody>
-      </p:sp>
-      <p:cxnSp>
-        <p:nvCxnSpPr>
-          <p:cNvPr id="90" name="Conexão Reta 89">
-            <a:extLst>
-              <a:ext uri="{FF2B5EF4-FFF2-40B4-BE49-F238E27FC236}">
-                <a16:creationId xmlns:a16="http://schemas.microsoft.com/office/drawing/2014/main" id="{65409EC7-69B1-45CC-8FB7-1964C1AB6720}"/>
-              </a:ext>
-              <a:ext uri="{C183D7F6-B498-43B3-948B-1728B52AA6E4}">
-                <adec:decorative xmlns:adec="http://schemas.microsoft.com/office/drawing/2017/decorative" val="1"/>
-              </a:ext>
-            </a:extLst>
-          </p:cNvPr>
-          <p:cNvCxnSpPr>
-            <a:cxnSpLocks noGrp="1" noRot="1" noChangeAspect="1" noMove="1" noResize="1" noEditPoints="1" noAdjustHandles="1" noChangeArrowheads="1" noChangeShapeType="1"/>
-          </p:cNvCxnSpPr>
-          <p:nvPr>
-            <p:extLst>
-              <p:ext uri="{386F3935-93C4-4BCD-93E2-E3B085C9AB24}">
-                <p16:designElem xmlns:p16="http://schemas.microsoft.com/office/powerpoint/2015/main" val="1"/>
-              </p:ext>
-            </p:extLst>
-          </p:nvPr>
-        </p:nvCxnSpPr>
-        <p:spPr>
-          <a:xfrm>
-            <a:off x="4065509" y="4666480"/>
-            <a:ext cx="6832499" cy="0"/>
-          </a:xfrm>
-          <a:prstGeom prst="line">
-            <a:avLst/>
-          </a:prstGeom>
-          <a:ln w="31750"/>
-        </p:spPr>
-        <p:style>
-          <a:lnRef idx="3">
-            <a:schemeClr val="accent1"/>
-          </a:lnRef>
-          <a:fillRef idx="0">
-            <a:schemeClr val="accent1"/>
-          </a:fillRef>
-          <a:effectRef idx="2">
-            <a:schemeClr val="accent1"/>
-          </a:effectRef>
-          <a:fontRef idx="minor">
-            <a:schemeClr val="tx1"/>
-          </a:fontRef>
-        </p:style>
-      </p:cxnSp>
-    </p:spTree>
-    <p:extLst>
-      <p:ext uri="{BB962C8B-B14F-4D97-AF65-F5344CB8AC3E}">
-        <p14:creationId xmlns:p14="http://schemas.microsoft.com/office/powerpoint/2010/main" val="1498194460"/>
       </p:ext>
     </p:extLst>
   </p:cSld>
@@ -10887,11 +11109,12 @@
 </file>
 
 <file path=customXml/item1.xml><?xml version="1.0" encoding="utf-8"?>
-<p:properties xmlns:p="http://schemas.microsoft.com/office/2006/metadata/properties" xmlns:xsi="http://www.w3.org/2001/XMLSchema-instance" xmlns:pc="http://schemas.microsoft.com/office/infopath/2007/PartnerControls">
-  <documentManagement>
-    <MediaServiceKeyPoints xmlns="71af3243-3dd4-4a8d-8c0d-dd76da1f02a5" xsi:nil="true"/>
-  </documentManagement>
-</p:properties>
+<?mso-contentType ?>
+<FormTemplates xmlns="http://schemas.microsoft.com/sharepoint/v3/contenttype/forms">
+  <Display>DocumentLibraryForm</Display>
+  <Edit>DocumentLibraryForm</Edit>
+  <New>DocumentLibraryForm</New>
+</FormTemplates>
 </file>
 
 <file path=customXml/item2.xml><?xml version="1.0" encoding="utf-8"?>
@@ -11106,27 +11329,17 @@
 </file>
 
 <file path=customXml/item3.xml><?xml version="1.0" encoding="utf-8"?>
-<?mso-contentType ?>
-<FormTemplates xmlns="http://schemas.microsoft.com/sharepoint/v3/contenttype/forms">
-  <Display>DocumentLibraryForm</Display>
-  <Edit>DocumentLibraryForm</Edit>
-  <New>DocumentLibraryForm</New>
-</FormTemplates>
+<p:properties xmlns:p="http://schemas.microsoft.com/office/2006/metadata/properties" xmlns:xsi="http://www.w3.org/2001/XMLSchema-instance" xmlns:pc="http://schemas.microsoft.com/office/infopath/2007/PartnerControls">
+  <documentManagement>
+    <MediaServiceKeyPoints xmlns="71af3243-3dd4-4a8d-8c0d-dd76da1f02a5" xsi:nil="true"/>
+  </documentManagement>
+</p:properties>
 </file>
 
 <file path=customXml/itemProps1.xml><?xml version="1.0" encoding="utf-8"?>
-<ds:datastoreItem xmlns:ds="http://schemas.openxmlformats.org/officeDocument/2006/customXml" ds:itemID="{0DAABB37-1599-4AE8-818C-82E84CA93DF4}">
+<ds:datastoreItem xmlns:ds="http://schemas.openxmlformats.org/officeDocument/2006/customXml" ds:itemID="{BCF9EC99-89FF-486C-9E02-31E13FD72E16}">
   <ds:schemaRefs>
-    <ds:schemaRef ds:uri="http://purl.org/dc/elements/1.1/"/>
-    <ds:schemaRef ds:uri="http://schemas.microsoft.com/office/infopath/2007/PartnerControls"/>
-    <ds:schemaRef ds:uri="http://purl.org/dc/dcmitype/"/>
-    <ds:schemaRef ds:uri="71af3243-3dd4-4a8d-8c0d-dd76da1f02a5"/>
-    <ds:schemaRef ds:uri="16c05727-aa75-4e4a-9b5f-8a80a1165891"/>
-    <ds:schemaRef ds:uri="http://purl.org/dc/terms/"/>
-    <ds:schemaRef ds:uri="http://schemas.microsoft.com/office/2006/documentManagement/types"/>
-    <ds:schemaRef ds:uri="http://schemas.openxmlformats.org/package/2006/metadata/core-properties"/>
-    <ds:schemaRef ds:uri="http://schemas.microsoft.com/office/2006/metadata/properties"/>
-    <ds:schemaRef ds:uri="http://www.w3.org/XML/1998/namespace"/>
+    <ds:schemaRef ds:uri="http://schemas.microsoft.com/sharepoint/v3/contenttype/forms"/>
   </ds:schemaRefs>
 </ds:datastoreItem>
 </file>
@@ -11151,9 +11364,18 @@
 </file>
 
 <file path=customXml/itemProps3.xml><?xml version="1.0" encoding="utf-8"?>
-<ds:datastoreItem xmlns:ds="http://schemas.openxmlformats.org/officeDocument/2006/customXml" ds:itemID="{BCF9EC99-89FF-486C-9E02-31E13FD72E16}">
+<ds:datastoreItem xmlns:ds="http://schemas.openxmlformats.org/officeDocument/2006/customXml" ds:itemID="{0DAABB37-1599-4AE8-818C-82E84CA93DF4}">
   <ds:schemaRefs>
-    <ds:schemaRef ds:uri="http://schemas.microsoft.com/sharepoint/v3/contenttype/forms"/>
+    <ds:schemaRef ds:uri="http://purl.org/dc/elements/1.1/"/>
+    <ds:schemaRef ds:uri="http://schemas.microsoft.com/office/infopath/2007/PartnerControls"/>
+    <ds:schemaRef ds:uri="http://purl.org/dc/dcmitype/"/>
+    <ds:schemaRef ds:uri="71af3243-3dd4-4a8d-8c0d-dd76da1f02a5"/>
+    <ds:schemaRef ds:uri="16c05727-aa75-4e4a-9b5f-8a80a1165891"/>
+    <ds:schemaRef ds:uri="http://purl.org/dc/terms/"/>
+    <ds:schemaRef ds:uri="http://schemas.microsoft.com/office/2006/documentManagement/types"/>
+    <ds:schemaRef ds:uri="http://schemas.openxmlformats.org/package/2006/metadata/core-properties"/>
+    <ds:schemaRef ds:uri="http://schemas.microsoft.com/office/2006/metadata/properties"/>
+    <ds:schemaRef ds:uri="http://www.w3.org/XML/1998/namespace"/>
   </ds:schemaRefs>
 </ds:datastoreItem>
 </file>
</xml_diff>

<commit_message>
Added Jira Tasks to Finalise Fase 4
</commit_message>
<xml_diff>
--- a/Editables/Fase 4 - Implementação.pptx
+++ b/Editables/Fase 4 - Implementação.pptx
@@ -147,6 +147,7 @@
 <file path=ppt/revisionInfo.xml><?xml version="1.0" encoding="utf-8"?>
 <p1510:revInfo xmlns:a="http://schemas.openxmlformats.org/drawingml/2006/main" xmlns:r="http://schemas.openxmlformats.org/officeDocument/2006/relationships" xmlns:p1510="http://schemas.microsoft.com/office/powerpoint/2015/10/main">
   <p1510:revLst>
+    <p1510:client id="{0738C499-B334-4A8B-95C2-B505002D9A1B}" v="2" dt="2023-06-01T10:22:51.462"/>
     <p1510:client id="{7F501EE3-BA3E-4F2E-8F95-0FA7922C07FC}" v="4" dt="2023-05-31T12:08:43.604"/>
   </p1510:revLst>
 </p1510:revInfo>
@@ -154,6 +155,943 @@
 
 <file path=ppt/changesInfos/changesInfo1.xml><?xml version="1.0" encoding="utf-8"?>
 <pc:chgInfo xmlns:a="http://schemas.openxmlformats.org/drawingml/2006/main" xmlns:r="http://schemas.openxmlformats.org/officeDocument/2006/relationships" xmlns:ac="http://schemas.microsoft.com/office/drawing/2013/main/command" xmlns:pc="http://schemas.microsoft.com/office/powerpoint/2013/main/command">
+  <pc:docChgLst>
+    <pc:chgData name="Tiago Fonseca" userId="0bf00240-3020-4d01-a24b-06825a2f49d7" providerId="ADAL" clId="{0738C499-B334-4A8B-95C2-B505002D9A1B}"/>
+    <pc:docChg chg="custSel addSld delSld modSld">
+      <pc:chgData name="Tiago Fonseca" userId="0bf00240-3020-4d01-a24b-06825a2f49d7" providerId="ADAL" clId="{0738C499-B334-4A8B-95C2-B505002D9A1B}" dt="2023-06-01T10:23:18.245" v="12" actId="47"/>
+      <pc:docMkLst>
+        <pc:docMk/>
+      </pc:docMkLst>
+      <pc:sldChg chg="addSp modSp mod">
+        <pc:chgData name="Tiago Fonseca" userId="0bf00240-3020-4d01-a24b-06825a2f49d7" providerId="ADAL" clId="{0738C499-B334-4A8B-95C2-B505002D9A1B}" dt="2023-06-01T10:23:14.642" v="11" actId="1076"/>
+        <pc:sldMkLst>
+          <pc:docMk/>
+          <pc:sldMk cId="3179833211" sldId="267"/>
+        </pc:sldMkLst>
+        <pc:picChg chg="add mod">
+          <ac:chgData name="Tiago Fonseca" userId="0bf00240-3020-4d01-a24b-06825a2f49d7" providerId="ADAL" clId="{0738C499-B334-4A8B-95C2-B505002D9A1B}" dt="2023-06-01T10:23:14.642" v="11" actId="1076"/>
+          <ac:picMkLst>
+            <pc:docMk/>
+            <pc:sldMk cId="3179833211" sldId="267"/>
+            <ac:picMk id="6" creationId="{0F6404C2-456B-6034-F67E-0530E0A7B169}"/>
+          </ac:picMkLst>
+        </pc:picChg>
+      </pc:sldChg>
+      <pc:sldChg chg="addSp delSp modSp new del mod">
+        <pc:chgData name="Tiago Fonseca" userId="0bf00240-3020-4d01-a24b-06825a2f49d7" providerId="ADAL" clId="{0738C499-B334-4A8B-95C2-B505002D9A1B}" dt="2023-06-01T10:23:18.245" v="12" actId="47"/>
+        <pc:sldMkLst>
+          <pc:docMk/>
+          <pc:sldMk cId="320705333" sldId="293"/>
+        </pc:sldMkLst>
+        <pc:picChg chg="add del mod">
+          <ac:chgData name="Tiago Fonseca" userId="0bf00240-3020-4d01-a24b-06825a2f49d7" providerId="ADAL" clId="{0738C499-B334-4A8B-95C2-B505002D9A1B}" dt="2023-06-01T10:22:49.822" v="4" actId="21"/>
+          <ac:picMkLst>
+            <pc:docMk/>
+            <pc:sldMk cId="320705333" sldId="293"/>
+            <ac:picMk id="3" creationId="{7580F80F-082B-39D9-942C-500ACE8D8151}"/>
+          </ac:picMkLst>
+        </pc:picChg>
+      </pc:sldChg>
+    </pc:docChg>
+  </pc:docChgLst>
+  <pc:docChgLst>
+    <pc:chgData name="Tiago Fonseca" userId="0bf00240-3020-4d01-a24b-06825a2f49d7" providerId="ADAL" clId="{7F501EE3-BA3E-4F2E-8F95-0FA7922C07FC}"/>
+    <pc:docChg chg="undo custSel addSld delSld modSld sldOrd">
+      <pc:chgData name="Tiago Fonseca" userId="0bf00240-3020-4d01-a24b-06825a2f49d7" providerId="ADAL" clId="{7F501EE3-BA3E-4F2E-8F95-0FA7922C07FC}" dt="2023-05-31T12:12:02.691" v="388"/>
+      <pc:docMkLst>
+        <pc:docMk/>
+      </pc:docMkLst>
+      <pc:sldChg chg="modSp mod">
+        <pc:chgData name="Tiago Fonseca" userId="0bf00240-3020-4d01-a24b-06825a2f49d7" providerId="ADAL" clId="{7F501EE3-BA3E-4F2E-8F95-0FA7922C07FC}" dt="2023-05-31T12:03:16.827" v="24" actId="20577"/>
+        <pc:sldMkLst>
+          <pc:docMk/>
+          <pc:sldMk cId="300101176" sldId="256"/>
+        </pc:sldMkLst>
+        <pc:spChg chg="mod">
+          <ac:chgData name="Tiago Fonseca" userId="0bf00240-3020-4d01-a24b-06825a2f49d7" providerId="ADAL" clId="{7F501EE3-BA3E-4F2E-8F95-0FA7922C07FC}" dt="2023-05-31T12:03:16.827" v="24" actId="20577"/>
+          <ac:spMkLst>
+            <pc:docMk/>
+            <pc:sldMk cId="300101176" sldId="256"/>
+            <ac:spMk id="3" creationId="{1D090625-51CE-4ECB-81A4-C4905F3FBFE9}"/>
+          </ac:spMkLst>
+        </pc:spChg>
+      </pc:sldChg>
+      <pc:sldChg chg="modSp mod">
+        <pc:chgData name="Tiago Fonseca" userId="0bf00240-3020-4d01-a24b-06825a2f49d7" providerId="ADAL" clId="{7F501EE3-BA3E-4F2E-8F95-0FA7922C07FC}" dt="2023-05-31T12:04:17.140" v="101" actId="20577"/>
+        <pc:sldMkLst>
+          <pc:docMk/>
+          <pc:sldMk cId="3065993080" sldId="272"/>
+        </pc:sldMkLst>
+        <pc:spChg chg="mod">
+          <ac:chgData name="Tiago Fonseca" userId="0bf00240-3020-4d01-a24b-06825a2f49d7" providerId="ADAL" clId="{7F501EE3-BA3E-4F2E-8F95-0FA7922C07FC}" dt="2023-05-31T12:03:39.018" v="84" actId="20577"/>
+          <ac:spMkLst>
+            <pc:docMk/>
+            <pc:sldMk cId="3065993080" sldId="272"/>
+            <ac:spMk id="2" creationId="{98A32DE6-6B29-7489-635B-950DAAB3B577}"/>
+          </ac:spMkLst>
+        </pc:spChg>
+        <pc:spChg chg="mod">
+          <ac:chgData name="Tiago Fonseca" userId="0bf00240-3020-4d01-a24b-06825a2f49d7" providerId="ADAL" clId="{7F501EE3-BA3E-4F2E-8F95-0FA7922C07FC}" dt="2023-05-31T12:04:17.140" v="101" actId="20577"/>
+          <ac:spMkLst>
+            <pc:docMk/>
+            <pc:sldMk cId="3065993080" sldId="272"/>
+            <ac:spMk id="7" creationId="{4CDF2A1F-BDE4-7ECC-7CEB-42822AAE7A2D}"/>
+          </ac:spMkLst>
+        </pc:spChg>
+      </pc:sldChg>
+      <pc:sldChg chg="del">
+        <pc:chgData name="Tiago Fonseca" userId="0bf00240-3020-4d01-a24b-06825a2f49d7" providerId="ADAL" clId="{7F501EE3-BA3E-4F2E-8F95-0FA7922C07FC}" dt="2023-05-31T12:10:19.904" v="320" actId="47"/>
+        <pc:sldMkLst>
+          <pc:docMk/>
+          <pc:sldMk cId="1489756019" sldId="277"/>
+        </pc:sldMkLst>
+      </pc:sldChg>
+      <pc:sldChg chg="modSp mod">
+        <pc:chgData name="Tiago Fonseca" userId="0bf00240-3020-4d01-a24b-06825a2f49d7" providerId="ADAL" clId="{7F501EE3-BA3E-4F2E-8F95-0FA7922C07FC}" dt="2023-05-31T12:03:29.301" v="53" actId="20577"/>
+        <pc:sldMkLst>
+          <pc:docMk/>
+          <pc:sldMk cId="996926825" sldId="279"/>
+        </pc:sldMkLst>
+        <pc:spChg chg="mod">
+          <ac:chgData name="Tiago Fonseca" userId="0bf00240-3020-4d01-a24b-06825a2f49d7" providerId="ADAL" clId="{7F501EE3-BA3E-4F2E-8F95-0FA7922C07FC}" dt="2023-05-31T12:03:29.301" v="53" actId="20577"/>
+          <ac:spMkLst>
+            <pc:docMk/>
+            <pc:sldMk cId="996926825" sldId="279"/>
+            <ac:spMk id="2" creationId="{E734342C-2173-4B23-9C3C-2950C6A3983D}"/>
+          </ac:spMkLst>
+        </pc:spChg>
+      </pc:sldChg>
+      <pc:sldChg chg="modSp mod">
+        <pc:chgData name="Tiago Fonseca" userId="0bf00240-3020-4d01-a24b-06825a2f49d7" providerId="ADAL" clId="{7F501EE3-BA3E-4F2E-8F95-0FA7922C07FC}" dt="2023-05-31T12:04:44.606" v="117" actId="20577"/>
+        <pc:sldMkLst>
+          <pc:docMk/>
+          <pc:sldMk cId="825530817" sldId="280"/>
+        </pc:sldMkLst>
+        <pc:spChg chg="mod">
+          <ac:chgData name="Tiago Fonseca" userId="0bf00240-3020-4d01-a24b-06825a2f49d7" providerId="ADAL" clId="{7F501EE3-BA3E-4F2E-8F95-0FA7922C07FC}" dt="2023-05-31T12:04:44.606" v="117" actId="20577"/>
+          <ac:spMkLst>
+            <pc:docMk/>
+            <pc:sldMk cId="825530817" sldId="280"/>
+            <ac:spMk id="2" creationId="{E734342C-2173-4B23-9C3C-2950C6A3983D}"/>
+          </ac:spMkLst>
+        </pc:spChg>
+      </pc:sldChg>
+      <pc:sldChg chg="modSp mod">
+        <pc:chgData name="Tiago Fonseca" userId="0bf00240-3020-4d01-a24b-06825a2f49d7" providerId="ADAL" clId="{7F501EE3-BA3E-4F2E-8F95-0FA7922C07FC}" dt="2023-05-31T12:10:16.280" v="319" actId="20577"/>
+        <pc:sldMkLst>
+          <pc:docMk/>
+          <pc:sldMk cId="1850968765" sldId="281"/>
+        </pc:sldMkLst>
+        <pc:spChg chg="mod">
+          <ac:chgData name="Tiago Fonseca" userId="0bf00240-3020-4d01-a24b-06825a2f49d7" providerId="ADAL" clId="{7F501EE3-BA3E-4F2E-8F95-0FA7922C07FC}" dt="2023-05-31T12:10:16.280" v="319" actId="20577"/>
+          <ac:spMkLst>
+            <pc:docMk/>
+            <pc:sldMk cId="1850968765" sldId="281"/>
+            <ac:spMk id="2" creationId="{E734342C-2173-4B23-9C3C-2950C6A3983D}"/>
+          </ac:spMkLst>
+        </pc:spChg>
+      </pc:sldChg>
+      <pc:sldChg chg="del">
+        <pc:chgData name="Tiago Fonseca" userId="0bf00240-3020-4d01-a24b-06825a2f49d7" providerId="ADAL" clId="{7F501EE3-BA3E-4F2E-8F95-0FA7922C07FC}" dt="2023-05-31T12:09:49.820" v="271" actId="47"/>
+        <pc:sldMkLst>
+          <pc:docMk/>
+          <pc:sldMk cId="2855269777" sldId="282"/>
+        </pc:sldMkLst>
+      </pc:sldChg>
+      <pc:sldChg chg="del">
+        <pc:chgData name="Tiago Fonseca" userId="0bf00240-3020-4d01-a24b-06825a2f49d7" providerId="ADAL" clId="{7F501EE3-BA3E-4F2E-8F95-0FA7922C07FC}" dt="2023-05-31T12:10:20.591" v="321" actId="47"/>
+        <pc:sldMkLst>
+          <pc:docMk/>
+          <pc:sldMk cId="1498194460" sldId="284"/>
+        </pc:sldMkLst>
+      </pc:sldChg>
+      <pc:sldChg chg="modSp mod">
+        <pc:chgData name="Tiago Fonseca" userId="0bf00240-3020-4d01-a24b-06825a2f49d7" providerId="ADAL" clId="{7F501EE3-BA3E-4F2E-8F95-0FA7922C07FC}" dt="2023-05-31T12:10:56.538" v="350"/>
+        <pc:sldMkLst>
+          <pc:docMk/>
+          <pc:sldMk cId="4239780882" sldId="286"/>
+        </pc:sldMkLst>
+        <pc:spChg chg="mod">
+          <ac:chgData name="Tiago Fonseca" userId="0bf00240-3020-4d01-a24b-06825a2f49d7" providerId="ADAL" clId="{7F501EE3-BA3E-4F2E-8F95-0FA7922C07FC}" dt="2023-05-31T12:10:30.839" v="344" actId="20577"/>
+          <ac:spMkLst>
+            <pc:docMk/>
+            <pc:sldMk cId="4239780882" sldId="286"/>
+            <ac:spMk id="2" creationId="{931451AD-4895-B705-D9DD-AE4EECD87102}"/>
+          </ac:spMkLst>
+        </pc:spChg>
+        <pc:spChg chg="mod">
+          <ac:chgData name="Tiago Fonseca" userId="0bf00240-3020-4d01-a24b-06825a2f49d7" providerId="ADAL" clId="{7F501EE3-BA3E-4F2E-8F95-0FA7922C07FC}" dt="2023-05-31T12:10:56.538" v="350"/>
+          <ac:spMkLst>
+            <pc:docMk/>
+            <pc:sldMk cId="4239780882" sldId="286"/>
+            <ac:spMk id="7" creationId="{3781BB72-06CF-6EC3-7E08-64DE68C0CE29}"/>
+          </ac:spMkLst>
+        </pc:spChg>
+      </pc:sldChg>
+      <pc:sldChg chg="modSp mod ord">
+        <pc:chgData name="Tiago Fonseca" userId="0bf00240-3020-4d01-a24b-06825a2f49d7" providerId="ADAL" clId="{7F501EE3-BA3E-4F2E-8F95-0FA7922C07FC}" dt="2023-05-31T12:05:45.622" v="165" actId="20577"/>
+        <pc:sldMkLst>
+          <pc:docMk/>
+          <pc:sldMk cId="831434331" sldId="287"/>
+        </pc:sldMkLst>
+        <pc:spChg chg="mod">
+          <ac:chgData name="Tiago Fonseca" userId="0bf00240-3020-4d01-a24b-06825a2f49d7" providerId="ADAL" clId="{7F501EE3-BA3E-4F2E-8F95-0FA7922C07FC}" dt="2023-05-31T12:04:58.901" v="154" actId="20577"/>
+          <ac:spMkLst>
+            <pc:docMk/>
+            <pc:sldMk cId="831434331" sldId="287"/>
+            <ac:spMk id="2" creationId="{98A32DE6-6B29-7489-635B-950DAAB3B577}"/>
+          </ac:spMkLst>
+        </pc:spChg>
+        <pc:spChg chg="mod">
+          <ac:chgData name="Tiago Fonseca" userId="0bf00240-3020-4d01-a24b-06825a2f49d7" providerId="ADAL" clId="{7F501EE3-BA3E-4F2E-8F95-0FA7922C07FC}" dt="2023-05-31T12:05:45.622" v="165" actId="20577"/>
+          <ac:spMkLst>
+            <pc:docMk/>
+            <pc:sldMk cId="831434331" sldId="287"/>
+            <ac:spMk id="7" creationId="{4CDF2A1F-BDE4-7ECC-7CEB-42822AAE7A2D}"/>
+          </ac:spMkLst>
+        </pc:spChg>
+      </pc:sldChg>
+      <pc:sldChg chg="modSp mod">
+        <pc:chgData name="Tiago Fonseca" userId="0bf00240-3020-4d01-a24b-06825a2f49d7" providerId="ADAL" clId="{7F501EE3-BA3E-4F2E-8F95-0FA7922C07FC}" dt="2023-05-31T12:12:02.691" v="388"/>
+        <pc:sldMkLst>
+          <pc:docMk/>
+          <pc:sldMk cId="2100602676" sldId="288"/>
+        </pc:sldMkLst>
+        <pc:spChg chg="mod">
+          <ac:chgData name="Tiago Fonseca" userId="0bf00240-3020-4d01-a24b-06825a2f49d7" providerId="ADAL" clId="{7F501EE3-BA3E-4F2E-8F95-0FA7922C07FC}" dt="2023-05-31T12:11:39.574" v="377" actId="20577"/>
+          <ac:spMkLst>
+            <pc:docMk/>
+            <pc:sldMk cId="2100602676" sldId="288"/>
+            <ac:spMk id="2" creationId="{931451AD-4895-B705-D9DD-AE4EECD87102}"/>
+          </ac:spMkLst>
+        </pc:spChg>
+        <pc:spChg chg="mod">
+          <ac:chgData name="Tiago Fonseca" userId="0bf00240-3020-4d01-a24b-06825a2f49d7" providerId="ADAL" clId="{7F501EE3-BA3E-4F2E-8F95-0FA7922C07FC}" dt="2023-05-31T12:12:02.691" v="388"/>
+          <ac:spMkLst>
+            <pc:docMk/>
+            <pc:sldMk cId="2100602676" sldId="288"/>
+            <ac:spMk id="7" creationId="{3781BB72-06CF-6EC3-7E08-64DE68C0CE29}"/>
+          </ac:spMkLst>
+        </pc:spChg>
+      </pc:sldChg>
+      <pc:sldChg chg="modSp add mod">
+        <pc:chgData name="Tiago Fonseca" userId="0bf00240-3020-4d01-a24b-06825a2f49d7" providerId="ADAL" clId="{7F501EE3-BA3E-4F2E-8F95-0FA7922C07FC}" dt="2023-05-31T12:06:29.333" v="198"/>
+        <pc:sldMkLst>
+          <pc:docMk/>
+          <pc:sldMk cId="1519722166" sldId="289"/>
+        </pc:sldMkLst>
+        <pc:spChg chg="mod">
+          <ac:chgData name="Tiago Fonseca" userId="0bf00240-3020-4d01-a24b-06825a2f49d7" providerId="ADAL" clId="{7F501EE3-BA3E-4F2E-8F95-0FA7922C07FC}" dt="2023-05-31T12:06:02.281" v="183" actId="20577"/>
+          <ac:spMkLst>
+            <pc:docMk/>
+            <pc:sldMk cId="1519722166" sldId="289"/>
+            <ac:spMk id="2" creationId="{98A32DE6-6B29-7489-635B-950DAAB3B577}"/>
+          </ac:spMkLst>
+        </pc:spChg>
+        <pc:spChg chg="mod">
+          <ac:chgData name="Tiago Fonseca" userId="0bf00240-3020-4d01-a24b-06825a2f49d7" providerId="ADAL" clId="{7F501EE3-BA3E-4F2E-8F95-0FA7922C07FC}" dt="2023-05-31T12:06:29.333" v="198"/>
+          <ac:spMkLst>
+            <pc:docMk/>
+            <pc:sldMk cId="1519722166" sldId="289"/>
+            <ac:spMk id="7" creationId="{4CDF2A1F-BDE4-7ECC-7CEB-42822AAE7A2D}"/>
+          </ac:spMkLst>
+        </pc:spChg>
+      </pc:sldChg>
+      <pc:sldChg chg="modSp add mod">
+        <pc:chgData name="Tiago Fonseca" userId="0bf00240-3020-4d01-a24b-06825a2f49d7" providerId="ADAL" clId="{7F501EE3-BA3E-4F2E-8F95-0FA7922C07FC}" dt="2023-05-31T12:07:08.513" v="210" actId="20577"/>
+        <pc:sldMkLst>
+          <pc:docMk/>
+          <pc:sldMk cId="2509704459" sldId="290"/>
+        </pc:sldMkLst>
+        <pc:spChg chg="mod">
+          <ac:chgData name="Tiago Fonseca" userId="0bf00240-3020-4d01-a24b-06825a2f49d7" providerId="ADAL" clId="{7F501EE3-BA3E-4F2E-8F95-0FA7922C07FC}" dt="2023-05-31T12:06:46.744" v="201" actId="20577"/>
+          <ac:spMkLst>
+            <pc:docMk/>
+            <pc:sldMk cId="2509704459" sldId="290"/>
+            <ac:spMk id="2" creationId="{98A32DE6-6B29-7489-635B-950DAAB3B577}"/>
+          </ac:spMkLst>
+        </pc:spChg>
+        <pc:spChg chg="mod">
+          <ac:chgData name="Tiago Fonseca" userId="0bf00240-3020-4d01-a24b-06825a2f49d7" providerId="ADAL" clId="{7F501EE3-BA3E-4F2E-8F95-0FA7922C07FC}" dt="2023-05-31T12:07:08.513" v="210" actId="20577"/>
+          <ac:spMkLst>
+            <pc:docMk/>
+            <pc:sldMk cId="2509704459" sldId="290"/>
+            <ac:spMk id="7" creationId="{4CDF2A1F-BDE4-7ECC-7CEB-42822AAE7A2D}"/>
+          </ac:spMkLst>
+        </pc:spChg>
+      </pc:sldChg>
+      <pc:sldChg chg="addSp delSp modSp add mod">
+        <pc:chgData name="Tiago Fonseca" userId="0bf00240-3020-4d01-a24b-06825a2f49d7" providerId="ADAL" clId="{7F501EE3-BA3E-4F2E-8F95-0FA7922C07FC}" dt="2023-05-31T12:09:32.601" v="270" actId="1076"/>
+        <pc:sldMkLst>
+          <pc:docMk/>
+          <pc:sldMk cId="4192160152" sldId="291"/>
+        </pc:sldMkLst>
+        <pc:spChg chg="mod">
+          <ac:chgData name="Tiago Fonseca" userId="0bf00240-3020-4d01-a24b-06825a2f49d7" providerId="ADAL" clId="{7F501EE3-BA3E-4F2E-8F95-0FA7922C07FC}" dt="2023-05-31T12:07:22.599" v="212"/>
+          <ac:spMkLst>
+            <pc:docMk/>
+            <pc:sldMk cId="4192160152" sldId="291"/>
+            <ac:spMk id="2" creationId="{98A32DE6-6B29-7489-635B-950DAAB3B577}"/>
+          </ac:spMkLst>
+        </pc:spChg>
+        <pc:spChg chg="add mod">
+          <ac:chgData name="Tiago Fonseca" userId="0bf00240-3020-4d01-a24b-06825a2f49d7" providerId="ADAL" clId="{7F501EE3-BA3E-4F2E-8F95-0FA7922C07FC}" dt="2023-05-31T12:08:28.868" v="239" actId="14100"/>
+          <ac:spMkLst>
+            <pc:docMk/>
+            <pc:sldMk cId="4192160152" sldId="291"/>
+            <ac:spMk id="3" creationId="{BF09446D-C6D8-006A-8A01-D7A4D8A7B490}"/>
+          </ac:spMkLst>
+        </pc:spChg>
+        <pc:spChg chg="add del mod">
+          <ac:chgData name="Tiago Fonseca" userId="0bf00240-3020-4d01-a24b-06825a2f49d7" providerId="ADAL" clId="{7F501EE3-BA3E-4F2E-8F95-0FA7922C07FC}" dt="2023-05-31T12:08:36.293" v="242"/>
+          <ac:spMkLst>
+            <pc:docMk/>
+            <pc:sldMk cId="4192160152" sldId="291"/>
+            <ac:spMk id="4" creationId="{2E51F97A-CD76-D142-AB40-3019E23A934B}"/>
+          </ac:spMkLst>
+        </pc:spChg>
+        <pc:spChg chg="add mod">
+          <ac:chgData name="Tiago Fonseca" userId="0bf00240-3020-4d01-a24b-06825a2f49d7" providerId="ADAL" clId="{7F501EE3-BA3E-4F2E-8F95-0FA7922C07FC}" dt="2023-05-31T12:09:23.023" v="269" actId="20577"/>
+          <ac:spMkLst>
+            <pc:docMk/>
+            <pc:sldMk cId="4192160152" sldId="291"/>
+            <ac:spMk id="5" creationId="{2AF94BD6-0FDD-D65A-10FD-994322D200A9}"/>
+          </ac:spMkLst>
+        </pc:spChg>
+        <pc:spChg chg="add del mod">
+          <ac:chgData name="Tiago Fonseca" userId="0bf00240-3020-4d01-a24b-06825a2f49d7" providerId="ADAL" clId="{7F501EE3-BA3E-4F2E-8F95-0FA7922C07FC}" dt="2023-05-31T12:09:32.601" v="270" actId="1076"/>
+          <ac:spMkLst>
+            <pc:docMk/>
+            <pc:sldMk cId="4192160152" sldId="291"/>
+            <ac:spMk id="7" creationId="{4CDF2A1F-BDE4-7ECC-7CEB-42822AAE7A2D}"/>
+          </ac:spMkLst>
+        </pc:spChg>
+      </pc:sldChg>
+      <pc:sldChg chg="modSp add mod">
+        <pc:chgData name="Tiago Fonseca" userId="0bf00240-3020-4d01-a24b-06825a2f49d7" providerId="ADAL" clId="{7F501EE3-BA3E-4F2E-8F95-0FA7922C07FC}" dt="2023-05-31T12:11:20.163" v="357" actId="20577"/>
+        <pc:sldMkLst>
+          <pc:docMk/>
+          <pc:sldMk cId="2775588976" sldId="292"/>
+        </pc:sldMkLst>
+        <pc:spChg chg="mod">
+          <ac:chgData name="Tiago Fonseca" userId="0bf00240-3020-4d01-a24b-06825a2f49d7" providerId="ADAL" clId="{7F501EE3-BA3E-4F2E-8F95-0FA7922C07FC}" dt="2023-05-31T12:11:20.163" v="357" actId="20577"/>
+          <ac:spMkLst>
+            <pc:docMk/>
+            <pc:sldMk cId="2775588976" sldId="292"/>
+            <ac:spMk id="7" creationId="{3781BB72-06CF-6EC3-7E08-64DE68C0CE29}"/>
+          </ac:spMkLst>
+        </pc:spChg>
+      </pc:sldChg>
+    </pc:docChg>
+  </pc:docChgLst>
+  <pc:docChgLst>
+    <pc:chgData name="Tiago Fonseca" userId="0bf00240-3020-4d01-a24b-06825a2f49d7" providerId="ADAL" clId="{76692306-DFA8-4EB1-855B-CE25E963310A}"/>
+    <pc:docChg chg="undo custSel addSld delSld modSld sldOrd">
+      <pc:chgData name="Tiago Fonseca" userId="0bf00240-3020-4d01-a24b-06825a2f49d7" providerId="ADAL" clId="{76692306-DFA8-4EB1-855B-CE25E963310A}" dt="2023-04-12T12:04:52.549" v="4278" actId="20577"/>
+      <pc:docMkLst>
+        <pc:docMk/>
+      </pc:docMkLst>
+      <pc:sldChg chg="addSp modSp mod">
+        <pc:chgData name="Tiago Fonseca" userId="0bf00240-3020-4d01-a24b-06825a2f49d7" providerId="ADAL" clId="{76692306-DFA8-4EB1-855B-CE25E963310A}" dt="2023-04-12T12:03:10.795" v="4135" actId="20577"/>
+        <pc:sldMkLst>
+          <pc:docMk/>
+          <pc:sldMk cId="300101176" sldId="256"/>
+        </pc:sldMkLst>
+        <pc:spChg chg="mod">
+          <ac:chgData name="Tiago Fonseca" userId="0bf00240-3020-4d01-a24b-06825a2f49d7" providerId="ADAL" clId="{76692306-DFA8-4EB1-855B-CE25E963310A}" dt="2023-04-12T12:00:17.477" v="4083" actId="20577"/>
+          <ac:spMkLst>
+            <pc:docMk/>
+            <pc:sldMk cId="300101176" sldId="256"/>
+            <ac:spMk id="2" creationId="{08BDDBEB-2A0E-4470-BE29-A528A3A60875}"/>
+          </ac:spMkLst>
+        </pc:spChg>
+        <pc:spChg chg="mod">
+          <ac:chgData name="Tiago Fonseca" userId="0bf00240-3020-4d01-a24b-06825a2f49d7" providerId="ADAL" clId="{76692306-DFA8-4EB1-855B-CE25E963310A}" dt="2023-04-12T12:03:10.795" v="4135" actId="20577"/>
+          <ac:spMkLst>
+            <pc:docMk/>
+            <pc:sldMk cId="300101176" sldId="256"/>
+            <ac:spMk id="3" creationId="{1D090625-51CE-4ECB-81A4-C4905F3FBFE9}"/>
+          </ac:spMkLst>
+        </pc:spChg>
+        <pc:spChg chg="add mod">
+          <ac:chgData name="Tiago Fonseca" userId="0bf00240-3020-4d01-a24b-06825a2f49d7" providerId="ADAL" clId="{76692306-DFA8-4EB1-855B-CE25E963310A}" dt="2023-04-12T12:01:45.356" v="4126" actId="1076"/>
+          <ac:spMkLst>
+            <pc:docMk/>
+            <pc:sldMk cId="300101176" sldId="256"/>
+            <ac:spMk id="4" creationId="{199806C4-19A8-84C4-89D6-D85C7F67C10E}"/>
+          </ac:spMkLst>
+        </pc:spChg>
+      </pc:sldChg>
+      <pc:sldChg chg="del">
+        <pc:chgData name="Tiago Fonseca" userId="0bf00240-3020-4d01-a24b-06825a2f49d7" providerId="ADAL" clId="{76692306-DFA8-4EB1-855B-CE25E963310A}" dt="2023-04-12T11:59:06.282" v="4022" actId="47"/>
+        <pc:sldMkLst>
+          <pc:docMk/>
+          <pc:sldMk cId="1779314252" sldId="265"/>
+        </pc:sldMkLst>
+      </pc:sldChg>
+      <pc:sldChg chg="addSp modSp mod">
+        <pc:chgData name="Tiago Fonseca" userId="0bf00240-3020-4d01-a24b-06825a2f49d7" providerId="ADAL" clId="{76692306-DFA8-4EB1-855B-CE25E963310A}" dt="2023-04-12T12:03:04.950" v="4132" actId="20577"/>
+        <pc:sldMkLst>
+          <pc:docMk/>
+          <pc:sldMk cId="3179833211" sldId="267"/>
+        </pc:sldMkLst>
+        <pc:spChg chg="mod">
+          <ac:chgData name="Tiago Fonseca" userId="0bf00240-3020-4d01-a24b-06825a2f49d7" providerId="ADAL" clId="{76692306-DFA8-4EB1-855B-CE25E963310A}" dt="2023-04-12T12:02:47.655" v="4129"/>
+          <ac:spMkLst>
+            <pc:docMk/>
+            <pc:sldMk cId="3179833211" sldId="267"/>
+            <ac:spMk id="2" creationId="{E734342C-2173-4B23-9C3C-2950C6A3983D}"/>
+          </ac:spMkLst>
+        </pc:spChg>
+        <pc:spChg chg="mod">
+          <ac:chgData name="Tiago Fonseca" userId="0bf00240-3020-4d01-a24b-06825a2f49d7" providerId="ADAL" clId="{76692306-DFA8-4EB1-855B-CE25E963310A}" dt="2023-04-12T12:03:04.950" v="4132" actId="20577"/>
+          <ac:spMkLst>
+            <pc:docMk/>
+            <pc:sldMk cId="3179833211" sldId="267"/>
+            <ac:spMk id="3" creationId="{6A75989C-CEF6-4790-9F3D-DDEC3CEECEF5}"/>
+          </ac:spMkLst>
+        </pc:spChg>
+        <pc:spChg chg="add mod">
+          <ac:chgData name="Tiago Fonseca" userId="0bf00240-3020-4d01-a24b-06825a2f49d7" providerId="ADAL" clId="{76692306-DFA8-4EB1-855B-CE25E963310A}" dt="2023-04-12T12:03:00.976" v="4131" actId="1076"/>
+          <ac:spMkLst>
+            <pc:docMk/>
+            <pc:sldMk cId="3179833211" sldId="267"/>
+            <ac:spMk id="4" creationId="{F71B7273-E2EE-1174-E617-78EF32D51BA2}"/>
+          </ac:spMkLst>
+        </pc:spChg>
+      </pc:sldChg>
+      <pc:sldChg chg="del">
+        <pc:chgData name="Tiago Fonseca" userId="0bf00240-3020-4d01-a24b-06825a2f49d7" providerId="ADAL" clId="{76692306-DFA8-4EB1-855B-CE25E963310A}" dt="2023-04-12T11:59:07.598" v="4023" actId="47"/>
+        <pc:sldMkLst>
+          <pc:docMk/>
+          <pc:sldMk cId="3019627190" sldId="268"/>
+        </pc:sldMkLst>
+      </pc:sldChg>
+      <pc:sldChg chg="modSp del mod">
+        <pc:chgData name="Tiago Fonseca" userId="0bf00240-3020-4d01-a24b-06825a2f49d7" providerId="ADAL" clId="{76692306-DFA8-4EB1-855B-CE25E963310A}" dt="2023-04-12T11:59:05.602" v="4021" actId="47"/>
+        <pc:sldMkLst>
+          <pc:docMk/>
+          <pc:sldMk cId="825492604" sldId="270"/>
+        </pc:sldMkLst>
+        <pc:spChg chg="mod">
+          <ac:chgData name="Tiago Fonseca" userId="0bf00240-3020-4d01-a24b-06825a2f49d7" providerId="ADAL" clId="{76692306-DFA8-4EB1-855B-CE25E963310A}" dt="2023-04-12T10:24:10.886" v="487" actId="20577"/>
+          <ac:spMkLst>
+            <pc:docMk/>
+            <pc:sldMk cId="825492604" sldId="270"/>
+            <ac:spMk id="63" creationId="{69F1744A-CA11-44DA-AE09-C24B436C1B4F}"/>
+          </ac:spMkLst>
+        </pc:spChg>
+        <pc:graphicFrameChg chg="mod">
+          <ac:chgData name="Tiago Fonseca" userId="0bf00240-3020-4d01-a24b-06825a2f49d7" providerId="ADAL" clId="{76692306-DFA8-4EB1-855B-CE25E963310A}" dt="2023-04-12T11:56:22.831" v="3787"/>
+          <ac:graphicFrameMkLst>
+            <pc:docMk/>
+            <pc:sldMk cId="825492604" sldId="270"/>
+            <ac:graphicFrameMk id="18" creationId="{FB509DA5-15CF-4F50-8076-F311C53562F4}"/>
+          </ac:graphicFrameMkLst>
+        </pc:graphicFrameChg>
+        <pc:picChg chg="mod">
+          <ac:chgData name="Tiago Fonseca" userId="0bf00240-3020-4d01-a24b-06825a2f49d7" providerId="ADAL" clId="{76692306-DFA8-4EB1-855B-CE25E963310A}" dt="2023-04-12T10:24:13.577" v="488" actId="1076"/>
+          <ac:picMkLst>
+            <pc:docMk/>
+            <pc:sldMk cId="825492604" sldId="270"/>
+            <ac:picMk id="6" creationId="{65EB9C0E-82E1-4B5B-A48D-C50A96A0164A}"/>
+          </ac:picMkLst>
+        </pc:picChg>
+      </pc:sldChg>
+      <pc:sldChg chg="modSp new mod">
+        <pc:chgData name="Tiago Fonseca" userId="0bf00240-3020-4d01-a24b-06825a2f49d7" providerId="ADAL" clId="{76692306-DFA8-4EB1-855B-CE25E963310A}" dt="2023-04-12T11:13:54.918" v="1686" actId="20577"/>
+        <pc:sldMkLst>
+          <pc:docMk/>
+          <pc:sldMk cId="2113348865" sldId="271"/>
+        </pc:sldMkLst>
+        <pc:spChg chg="mod">
+          <ac:chgData name="Tiago Fonseca" userId="0bf00240-3020-4d01-a24b-06825a2f49d7" providerId="ADAL" clId="{76692306-DFA8-4EB1-855B-CE25E963310A}" dt="2023-04-12T10:12:56.314" v="175" actId="122"/>
+          <ac:spMkLst>
+            <pc:docMk/>
+            <pc:sldMk cId="2113348865" sldId="271"/>
+            <ac:spMk id="2" creationId="{98A32DE6-6B29-7489-635B-950DAAB3B577}"/>
+          </ac:spMkLst>
+        </pc:spChg>
+        <pc:spChg chg="mod">
+          <ac:chgData name="Tiago Fonseca" userId="0bf00240-3020-4d01-a24b-06825a2f49d7" providerId="ADAL" clId="{76692306-DFA8-4EB1-855B-CE25E963310A}" dt="2023-04-12T11:13:54.918" v="1686" actId="20577"/>
+          <ac:spMkLst>
+            <pc:docMk/>
+            <pc:sldMk cId="2113348865" sldId="271"/>
+            <ac:spMk id="3" creationId="{E82AFDAC-88B1-3AB9-A268-4DF9CBD41DFE}"/>
+          </ac:spMkLst>
+        </pc:spChg>
+      </pc:sldChg>
+      <pc:sldChg chg="modSp add mod">
+        <pc:chgData name="Tiago Fonseca" userId="0bf00240-3020-4d01-a24b-06825a2f49d7" providerId="ADAL" clId="{76692306-DFA8-4EB1-855B-CE25E963310A}" dt="2023-04-12T11:13:50.031" v="1682" actId="20577"/>
+        <pc:sldMkLst>
+          <pc:docMk/>
+          <pc:sldMk cId="3065993080" sldId="272"/>
+        </pc:sldMkLst>
+        <pc:spChg chg="mod">
+          <ac:chgData name="Tiago Fonseca" userId="0bf00240-3020-4d01-a24b-06825a2f49d7" providerId="ADAL" clId="{76692306-DFA8-4EB1-855B-CE25E963310A}" dt="2023-04-12T10:26:22.953" v="534" actId="20577"/>
+          <ac:spMkLst>
+            <pc:docMk/>
+            <pc:sldMk cId="3065993080" sldId="272"/>
+            <ac:spMk id="2" creationId="{98A32DE6-6B29-7489-635B-950DAAB3B577}"/>
+          </ac:spMkLst>
+        </pc:spChg>
+        <pc:spChg chg="mod">
+          <ac:chgData name="Tiago Fonseca" userId="0bf00240-3020-4d01-a24b-06825a2f49d7" providerId="ADAL" clId="{76692306-DFA8-4EB1-855B-CE25E963310A}" dt="2023-04-12T11:13:50.031" v="1682" actId="20577"/>
+          <ac:spMkLst>
+            <pc:docMk/>
+            <pc:sldMk cId="3065993080" sldId="272"/>
+            <ac:spMk id="3" creationId="{E82AFDAC-88B1-3AB9-A268-4DF9CBD41DFE}"/>
+          </ac:spMkLst>
+        </pc:spChg>
+      </pc:sldChg>
+      <pc:sldChg chg="modSp new del mod">
+        <pc:chgData name="Tiago Fonseca" userId="0bf00240-3020-4d01-a24b-06825a2f49d7" providerId="ADAL" clId="{76692306-DFA8-4EB1-855B-CE25E963310A}" dt="2023-04-12T11:00:16.033" v="1014" actId="47"/>
+        <pc:sldMkLst>
+          <pc:docMk/>
+          <pc:sldMk cId="1307581228" sldId="273"/>
+        </pc:sldMkLst>
+        <pc:spChg chg="mod">
+          <ac:chgData name="Tiago Fonseca" userId="0bf00240-3020-4d01-a24b-06825a2f49d7" providerId="ADAL" clId="{76692306-DFA8-4EB1-855B-CE25E963310A}" dt="2023-04-12T11:00:14.509" v="1013" actId="20577"/>
+          <ac:spMkLst>
+            <pc:docMk/>
+            <pc:sldMk cId="1307581228" sldId="273"/>
+            <ac:spMk id="2" creationId="{A9C16738-60BE-4E5A-8BF9-EB5A41EB2D1F}"/>
+          </ac:spMkLst>
+        </pc:spChg>
+        <pc:spChg chg="mod">
+          <ac:chgData name="Tiago Fonseca" userId="0bf00240-3020-4d01-a24b-06825a2f49d7" providerId="ADAL" clId="{76692306-DFA8-4EB1-855B-CE25E963310A}" dt="2023-04-12T11:00:14.390" v="1012" actId="1076"/>
+          <ac:spMkLst>
+            <pc:docMk/>
+            <pc:sldMk cId="1307581228" sldId="273"/>
+            <ac:spMk id="3" creationId="{BB96EA41-C393-7CAF-6F16-1045263A701A}"/>
+          </ac:spMkLst>
+        </pc:spChg>
+      </pc:sldChg>
+      <pc:sldChg chg="modSp add del mod">
+        <pc:chgData name="Tiago Fonseca" userId="0bf00240-3020-4d01-a24b-06825a2f49d7" providerId="ADAL" clId="{76692306-DFA8-4EB1-855B-CE25E963310A}" dt="2023-04-12T11:13:46.243" v="1679" actId="47"/>
+        <pc:sldMkLst>
+          <pc:docMk/>
+          <pc:sldMk cId="1478104791" sldId="273"/>
+        </pc:sldMkLst>
+        <pc:spChg chg="mod">
+          <ac:chgData name="Tiago Fonseca" userId="0bf00240-3020-4d01-a24b-06825a2f49d7" providerId="ADAL" clId="{76692306-DFA8-4EB1-855B-CE25E963310A}" dt="2023-04-12T11:00:29.931" v="1053" actId="20577"/>
+          <ac:spMkLst>
+            <pc:docMk/>
+            <pc:sldMk cId="1478104791" sldId="273"/>
+            <ac:spMk id="2" creationId="{98A32DE6-6B29-7489-635B-950DAAB3B577}"/>
+          </ac:spMkLst>
+        </pc:spChg>
+        <pc:spChg chg="mod">
+          <ac:chgData name="Tiago Fonseca" userId="0bf00240-3020-4d01-a24b-06825a2f49d7" providerId="ADAL" clId="{76692306-DFA8-4EB1-855B-CE25E963310A}" dt="2023-04-12T11:00:47.825" v="1054" actId="20577"/>
+          <ac:spMkLst>
+            <pc:docMk/>
+            <pc:sldMk cId="1478104791" sldId="273"/>
+            <ac:spMk id="3" creationId="{E82AFDAC-88B1-3AB9-A268-4DF9CBD41DFE}"/>
+          </ac:spMkLst>
+        </pc:spChg>
+      </pc:sldChg>
+      <pc:sldChg chg="addSp delSp modSp new mod">
+        <pc:chgData name="Tiago Fonseca" userId="0bf00240-3020-4d01-a24b-06825a2f49d7" providerId="ADAL" clId="{76692306-DFA8-4EB1-855B-CE25E963310A}" dt="2023-04-12T11:39:39.054" v="2771" actId="20577"/>
+        <pc:sldMkLst>
+          <pc:docMk/>
+          <pc:sldMk cId="910042957" sldId="274"/>
+        </pc:sldMkLst>
+        <pc:spChg chg="mod">
+          <ac:chgData name="Tiago Fonseca" userId="0bf00240-3020-4d01-a24b-06825a2f49d7" providerId="ADAL" clId="{76692306-DFA8-4EB1-855B-CE25E963310A}" dt="2023-04-12T11:01:06.952" v="1057" actId="122"/>
+          <ac:spMkLst>
+            <pc:docMk/>
+            <pc:sldMk cId="910042957" sldId="274"/>
+            <ac:spMk id="2" creationId="{F80209FA-4D24-0148-E718-9C1510C7C568}"/>
+          </ac:spMkLst>
+        </pc:spChg>
+        <pc:spChg chg="mod">
+          <ac:chgData name="Tiago Fonseca" userId="0bf00240-3020-4d01-a24b-06825a2f49d7" providerId="ADAL" clId="{76692306-DFA8-4EB1-855B-CE25E963310A}" dt="2023-04-12T11:13:39.641" v="1678" actId="20577"/>
+          <ac:spMkLst>
+            <pc:docMk/>
+            <pc:sldMk cId="910042957" sldId="274"/>
+            <ac:spMk id="3" creationId="{065F10BD-3D55-BF92-2559-D3553D8B83C6}"/>
+          </ac:spMkLst>
+        </pc:spChg>
+        <pc:spChg chg="mod">
+          <ac:chgData name="Tiago Fonseca" userId="0bf00240-3020-4d01-a24b-06825a2f49d7" providerId="ADAL" clId="{76692306-DFA8-4EB1-855B-CE25E963310A}" dt="2023-04-12T11:39:39.054" v="2771" actId="20577"/>
+          <ac:spMkLst>
+            <pc:docMk/>
+            <pc:sldMk cId="910042957" sldId="274"/>
+            <ac:spMk id="4" creationId="{5E5D4841-5C29-E6AC-66B2-93E335ACD303}"/>
+          </ac:spMkLst>
+        </pc:spChg>
+        <pc:spChg chg="add del mod">
+          <ac:chgData name="Tiago Fonseca" userId="0bf00240-3020-4d01-a24b-06825a2f49d7" providerId="ADAL" clId="{76692306-DFA8-4EB1-855B-CE25E963310A}" dt="2023-04-12T11:13:36.502" v="1673" actId="20577"/>
+          <ac:spMkLst>
+            <pc:docMk/>
+            <pc:sldMk cId="910042957" sldId="274"/>
+            <ac:spMk id="5" creationId="{2CF51BCB-2469-B572-DE58-0240E8741017}"/>
+          </ac:spMkLst>
+        </pc:spChg>
+      </pc:sldChg>
+      <pc:sldChg chg="modSp new mod">
+        <pc:chgData name="Tiago Fonseca" userId="0bf00240-3020-4d01-a24b-06825a2f49d7" providerId="ADAL" clId="{76692306-DFA8-4EB1-855B-CE25E963310A}" dt="2023-04-12T11:35:09.743" v="2636" actId="20577"/>
+        <pc:sldMkLst>
+          <pc:docMk/>
+          <pc:sldMk cId="680076668" sldId="275"/>
+        </pc:sldMkLst>
+        <pc:spChg chg="mod">
+          <ac:chgData name="Tiago Fonseca" userId="0bf00240-3020-4d01-a24b-06825a2f49d7" providerId="ADAL" clId="{76692306-DFA8-4EB1-855B-CE25E963310A}" dt="2023-04-12T11:14:51.801" v="1689" actId="122"/>
+          <ac:spMkLst>
+            <pc:docMk/>
+            <pc:sldMk cId="680076668" sldId="275"/>
+            <ac:spMk id="2" creationId="{0DD409D6-3AA3-7670-9071-DD0DF9CF1E10}"/>
+          </ac:spMkLst>
+        </pc:spChg>
+        <pc:spChg chg="mod">
+          <ac:chgData name="Tiago Fonseca" userId="0bf00240-3020-4d01-a24b-06825a2f49d7" providerId="ADAL" clId="{76692306-DFA8-4EB1-855B-CE25E963310A}" dt="2023-04-12T11:30:11.907" v="2239" actId="20577"/>
+          <ac:spMkLst>
+            <pc:docMk/>
+            <pc:sldMk cId="680076668" sldId="275"/>
+            <ac:spMk id="3" creationId="{CD082B02-EF67-87B5-E87B-D0D61784FB0D}"/>
+          </ac:spMkLst>
+        </pc:spChg>
+        <pc:spChg chg="mod">
+          <ac:chgData name="Tiago Fonseca" userId="0bf00240-3020-4d01-a24b-06825a2f49d7" providerId="ADAL" clId="{76692306-DFA8-4EB1-855B-CE25E963310A}" dt="2023-04-12T11:35:09.743" v="2636" actId="20577"/>
+          <ac:spMkLst>
+            <pc:docMk/>
+            <pc:sldMk cId="680076668" sldId="275"/>
+            <ac:spMk id="4" creationId="{F110BDDD-461C-CF6B-286B-3AB4D5057BE1}"/>
+          </ac:spMkLst>
+        </pc:spChg>
+      </pc:sldChg>
+      <pc:sldChg chg="modSp add mod ord">
+        <pc:chgData name="Tiago Fonseca" userId="0bf00240-3020-4d01-a24b-06825a2f49d7" providerId="ADAL" clId="{76692306-DFA8-4EB1-855B-CE25E963310A}" dt="2023-04-12T11:41:59.293" v="3009" actId="20577"/>
+        <pc:sldMkLst>
+          <pc:docMk/>
+          <pc:sldMk cId="972465295" sldId="276"/>
+        </pc:sldMkLst>
+        <pc:spChg chg="mod">
+          <ac:chgData name="Tiago Fonseca" userId="0bf00240-3020-4d01-a24b-06825a2f49d7" providerId="ADAL" clId="{76692306-DFA8-4EB1-855B-CE25E963310A}" dt="2023-04-12T11:35:51.588" v="2640"/>
+          <ac:spMkLst>
+            <pc:docMk/>
+            <pc:sldMk cId="972465295" sldId="276"/>
+            <ac:spMk id="2" creationId="{98A32DE6-6B29-7489-635B-950DAAB3B577}"/>
+          </ac:spMkLst>
+        </pc:spChg>
+        <pc:spChg chg="mod">
+          <ac:chgData name="Tiago Fonseca" userId="0bf00240-3020-4d01-a24b-06825a2f49d7" providerId="ADAL" clId="{76692306-DFA8-4EB1-855B-CE25E963310A}" dt="2023-04-12T11:41:59.293" v="3009" actId="20577"/>
+          <ac:spMkLst>
+            <pc:docMk/>
+            <pc:sldMk cId="972465295" sldId="276"/>
+            <ac:spMk id="3" creationId="{E82AFDAC-88B1-3AB9-A268-4DF9CBD41DFE}"/>
+          </ac:spMkLst>
+        </pc:spChg>
+      </pc:sldChg>
+      <pc:sldChg chg="modSp new mod">
+        <pc:chgData name="Tiago Fonseca" userId="0bf00240-3020-4d01-a24b-06825a2f49d7" providerId="ADAL" clId="{76692306-DFA8-4EB1-855B-CE25E963310A}" dt="2023-04-12T11:48:28.043" v="3646" actId="122"/>
+        <pc:sldMkLst>
+          <pc:docMk/>
+          <pc:sldMk cId="1489756019" sldId="277"/>
+        </pc:sldMkLst>
+        <pc:spChg chg="mod">
+          <ac:chgData name="Tiago Fonseca" userId="0bf00240-3020-4d01-a24b-06825a2f49d7" providerId="ADAL" clId="{76692306-DFA8-4EB1-855B-CE25E963310A}" dt="2023-04-12T11:43:20.747" v="3042" actId="122"/>
+          <ac:spMkLst>
+            <pc:docMk/>
+            <pc:sldMk cId="1489756019" sldId="277"/>
+            <ac:spMk id="2" creationId="{931451AD-4895-B705-D9DD-AE4EECD87102}"/>
+          </ac:spMkLst>
+        </pc:spChg>
+        <pc:spChg chg="mod">
+          <ac:chgData name="Tiago Fonseca" userId="0bf00240-3020-4d01-a24b-06825a2f49d7" providerId="ADAL" clId="{76692306-DFA8-4EB1-855B-CE25E963310A}" dt="2023-04-12T11:43:31.057" v="3072" actId="122"/>
+          <ac:spMkLst>
+            <pc:docMk/>
+            <pc:sldMk cId="1489756019" sldId="277"/>
+            <ac:spMk id="3" creationId="{19D03FC5-AAFD-D05F-F5BB-2BCF0AE0B45C}"/>
+          </ac:spMkLst>
+        </pc:spChg>
+        <pc:spChg chg="mod">
+          <ac:chgData name="Tiago Fonseca" userId="0bf00240-3020-4d01-a24b-06825a2f49d7" providerId="ADAL" clId="{76692306-DFA8-4EB1-855B-CE25E963310A}" dt="2023-04-12T11:48:28.043" v="3646" actId="122"/>
+          <ac:spMkLst>
+            <pc:docMk/>
+            <pc:sldMk cId="1489756019" sldId="277"/>
+            <ac:spMk id="4" creationId="{2721AF49-4A4E-A592-68FA-93F3A1029D40}"/>
+          </ac:spMkLst>
+        </pc:spChg>
+        <pc:spChg chg="mod">
+          <ac:chgData name="Tiago Fonseca" userId="0bf00240-3020-4d01-a24b-06825a2f49d7" providerId="ADAL" clId="{76692306-DFA8-4EB1-855B-CE25E963310A}" dt="2023-04-12T11:45:54.127" v="3392" actId="20577"/>
+          <ac:spMkLst>
+            <pc:docMk/>
+            <pc:sldMk cId="1489756019" sldId="277"/>
+            <ac:spMk id="5" creationId="{EA967136-6D3A-65E4-0498-29BD719A84A3}"/>
+          </ac:spMkLst>
+        </pc:spChg>
+        <pc:spChg chg="mod">
+          <ac:chgData name="Tiago Fonseca" userId="0bf00240-3020-4d01-a24b-06825a2f49d7" providerId="ADAL" clId="{76692306-DFA8-4EB1-855B-CE25E963310A}" dt="2023-04-12T11:48:23.327" v="3645" actId="20577"/>
+          <ac:spMkLst>
+            <pc:docMk/>
+            <pc:sldMk cId="1489756019" sldId="277"/>
+            <ac:spMk id="6" creationId="{E35D8F96-B8AD-CDB0-20C5-3C57BE40BF8F}"/>
+          </ac:spMkLst>
+        </pc:spChg>
+      </pc:sldChg>
+      <pc:sldChg chg="addSp delSp modSp add mod">
+        <pc:chgData name="Tiago Fonseca" userId="0bf00240-3020-4d01-a24b-06825a2f49d7" providerId="ADAL" clId="{76692306-DFA8-4EB1-855B-CE25E963310A}" dt="2023-04-12T11:58:53.049" v="4020" actId="14100"/>
+        <pc:sldMkLst>
+          <pc:docMk/>
+          <pc:sldMk cId="161939914" sldId="278"/>
+        </pc:sldMkLst>
+        <pc:spChg chg="mod">
+          <ac:chgData name="Tiago Fonseca" userId="0bf00240-3020-4d01-a24b-06825a2f49d7" providerId="ADAL" clId="{76692306-DFA8-4EB1-855B-CE25E963310A}" dt="2023-04-12T11:50:06.983" v="3669" actId="20577"/>
+          <ac:spMkLst>
+            <pc:docMk/>
+            <pc:sldMk cId="161939914" sldId="278"/>
+            <ac:spMk id="3" creationId="{19D03FC5-AAFD-D05F-F5BB-2BCF0AE0B45C}"/>
+          </ac:spMkLst>
+        </pc:spChg>
+        <pc:spChg chg="del mod">
+          <ac:chgData name="Tiago Fonseca" userId="0bf00240-3020-4d01-a24b-06825a2f49d7" providerId="ADAL" clId="{76692306-DFA8-4EB1-855B-CE25E963310A}" dt="2023-04-12T11:50:13.061" v="3673" actId="478"/>
+          <ac:spMkLst>
+            <pc:docMk/>
+            <pc:sldMk cId="161939914" sldId="278"/>
+            <ac:spMk id="4" creationId="{2721AF49-4A4E-A592-68FA-93F3A1029D40}"/>
+          </ac:spMkLst>
+        </pc:spChg>
+        <pc:spChg chg="mod">
+          <ac:chgData name="Tiago Fonseca" userId="0bf00240-3020-4d01-a24b-06825a2f49d7" providerId="ADAL" clId="{76692306-DFA8-4EB1-855B-CE25E963310A}" dt="2023-04-12T11:57:38.180" v="3836" actId="20577"/>
+          <ac:spMkLst>
+            <pc:docMk/>
+            <pc:sldMk cId="161939914" sldId="278"/>
+            <ac:spMk id="5" creationId="{EA967136-6D3A-65E4-0498-29BD719A84A3}"/>
+          </ac:spMkLst>
+        </pc:spChg>
+        <pc:spChg chg="mod">
+          <ac:chgData name="Tiago Fonseca" userId="0bf00240-3020-4d01-a24b-06825a2f49d7" providerId="ADAL" clId="{76692306-DFA8-4EB1-855B-CE25E963310A}" dt="2023-04-12T11:58:53.049" v="4020" actId="14100"/>
+          <ac:spMkLst>
+            <pc:docMk/>
+            <pc:sldMk cId="161939914" sldId="278"/>
+            <ac:spMk id="6" creationId="{E35D8F96-B8AD-CDB0-20C5-3C57BE40BF8F}"/>
+          </ac:spMkLst>
+        </pc:spChg>
+        <pc:spChg chg="add del mod">
+          <ac:chgData name="Tiago Fonseca" userId="0bf00240-3020-4d01-a24b-06825a2f49d7" providerId="ADAL" clId="{76692306-DFA8-4EB1-855B-CE25E963310A}" dt="2023-04-12T11:53:30.901" v="3727" actId="478"/>
+          <ac:spMkLst>
+            <pc:docMk/>
+            <pc:sldMk cId="161939914" sldId="278"/>
+            <ac:spMk id="7" creationId="{69707711-68FE-BAE2-56EC-35762EE33225}"/>
+          </ac:spMkLst>
+        </pc:spChg>
+        <pc:spChg chg="add mod">
+          <ac:chgData name="Tiago Fonseca" userId="0bf00240-3020-4d01-a24b-06825a2f49d7" providerId="ADAL" clId="{76692306-DFA8-4EB1-855B-CE25E963310A}" dt="2023-04-12T11:57:22.928" v="3805" actId="1076"/>
+          <ac:spMkLst>
+            <pc:docMk/>
+            <pc:sldMk cId="161939914" sldId="278"/>
+            <ac:spMk id="9" creationId="{944D995E-D83D-18C3-48AB-DB1B0B8096BE}"/>
+          </ac:spMkLst>
+        </pc:spChg>
+        <pc:spChg chg="add del mod">
+          <ac:chgData name="Tiago Fonseca" userId="0bf00240-3020-4d01-a24b-06825a2f49d7" providerId="ADAL" clId="{76692306-DFA8-4EB1-855B-CE25E963310A}" dt="2023-04-12T11:56:26.914" v="3788" actId="478"/>
+          <ac:spMkLst>
+            <pc:docMk/>
+            <pc:sldMk cId="161939914" sldId="278"/>
+            <ac:spMk id="11" creationId="{D5EC9E16-5DF7-E8A4-4A15-914612A44D0A}"/>
+          </ac:spMkLst>
+        </pc:spChg>
+        <pc:spChg chg="add del mod">
+          <ac:chgData name="Tiago Fonseca" userId="0bf00240-3020-4d01-a24b-06825a2f49d7" providerId="ADAL" clId="{76692306-DFA8-4EB1-855B-CE25E963310A}" dt="2023-04-12T11:55:42.191" v="3752" actId="478"/>
+          <ac:spMkLst>
+            <pc:docMk/>
+            <pc:sldMk cId="161939914" sldId="278"/>
+            <ac:spMk id="13" creationId="{80785B91-98E9-33F4-ED04-4235BD6BE59F}"/>
+          </ac:spMkLst>
+        </pc:spChg>
+        <pc:spChg chg="add mod">
+          <ac:chgData name="Tiago Fonseca" userId="0bf00240-3020-4d01-a24b-06825a2f49d7" providerId="ADAL" clId="{76692306-DFA8-4EB1-855B-CE25E963310A}" dt="2023-04-12T11:50:14.043" v="3674"/>
+          <ac:spMkLst>
+            <pc:docMk/>
+            <pc:sldMk cId="161939914" sldId="278"/>
+            <ac:spMk id="15" creationId="{4247156B-2B9A-A2A0-AA10-DDFD8C5FA830}"/>
+          </ac:spMkLst>
+        </pc:spChg>
+        <pc:spChg chg="add mod">
+          <ac:chgData name="Tiago Fonseca" userId="0bf00240-3020-4d01-a24b-06825a2f49d7" providerId="ADAL" clId="{76692306-DFA8-4EB1-855B-CE25E963310A}" dt="2023-04-12T11:55:57.803" v="3786" actId="20577"/>
+          <ac:spMkLst>
+            <pc:docMk/>
+            <pc:sldMk cId="161939914" sldId="278"/>
+            <ac:spMk id="16" creationId="{55636A7F-5BB6-BCDE-788B-0B57D5C493E0}"/>
+          </ac:spMkLst>
+        </pc:spChg>
+        <pc:spChg chg="add mod">
+          <ac:chgData name="Tiago Fonseca" userId="0bf00240-3020-4d01-a24b-06825a2f49d7" providerId="ADAL" clId="{76692306-DFA8-4EB1-855B-CE25E963310A}" dt="2023-04-12T11:50:14.043" v="3674"/>
+          <ac:spMkLst>
+            <pc:docMk/>
+            <pc:sldMk cId="161939914" sldId="278"/>
+            <ac:spMk id="17" creationId="{7FE6D273-1AA5-27FB-A178-EBDA6D82937E}"/>
+          </ac:spMkLst>
+        </pc:spChg>
+        <pc:spChg chg="add mod">
+          <ac:chgData name="Tiago Fonseca" userId="0bf00240-3020-4d01-a24b-06825a2f49d7" providerId="ADAL" clId="{76692306-DFA8-4EB1-855B-CE25E963310A}" dt="2023-04-12T11:56:43.224" v="3804" actId="20577"/>
+          <ac:spMkLst>
+            <pc:docMk/>
+            <pc:sldMk cId="161939914" sldId="278"/>
+            <ac:spMk id="18" creationId="{4DC04336-F4DD-24EF-10DB-31EFE23A002D}"/>
+          </ac:spMkLst>
+        </pc:spChg>
+        <pc:spChg chg="add mod">
+          <ac:chgData name="Tiago Fonseca" userId="0bf00240-3020-4d01-a24b-06825a2f49d7" providerId="ADAL" clId="{76692306-DFA8-4EB1-855B-CE25E963310A}" dt="2023-04-12T11:50:14.043" v="3674"/>
+          <ac:spMkLst>
+            <pc:docMk/>
+            <pc:sldMk cId="161939914" sldId="278"/>
+            <ac:spMk id="19" creationId="{F11F09F9-514C-F78A-9EAF-7A8D9526EFA4}"/>
+          </ac:spMkLst>
+        </pc:spChg>
+        <pc:spChg chg="add mod">
+          <ac:chgData name="Tiago Fonseca" userId="0bf00240-3020-4d01-a24b-06825a2f49d7" providerId="ADAL" clId="{76692306-DFA8-4EB1-855B-CE25E963310A}" dt="2023-04-12T11:51:01.297" v="3721"/>
+          <ac:spMkLst>
+            <pc:docMk/>
+            <pc:sldMk cId="161939914" sldId="278"/>
+            <ac:spMk id="20" creationId="{3AF3475E-35F2-B8F0-5AF1-97D81832BAAF}"/>
+          </ac:spMkLst>
+        </pc:spChg>
+        <pc:spChg chg="add mod">
+          <ac:chgData name="Tiago Fonseca" userId="0bf00240-3020-4d01-a24b-06825a2f49d7" providerId="ADAL" clId="{76692306-DFA8-4EB1-855B-CE25E963310A}" dt="2023-04-12T11:50:14.043" v="3674"/>
+          <ac:spMkLst>
+            <pc:docMk/>
+            <pc:sldMk cId="161939914" sldId="278"/>
+            <ac:spMk id="21" creationId="{2AA129E7-29F0-0EBC-A0D9-9B187A25618C}"/>
+          </ac:spMkLst>
+        </pc:spChg>
+        <pc:spChg chg="add mod">
+          <ac:chgData name="Tiago Fonseca" userId="0bf00240-3020-4d01-a24b-06825a2f49d7" providerId="ADAL" clId="{76692306-DFA8-4EB1-855B-CE25E963310A}" dt="2023-04-12T11:53:51.784" v="3747" actId="20577"/>
+          <ac:spMkLst>
+            <pc:docMk/>
+            <pc:sldMk cId="161939914" sldId="278"/>
+            <ac:spMk id="22" creationId="{02DED6E8-DCAB-A8EA-6E63-9E8200EAD292}"/>
+          </ac:spMkLst>
+        </pc:spChg>
+        <pc:spChg chg="add del">
+          <ac:chgData name="Tiago Fonseca" userId="0bf00240-3020-4d01-a24b-06825a2f49d7" providerId="ADAL" clId="{76692306-DFA8-4EB1-855B-CE25E963310A}" dt="2023-04-12T11:50:58.327" v="3720" actId="22"/>
+          <ac:spMkLst>
+            <pc:docMk/>
+            <pc:sldMk cId="161939914" sldId="278"/>
+            <ac:spMk id="24" creationId="{12E19AD0-0767-1A2E-4C4F-B45C94542B87}"/>
+          </ac:spMkLst>
+        </pc:spChg>
+        <pc:spChg chg="add mod">
+          <ac:chgData name="Tiago Fonseca" userId="0bf00240-3020-4d01-a24b-06825a2f49d7" providerId="ADAL" clId="{76692306-DFA8-4EB1-855B-CE25E963310A}" dt="2023-04-12T11:57:22.928" v="3805" actId="1076"/>
+          <ac:spMkLst>
+            <pc:docMk/>
+            <pc:sldMk cId="161939914" sldId="278"/>
+            <ac:spMk id="25" creationId="{1856EEED-6E7B-2275-368A-0AEC8FEF1D60}"/>
+          </ac:spMkLst>
+        </pc:spChg>
+        <pc:spChg chg="add mod">
+          <ac:chgData name="Tiago Fonseca" userId="0bf00240-3020-4d01-a24b-06825a2f49d7" providerId="ADAL" clId="{76692306-DFA8-4EB1-855B-CE25E963310A}" dt="2023-04-12T11:57:22.928" v="3805" actId="1076"/>
+          <ac:spMkLst>
+            <pc:docMk/>
+            <pc:sldMk cId="161939914" sldId="278"/>
+            <ac:spMk id="26" creationId="{C8DAACAB-519A-4567-A479-8972FE217083}"/>
+          </ac:spMkLst>
+        </pc:spChg>
+        <pc:spChg chg="add mod">
+          <ac:chgData name="Tiago Fonseca" userId="0bf00240-3020-4d01-a24b-06825a2f49d7" providerId="ADAL" clId="{76692306-DFA8-4EB1-855B-CE25E963310A}" dt="2023-04-12T11:57:22.928" v="3805" actId="1076"/>
+          <ac:spMkLst>
+            <pc:docMk/>
+            <pc:sldMk cId="161939914" sldId="278"/>
+            <ac:spMk id="27" creationId="{55BBC641-2F8E-6AC9-214D-B3666E0AB105}"/>
+          </ac:spMkLst>
+        </pc:spChg>
+        <pc:grpChg chg="add mod">
+          <ac:chgData name="Tiago Fonseca" userId="0bf00240-3020-4d01-a24b-06825a2f49d7" providerId="ADAL" clId="{76692306-DFA8-4EB1-855B-CE25E963310A}" dt="2023-04-12T11:57:22.928" v="3805" actId="1076"/>
+          <ac:grpSpMkLst>
+            <pc:docMk/>
+            <pc:sldMk cId="161939914" sldId="278"/>
+            <ac:grpSpMk id="8" creationId="{D103C0C7-88A6-DAA6-9E00-AEAA838178DF}"/>
+          </ac:grpSpMkLst>
+        </pc:grpChg>
+        <pc:grpChg chg="add mod">
+          <ac:chgData name="Tiago Fonseca" userId="0bf00240-3020-4d01-a24b-06825a2f49d7" providerId="ADAL" clId="{76692306-DFA8-4EB1-855B-CE25E963310A}" dt="2023-04-12T11:57:22.928" v="3805" actId="1076"/>
+          <ac:grpSpMkLst>
+            <pc:docMk/>
+            <pc:sldMk cId="161939914" sldId="278"/>
+            <ac:grpSpMk id="10" creationId="{7C0D1C03-E6C7-8A96-EF04-0207A6DCC379}"/>
+          </ac:grpSpMkLst>
+        </pc:grpChg>
+        <pc:grpChg chg="add mod">
+          <ac:chgData name="Tiago Fonseca" userId="0bf00240-3020-4d01-a24b-06825a2f49d7" providerId="ADAL" clId="{76692306-DFA8-4EB1-855B-CE25E963310A}" dt="2023-04-12T11:57:22.928" v="3805" actId="1076"/>
+          <ac:grpSpMkLst>
+            <pc:docMk/>
+            <pc:sldMk cId="161939914" sldId="278"/>
+            <ac:grpSpMk id="12" creationId="{9922C3A4-1571-F61F-D687-4CB5B0E06392}"/>
+          </ac:grpSpMkLst>
+        </pc:grpChg>
+        <pc:grpChg chg="add mod">
+          <ac:chgData name="Tiago Fonseca" userId="0bf00240-3020-4d01-a24b-06825a2f49d7" providerId="ADAL" clId="{76692306-DFA8-4EB1-855B-CE25E963310A}" dt="2023-04-12T11:57:22.928" v="3805" actId="1076"/>
+          <ac:grpSpMkLst>
+            <pc:docMk/>
+            <pc:sldMk cId="161939914" sldId="278"/>
+            <ac:grpSpMk id="14" creationId="{35EF173A-A155-7E28-9CA6-0EA171F89FF7}"/>
+          </ac:grpSpMkLst>
+        </pc:grpChg>
+      </pc:sldChg>
+      <pc:sldChg chg="delSp modSp add mod ord">
+        <pc:chgData name="Tiago Fonseca" userId="0bf00240-3020-4d01-a24b-06825a2f49d7" providerId="ADAL" clId="{76692306-DFA8-4EB1-855B-CE25E963310A}" dt="2023-04-12T12:04:05.420" v="4173" actId="20577"/>
+        <pc:sldMkLst>
+          <pc:docMk/>
+          <pc:sldMk cId="996926825" sldId="279"/>
+        </pc:sldMkLst>
+        <pc:spChg chg="mod">
+          <ac:chgData name="Tiago Fonseca" userId="0bf00240-3020-4d01-a24b-06825a2f49d7" providerId="ADAL" clId="{76692306-DFA8-4EB1-855B-CE25E963310A}" dt="2023-04-12T12:04:05.420" v="4173" actId="20577"/>
+          <ac:spMkLst>
+            <pc:docMk/>
+            <pc:sldMk cId="996926825" sldId="279"/>
+            <ac:spMk id="2" creationId="{E734342C-2173-4B23-9C3C-2950C6A3983D}"/>
+          </ac:spMkLst>
+        </pc:spChg>
+        <pc:spChg chg="del mod">
+          <ac:chgData name="Tiago Fonseca" userId="0bf00240-3020-4d01-a24b-06825a2f49d7" providerId="ADAL" clId="{76692306-DFA8-4EB1-855B-CE25E963310A}" dt="2023-04-12T12:03:53.177" v="4141" actId="478"/>
+          <ac:spMkLst>
+            <pc:docMk/>
+            <pc:sldMk cId="996926825" sldId="279"/>
+            <ac:spMk id="3" creationId="{6A75989C-CEF6-4790-9F3D-DDEC3CEECEF5}"/>
+          </ac:spMkLst>
+        </pc:spChg>
+        <pc:spChg chg="del">
+          <ac:chgData name="Tiago Fonseca" userId="0bf00240-3020-4d01-a24b-06825a2f49d7" providerId="ADAL" clId="{76692306-DFA8-4EB1-855B-CE25E963310A}" dt="2023-04-12T12:03:56.285" v="4142" actId="478"/>
+          <ac:spMkLst>
+            <pc:docMk/>
+            <pc:sldMk cId="996926825" sldId="279"/>
+            <ac:spMk id="4" creationId="{F71B7273-E2EE-1174-E617-78EF32D51BA2}"/>
+          </ac:spMkLst>
+        </pc:spChg>
+      </pc:sldChg>
+      <pc:sldChg chg="modSp add mod ord">
+        <pc:chgData name="Tiago Fonseca" userId="0bf00240-3020-4d01-a24b-06825a2f49d7" providerId="ADAL" clId="{76692306-DFA8-4EB1-855B-CE25E963310A}" dt="2023-04-12T12:04:32.374" v="4248" actId="20577"/>
+        <pc:sldMkLst>
+          <pc:docMk/>
+          <pc:sldMk cId="825530817" sldId="280"/>
+        </pc:sldMkLst>
+        <pc:spChg chg="mod">
+          <ac:chgData name="Tiago Fonseca" userId="0bf00240-3020-4d01-a24b-06825a2f49d7" providerId="ADAL" clId="{76692306-DFA8-4EB1-855B-CE25E963310A}" dt="2023-04-12T12:04:32.374" v="4248" actId="20577"/>
+          <ac:spMkLst>
+            <pc:docMk/>
+            <pc:sldMk cId="825530817" sldId="280"/>
+            <ac:spMk id="2" creationId="{E734342C-2173-4B23-9C3C-2950C6A3983D}"/>
+          </ac:spMkLst>
+        </pc:spChg>
+      </pc:sldChg>
+      <pc:sldChg chg="modSp add mod ord">
+        <pc:chgData name="Tiago Fonseca" userId="0bf00240-3020-4d01-a24b-06825a2f49d7" providerId="ADAL" clId="{76692306-DFA8-4EB1-855B-CE25E963310A}" dt="2023-04-12T12:04:52.549" v="4278" actId="20577"/>
+        <pc:sldMkLst>
+          <pc:docMk/>
+          <pc:sldMk cId="1850968765" sldId="281"/>
+        </pc:sldMkLst>
+        <pc:spChg chg="mod">
+          <ac:chgData name="Tiago Fonseca" userId="0bf00240-3020-4d01-a24b-06825a2f49d7" providerId="ADAL" clId="{76692306-DFA8-4EB1-855B-CE25E963310A}" dt="2023-04-12T12:04:52.549" v="4278" actId="20577"/>
+          <ac:spMkLst>
+            <pc:docMk/>
+            <pc:sldMk cId="1850968765" sldId="281"/>
+            <ac:spMk id="2" creationId="{E734342C-2173-4B23-9C3C-2950C6A3983D}"/>
+          </ac:spMkLst>
+        </pc:spChg>
+      </pc:sldChg>
+    </pc:docChg>
+  </pc:docChgLst>
   <pc:docChgLst>
     <pc:chgData name="Tiago Fonseca" userId="0bf00240-3020-4d01-a24b-06825a2f49d7" providerId="ADAL" clId="{972BC957-0A45-4C3E-B1D6-43CFE1FD1AEE}"/>
     <pc:docChg chg="undo custSel addSld delSld modSld sldOrd">
@@ -580,6 +1518,53 @@
     </pc:docChg>
   </pc:docChgLst>
   <pc:docChgLst>
+    <pc:chgData name="Tiago Fonseca" userId="0bf00240-3020-4d01-a24b-06825a2f49d7" providerId="ADAL" clId="{3560B347-D4E4-4F91-A83E-BCFB5DC5A660}"/>
+    <pc:docChg chg="modSld">
+      <pc:chgData name="Tiago Fonseca" userId="0bf00240-3020-4d01-a24b-06825a2f49d7" providerId="ADAL" clId="{3560B347-D4E4-4F91-A83E-BCFB5DC5A660}" dt="2023-04-13T10:21:52.360" v="43" actId="20577"/>
+      <pc:docMkLst>
+        <pc:docMk/>
+      </pc:docMkLst>
+      <pc:sldChg chg="modSp mod">
+        <pc:chgData name="Tiago Fonseca" userId="0bf00240-3020-4d01-a24b-06825a2f49d7" providerId="ADAL" clId="{3560B347-D4E4-4F91-A83E-BCFB5DC5A660}" dt="2023-04-13T10:21:52.360" v="43" actId="20577"/>
+        <pc:sldMkLst>
+          <pc:docMk/>
+          <pc:sldMk cId="2113348865" sldId="271"/>
+        </pc:sldMkLst>
+        <pc:spChg chg="mod">
+          <ac:chgData name="Tiago Fonseca" userId="0bf00240-3020-4d01-a24b-06825a2f49d7" providerId="ADAL" clId="{3560B347-D4E4-4F91-A83E-BCFB5DC5A660}" dt="2023-04-13T10:21:52.360" v="43" actId="20577"/>
+          <ac:spMkLst>
+            <pc:docMk/>
+            <pc:sldMk cId="2113348865" sldId="271"/>
+            <ac:spMk id="3" creationId="{E82AFDAC-88B1-3AB9-A268-4DF9CBD41DFE}"/>
+          </ac:spMkLst>
+        </pc:spChg>
+      </pc:sldChg>
+      <pc:sldChg chg="modSp mod">
+        <pc:chgData name="Tiago Fonseca" userId="0bf00240-3020-4d01-a24b-06825a2f49d7" providerId="ADAL" clId="{3560B347-D4E4-4F91-A83E-BCFB5DC5A660}" dt="2023-04-13T08:03:28.687" v="37" actId="20577"/>
+        <pc:sldMkLst>
+          <pc:docMk/>
+          <pc:sldMk cId="1489756019" sldId="277"/>
+        </pc:sldMkLst>
+        <pc:spChg chg="mod">
+          <ac:chgData name="Tiago Fonseca" userId="0bf00240-3020-4d01-a24b-06825a2f49d7" providerId="ADAL" clId="{3560B347-D4E4-4F91-A83E-BCFB5DC5A660}" dt="2023-04-13T08:03:15.575" v="8" actId="20577"/>
+          <ac:spMkLst>
+            <pc:docMk/>
+            <pc:sldMk cId="1489756019" sldId="277"/>
+            <ac:spMk id="4" creationId="{2721AF49-4A4E-A592-68FA-93F3A1029D40}"/>
+          </ac:spMkLst>
+        </pc:spChg>
+        <pc:spChg chg="mod">
+          <ac:chgData name="Tiago Fonseca" userId="0bf00240-3020-4d01-a24b-06825a2f49d7" providerId="ADAL" clId="{3560B347-D4E4-4F91-A83E-BCFB5DC5A660}" dt="2023-04-13T08:03:28.687" v="37" actId="20577"/>
+          <ac:spMkLst>
+            <pc:docMk/>
+            <pc:sldMk cId="1489756019" sldId="277"/>
+            <ac:spMk id="6" creationId="{E35D8F96-B8AD-CDB0-20C5-3C57BE40BF8F}"/>
+          </ac:spMkLst>
+        </pc:spChg>
+      </pc:sldChg>
+    </pc:docChg>
+  </pc:docChgLst>
+  <pc:docChgLst>
     <pc:chgData name="Tiago Fonseca" userId="0bf00240-3020-4d01-a24b-06825a2f49d7" providerId="ADAL" clId="{E6087568-9E66-4C67-8420-88369500C5DA}"/>
     <pc:docChg chg="undo custSel addSld delSld modSld">
       <pc:chgData name="Tiago Fonseca" userId="0bf00240-3020-4d01-a24b-06825a2f49d7" providerId="ADAL" clId="{E6087568-9E66-4C67-8420-88369500C5DA}" dt="2023-05-17T18:35:20.516" v="4240" actId="20577"/>
@@ -1057,951 +2042,6 @@
           <ac:spMkLst>
             <pc:docMk/>
             <pc:sldMk cId="2100602676" sldId="288"/>
-            <ac:spMk id="7" creationId="{3781BB72-06CF-6EC3-7E08-64DE68C0CE29}"/>
-          </ac:spMkLst>
-        </pc:spChg>
-      </pc:sldChg>
-    </pc:docChg>
-  </pc:docChgLst>
-  <pc:docChgLst>
-    <pc:chgData name="Tiago Fonseca" userId="0bf00240-3020-4d01-a24b-06825a2f49d7" providerId="ADAL" clId="{76692306-DFA8-4EB1-855B-CE25E963310A}"/>
-    <pc:docChg chg="undo custSel addSld delSld modSld sldOrd">
-      <pc:chgData name="Tiago Fonseca" userId="0bf00240-3020-4d01-a24b-06825a2f49d7" providerId="ADAL" clId="{76692306-DFA8-4EB1-855B-CE25E963310A}" dt="2023-04-12T12:04:52.549" v="4278" actId="20577"/>
-      <pc:docMkLst>
-        <pc:docMk/>
-      </pc:docMkLst>
-      <pc:sldChg chg="addSp modSp mod">
-        <pc:chgData name="Tiago Fonseca" userId="0bf00240-3020-4d01-a24b-06825a2f49d7" providerId="ADAL" clId="{76692306-DFA8-4EB1-855B-CE25E963310A}" dt="2023-04-12T12:03:10.795" v="4135" actId="20577"/>
-        <pc:sldMkLst>
-          <pc:docMk/>
-          <pc:sldMk cId="300101176" sldId="256"/>
-        </pc:sldMkLst>
-        <pc:spChg chg="mod">
-          <ac:chgData name="Tiago Fonseca" userId="0bf00240-3020-4d01-a24b-06825a2f49d7" providerId="ADAL" clId="{76692306-DFA8-4EB1-855B-CE25E963310A}" dt="2023-04-12T12:00:17.477" v="4083" actId="20577"/>
-          <ac:spMkLst>
-            <pc:docMk/>
-            <pc:sldMk cId="300101176" sldId="256"/>
-            <ac:spMk id="2" creationId="{08BDDBEB-2A0E-4470-BE29-A528A3A60875}"/>
-          </ac:spMkLst>
-        </pc:spChg>
-        <pc:spChg chg="mod">
-          <ac:chgData name="Tiago Fonseca" userId="0bf00240-3020-4d01-a24b-06825a2f49d7" providerId="ADAL" clId="{76692306-DFA8-4EB1-855B-CE25E963310A}" dt="2023-04-12T12:03:10.795" v="4135" actId="20577"/>
-          <ac:spMkLst>
-            <pc:docMk/>
-            <pc:sldMk cId="300101176" sldId="256"/>
-            <ac:spMk id="3" creationId="{1D090625-51CE-4ECB-81A4-C4905F3FBFE9}"/>
-          </ac:spMkLst>
-        </pc:spChg>
-        <pc:spChg chg="add mod">
-          <ac:chgData name="Tiago Fonseca" userId="0bf00240-3020-4d01-a24b-06825a2f49d7" providerId="ADAL" clId="{76692306-DFA8-4EB1-855B-CE25E963310A}" dt="2023-04-12T12:01:45.356" v="4126" actId="1076"/>
-          <ac:spMkLst>
-            <pc:docMk/>
-            <pc:sldMk cId="300101176" sldId="256"/>
-            <ac:spMk id="4" creationId="{199806C4-19A8-84C4-89D6-D85C7F67C10E}"/>
-          </ac:spMkLst>
-        </pc:spChg>
-      </pc:sldChg>
-      <pc:sldChg chg="del">
-        <pc:chgData name="Tiago Fonseca" userId="0bf00240-3020-4d01-a24b-06825a2f49d7" providerId="ADAL" clId="{76692306-DFA8-4EB1-855B-CE25E963310A}" dt="2023-04-12T11:59:06.282" v="4022" actId="47"/>
-        <pc:sldMkLst>
-          <pc:docMk/>
-          <pc:sldMk cId="1779314252" sldId="265"/>
-        </pc:sldMkLst>
-      </pc:sldChg>
-      <pc:sldChg chg="addSp modSp mod">
-        <pc:chgData name="Tiago Fonseca" userId="0bf00240-3020-4d01-a24b-06825a2f49d7" providerId="ADAL" clId="{76692306-DFA8-4EB1-855B-CE25E963310A}" dt="2023-04-12T12:03:04.950" v="4132" actId="20577"/>
-        <pc:sldMkLst>
-          <pc:docMk/>
-          <pc:sldMk cId="3179833211" sldId="267"/>
-        </pc:sldMkLst>
-        <pc:spChg chg="mod">
-          <ac:chgData name="Tiago Fonseca" userId="0bf00240-3020-4d01-a24b-06825a2f49d7" providerId="ADAL" clId="{76692306-DFA8-4EB1-855B-CE25E963310A}" dt="2023-04-12T12:02:47.655" v="4129"/>
-          <ac:spMkLst>
-            <pc:docMk/>
-            <pc:sldMk cId="3179833211" sldId="267"/>
-            <ac:spMk id="2" creationId="{E734342C-2173-4B23-9C3C-2950C6A3983D}"/>
-          </ac:spMkLst>
-        </pc:spChg>
-        <pc:spChg chg="mod">
-          <ac:chgData name="Tiago Fonseca" userId="0bf00240-3020-4d01-a24b-06825a2f49d7" providerId="ADAL" clId="{76692306-DFA8-4EB1-855B-CE25E963310A}" dt="2023-04-12T12:03:04.950" v="4132" actId="20577"/>
-          <ac:spMkLst>
-            <pc:docMk/>
-            <pc:sldMk cId="3179833211" sldId="267"/>
-            <ac:spMk id="3" creationId="{6A75989C-CEF6-4790-9F3D-DDEC3CEECEF5}"/>
-          </ac:spMkLst>
-        </pc:spChg>
-        <pc:spChg chg="add mod">
-          <ac:chgData name="Tiago Fonseca" userId="0bf00240-3020-4d01-a24b-06825a2f49d7" providerId="ADAL" clId="{76692306-DFA8-4EB1-855B-CE25E963310A}" dt="2023-04-12T12:03:00.976" v="4131" actId="1076"/>
-          <ac:spMkLst>
-            <pc:docMk/>
-            <pc:sldMk cId="3179833211" sldId="267"/>
-            <ac:spMk id="4" creationId="{F71B7273-E2EE-1174-E617-78EF32D51BA2}"/>
-          </ac:spMkLst>
-        </pc:spChg>
-      </pc:sldChg>
-      <pc:sldChg chg="del">
-        <pc:chgData name="Tiago Fonseca" userId="0bf00240-3020-4d01-a24b-06825a2f49d7" providerId="ADAL" clId="{76692306-DFA8-4EB1-855B-CE25E963310A}" dt="2023-04-12T11:59:07.598" v="4023" actId="47"/>
-        <pc:sldMkLst>
-          <pc:docMk/>
-          <pc:sldMk cId="3019627190" sldId="268"/>
-        </pc:sldMkLst>
-      </pc:sldChg>
-      <pc:sldChg chg="modSp del mod">
-        <pc:chgData name="Tiago Fonseca" userId="0bf00240-3020-4d01-a24b-06825a2f49d7" providerId="ADAL" clId="{76692306-DFA8-4EB1-855B-CE25E963310A}" dt="2023-04-12T11:59:05.602" v="4021" actId="47"/>
-        <pc:sldMkLst>
-          <pc:docMk/>
-          <pc:sldMk cId="825492604" sldId="270"/>
-        </pc:sldMkLst>
-        <pc:spChg chg="mod">
-          <ac:chgData name="Tiago Fonseca" userId="0bf00240-3020-4d01-a24b-06825a2f49d7" providerId="ADAL" clId="{76692306-DFA8-4EB1-855B-CE25E963310A}" dt="2023-04-12T10:24:10.886" v="487" actId="20577"/>
-          <ac:spMkLst>
-            <pc:docMk/>
-            <pc:sldMk cId="825492604" sldId="270"/>
-            <ac:spMk id="63" creationId="{69F1744A-CA11-44DA-AE09-C24B436C1B4F}"/>
-          </ac:spMkLst>
-        </pc:spChg>
-        <pc:graphicFrameChg chg="mod">
-          <ac:chgData name="Tiago Fonseca" userId="0bf00240-3020-4d01-a24b-06825a2f49d7" providerId="ADAL" clId="{76692306-DFA8-4EB1-855B-CE25E963310A}" dt="2023-04-12T11:56:22.831" v="3787"/>
-          <ac:graphicFrameMkLst>
-            <pc:docMk/>
-            <pc:sldMk cId="825492604" sldId="270"/>
-            <ac:graphicFrameMk id="18" creationId="{FB509DA5-15CF-4F50-8076-F311C53562F4}"/>
-          </ac:graphicFrameMkLst>
-        </pc:graphicFrameChg>
-        <pc:picChg chg="mod">
-          <ac:chgData name="Tiago Fonseca" userId="0bf00240-3020-4d01-a24b-06825a2f49d7" providerId="ADAL" clId="{76692306-DFA8-4EB1-855B-CE25E963310A}" dt="2023-04-12T10:24:13.577" v="488" actId="1076"/>
-          <ac:picMkLst>
-            <pc:docMk/>
-            <pc:sldMk cId="825492604" sldId="270"/>
-            <ac:picMk id="6" creationId="{65EB9C0E-82E1-4B5B-A48D-C50A96A0164A}"/>
-          </ac:picMkLst>
-        </pc:picChg>
-      </pc:sldChg>
-      <pc:sldChg chg="modSp new mod">
-        <pc:chgData name="Tiago Fonseca" userId="0bf00240-3020-4d01-a24b-06825a2f49d7" providerId="ADAL" clId="{76692306-DFA8-4EB1-855B-CE25E963310A}" dt="2023-04-12T11:13:54.918" v="1686" actId="20577"/>
-        <pc:sldMkLst>
-          <pc:docMk/>
-          <pc:sldMk cId="2113348865" sldId="271"/>
-        </pc:sldMkLst>
-        <pc:spChg chg="mod">
-          <ac:chgData name="Tiago Fonseca" userId="0bf00240-3020-4d01-a24b-06825a2f49d7" providerId="ADAL" clId="{76692306-DFA8-4EB1-855B-CE25E963310A}" dt="2023-04-12T10:12:56.314" v="175" actId="122"/>
-          <ac:spMkLst>
-            <pc:docMk/>
-            <pc:sldMk cId="2113348865" sldId="271"/>
-            <ac:spMk id="2" creationId="{98A32DE6-6B29-7489-635B-950DAAB3B577}"/>
-          </ac:spMkLst>
-        </pc:spChg>
-        <pc:spChg chg="mod">
-          <ac:chgData name="Tiago Fonseca" userId="0bf00240-3020-4d01-a24b-06825a2f49d7" providerId="ADAL" clId="{76692306-DFA8-4EB1-855B-CE25E963310A}" dt="2023-04-12T11:13:54.918" v="1686" actId="20577"/>
-          <ac:spMkLst>
-            <pc:docMk/>
-            <pc:sldMk cId="2113348865" sldId="271"/>
-            <ac:spMk id="3" creationId="{E82AFDAC-88B1-3AB9-A268-4DF9CBD41DFE}"/>
-          </ac:spMkLst>
-        </pc:spChg>
-      </pc:sldChg>
-      <pc:sldChg chg="modSp add mod">
-        <pc:chgData name="Tiago Fonseca" userId="0bf00240-3020-4d01-a24b-06825a2f49d7" providerId="ADAL" clId="{76692306-DFA8-4EB1-855B-CE25E963310A}" dt="2023-04-12T11:13:50.031" v="1682" actId="20577"/>
-        <pc:sldMkLst>
-          <pc:docMk/>
-          <pc:sldMk cId="3065993080" sldId="272"/>
-        </pc:sldMkLst>
-        <pc:spChg chg="mod">
-          <ac:chgData name="Tiago Fonseca" userId="0bf00240-3020-4d01-a24b-06825a2f49d7" providerId="ADAL" clId="{76692306-DFA8-4EB1-855B-CE25E963310A}" dt="2023-04-12T10:26:22.953" v="534" actId="20577"/>
-          <ac:spMkLst>
-            <pc:docMk/>
-            <pc:sldMk cId="3065993080" sldId="272"/>
-            <ac:spMk id="2" creationId="{98A32DE6-6B29-7489-635B-950DAAB3B577}"/>
-          </ac:spMkLst>
-        </pc:spChg>
-        <pc:spChg chg="mod">
-          <ac:chgData name="Tiago Fonseca" userId="0bf00240-3020-4d01-a24b-06825a2f49d7" providerId="ADAL" clId="{76692306-DFA8-4EB1-855B-CE25E963310A}" dt="2023-04-12T11:13:50.031" v="1682" actId="20577"/>
-          <ac:spMkLst>
-            <pc:docMk/>
-            <pc:sldMk cId="3065993080" sldId="272"/>
-            <ac:spMk id="3" creationId="{E82AFDAC-88B1-3AB9-A268-4DF9CBD41DFE}"/>
-          </ac:spMkLst>
-        </pc:spChg>
-      </pc:sldChg>
-      <pc:sldChg chg="modSp new del mod">
-        <pc:chgData name="Tiago Fonseca" userId="0bf00240-3020-4d01-a24b-06825a2f49d7" providerId="ADAL" clId="{76692306-DFA8-4EB1-855B-CE25E963310A}" dt="2023-04-12T11:00:16.033" v="1014" actId="47"/>
-        <pc:sldMkLst>
-          <pc:docMk/>
-          <pc:sldMk cId="1307581228" sldId="273"/>
-        </pc:sldMkLst>
-        <pc:spChg chg="mod">
-          <ac:chgData name="Tiago Fonseca" userId="0bf00240-3020-4d01-a24b-06825a2f49d7" providerId="ADAL" clId="{76692306-DFA8-4EB1-855B-CE25E963310A}" dt="2023-04-12T11:00:14.509" v="1013" actId="20577"/>
-          <ac:spMkLst>
-            <pc:docMk/>
-            <pc:sldMk cId="1307581228" sldId="273"/>
-            <ac:spMk id="2" creationId="{A9C16738-60BE-4E5A-8BF9-EB5A41EB2D1F}"/>
-          </ac:spMkLst>
-        </pc:spChg>
-        <pc:spChg chg="mod">
-          <ac:chgData name="Tiago Fonseca" userId="0bf00240-3020-4d01-a24b-06825a2f49d7" providerId="ADAL" clId="{76692306-DFA8-4EB1-855B-CE25E963310A}" dt="2023-04-12T11:00:14.390" v="1012" actId="1076"/>
-          <ac:spMkLst>
-            <pc:docMk/>
-            <pc:sldMk cId="1307581228" sldId="273"/>
-            <ac:spMk id="3" creationId="{BB96EA41-C393-7CAF-6F16-1045263A701A}"/>
-          </ac:spMkLst>
-        </pc:spChg>
-      </pc:sldChg>
-      <pc:sldChg chg="modSp add del mod">
-        <pc:chgData name="Tiago Fonseca" userId="0bf00240-3020-4d01-a24b-06825a2f49d7" providerId="ADAL" clId="{76692306-DFA8-4EB1-855B-CE25E963310A}" dt="2023-04-12T11:13:46.243" v="1679" actId="47"/>
-        <pc:sldMkLst>
-          <pc:docMk/>
-          <pc:sldMk cId="1478104791" sldId="273"/>
-        </pc:sldMkLst>
-        <pc:spChg chg="mod">
-          <ac:chgData name="Tiago Fonseca" userId="0bf00240-3020-4d01-a24b-06825a2f49d7" providerId="ADAL" clId="{76692306-DFA8-4EB1-855B-CE25E963310A}" dt="2023-04-12T11:00:29.931" v="1053" actId="20577"/>
-          <ac:spMkLst>
-            <pc:docMk/>
-            <pc:sldMk cId="1478104791" sldId="273"/>
-            <ac:spMk id="2" creationId="{98A32DE6-6B29-7489-635B-950DAAB3B577}"/>
-          </ac:spMkLst>
-        </pc:spChg>
-        <pc:spChg chg="mod">
-          <ac:chgData name="Tiago Fonseca" userId="0bf00240-3020-4d01-a24b-06825a2f49d7" providerId="ADAL" clId="{76692306-DFA8-4EB1-855B-CE25E963310A}" dt="2023-04-12T11:00:47.825" v="1054" actId="20577"/>
-          <ac:spMkLst>
-            <pc:docMk/>
-            <pc:sldMk cId="1478104791" sldId="273"/>
-            <ac:spMk id="3" creationId="{E82AFDAC-88B1-3AB9-A268-4DF9CBD41DFE}"/>
-          </ac:spMkLst>
-        </pc:spChg>
-      </pc:sldChg>
-      <pc:sldChg chg="addSp delSp modSp new mod">
-        <pc:chgData name="Tiago Fonseca" userId="0bf00240-3020-4d01-a24b-06825a2f49d7" providerId="ADAL" clId="{76692306-DFA8-4EB1-855B-CE25E963310A}" dt="2023-04-12T11:39:39.054" v="2771" actId="20577"/>
-        <pc:sldMkLst>
-          <pc:docMk/>
-          <pc:sldMk cId="910042957" sldId="274"/>
-        </pc:sldMkLst>
-        <pc:spChg chg="mod">
-          <ac:chgData name="Tiago Fonseca" userId="0bf00240-3020-4d01-a24b-06825a2f49d7" providerId="ADAL" clId="{76692306-DFA8-4EB1-855B-CE25E963310A}" dt="2023-04-12T11:01:06.952" v="1057" actId="122"/>
-          <ac:spMkLst>
-            <pc:docMk/>
-            <pc:sldMk cId="910042957" sldId="274"/>
-            <ac:spMk id="2" creationId="{F80209FA-4D24-0148-E718-9C1510C7C568}"/>
-          </ac:spMkLst>
-        </pc:spChg>
-        <pc:spChg chg="mod">
-          <ac:chgData name="Tiago Fonseca" userId="0bf00240-3020-4d01-a24b-06825a2f49d7" providerId="ADAL" clId="{76692306-DFA8-4EB1-855B-CE25E963310A}" dt="2023-04-12T11:13:39.641" v="1678" actId="20577"/>
-          <ac:spMkLst>
-            <pc:docMk/>
-            <pc:sldMk cId="910042957" sldId="274"/>
-            <ac:spMk id="3" creationId="{065F10BD-3D55-BF92-2559-D3553D8B83C6}"/>
-          </ac:spMkLst>
-        </pc:spChg>
-        <pc:spChg chg="mod">
-          <ac:chgData name="Tiago Fonseca" userId="0bf00240-3020-4d01-a24b-06825a2f49d7" providerId="ADAL" clId="{76692306-DFA8-4EB1-855B-CE25E963310A}" dt="2023-04-12T11:39:39.054" v="2771" actId="20577"/>
-          <ac:spMkLst>
-            <pc:docMk/>
-            <pc:sldMk cId="910042957" sldId="274"/>
-            <ac:spMk id="4" creationId="{5E5D4841-5C29-E6AC-66B2-93E335ACD303}"/>
-          </ac:spMkLst>
-        </pc:spChg>
-        <pc:spChg chg="add del mod">
-          <ac:chgData name="Tiago Fonseca" userId="0bf00240-3020-4d01-a24b-06825a2f49d7" providerId="ADAL" clId="{76692306-DFA8-4EB1-855B-CE25E963310A}" dt="2023-04-12T11:13:36.502" v="1673" actId="20577"/>
-          <ac:spMkLst>
-            <pc:docMk/>
-            <pc:sldMk cId="910042957" sldId="274"/>
-            <ac:spMk id="5" creationId="{2CF51BCB-2469-B572-DE58-0240E8741017}"/>
-          </ac:spMkLst>
-        </pc:spChg>
-      </pc:sldChg>
-      <pc:sldChg chg="modSp new mod">
-        <pc:chgData name="Tiago Fonseca" userId="0bf00240-3020-4d01-a24b-06825a2f49d7" providerId="ADAL" clId="{76692306-DFA8-4EB1-855B-CE25E963310A}" dt="2023-04-12T11:35:09.743" v="2636" actId="20577"/>
-        <pc:sldMkLst>
-          <pc:docMk/>
-          <pc:sldMk cId="680076668" sldId="275"/>
-        </pc:sldMkLst>
-        <pc:spChg chg="mod">
-          <ac:chgData name="Tiago Fonseca" userId="0bf00240-3020-4d01-a24b-06825a2f49d7" providerId="ADAL" clId="{76692306-DFA8-4EB1-855B-CE25E963310A}" dt="2023-04-12T11:14:51.801" v="1689" actId="122"/>
-          <ac:spMkLst>
-            <pc:docMk/>
-            <pc:sldMk cId="680076668" sldId="275"/>
-            <ac:spMk id="2" creationId="{0DD409D6-3AA3-7670-9071-DD0DF9CF1E10}"/>
-          </ac:spMkLst>
-        </pc:spChg>
-        <pc:spChg chg="mod">
-          <ac:chgData name="Tiago Fonseca" userId="0bf00240-3020-4d01-a24b-06825a2f49d7" providerId="ADAL" clId="{76692306-DFA8-4EB1-855B-CE25E963310A}" dt="2023-04-12T11:30:11.907" v="2239" actId="20577"/>
-          <ac:spMkLst>
-            <pc:docMk/>
-            <pc:sldMk cId="680076668" sldId="275"/>
-            <ac:spMk id="3" creationId="{CD082B02-EF67-87B5-E87B-D0D61784FB0D}"/>
-          </ac:spMkLst>
-        </pc:spChg>
-        <pc:spChg chg="mod">
-          <ac:chgData name="Tiago Fonseca" userId="0bf00240-3020-4d01-a24b-06825a2f49d7" providerId="ADAL" clId="{76692306-DFA8-4EB1-855B-CE25E963310A}" dt="2023-04-12T11:35:09.743" v="2636" actId="20577"/>
-          <ac:spMkLst>
-            <pc:docMk/>
-            <pc:sldMk cId="680076668" sldId="275"/>
-            <ac:spMk id="4" creationId="{F110BDDD-461C-CF6B-286B-3AB4D5057BE1}"/>
-          </ac:spMkLst>
-        </pc:spChg>
-      </pc:sldChg>
-      <pc:sldChg chg="modSp add mod ord">
-        <pc:chgData name="Tiago Fonseca" userId="0bf00240-3020-4d01-a24b-06825a2f49d7" providerId="ADAL" clId="{76692306-DFA8-4EB1-855B-CE25E963310A}" dt="2023-04-12T11:41:59.293" v="3009" actId="20577"/>
-        <pc:sldMkLst>
-          <pc:docMk/>
-          <pc:sldMk cId="972465295" sldId="276"/>
-        </pc:sldMkLst>
-        <pc:spChg chg="mod">
-          <ac:chgData name="Tiago Fonseca" userId="0bf00240-3020-4d01-a24b-06825a2f49d7" providerId="ADAL" clId="{76692306-DFA8-4EB1-855B-CE25E963310A}" dt="2023-04-12T11:35:51.588" v="2640"/>
-          <ac:spMkLst>
-            <pc:docMk/>
-            <pc:sldMk cId="972465295" sldId="276"/>
-            <ac:spMk id="2" creationId="{98A32DE6-6B29-7489-635B-950DAAB3B577}"/>
-          </ac:spMkLst>
-        </pc:spChg>
-        <pc:spChg chg="mod">
-          <ac:chgData name="Tiago Fonseca" userId="0bf00240-3020-4d01-a24b-06825a2f49d7" providerId="ADAL" clId="{76692306-DFA8-4EB1-855B-CE25E963310A}" dt="2023-04-12T11:41:59.293" v="3009" actId="20577"/>
-          <ac:spMkLst>
-            <pc:docMk/>
-            <pc:sldMk cId="972465295" sldId="276"/>
-            <ac:spMk id="3" creationId="{E82AFDAC-88B1-3AB9-A268-4DF9CBD41DFE}"/>
-          </ac:spMkLst>
-        </pc:spChg>
-      </pc:sldChg>
-      <pc:sldChg chg="modSp new mod">
-        <pc:chgData name="Tiago Fonseca" userId="0bf00240-3020-4d01-a24b-06825a2f49d7" providerId="ADAL" clId="{76692306-DFA8-4EB1-855B-CE25E963310A}" dt="2023-04-12T11:48:28.043" v="3646" actId="122"/>
-        <pc:sldMkLst>
-          <pc:docMk/>
-          <pc:sldMk cId="1489756019" sldId="277"/>
-        </pc:sldMkLst>
-        <pc:spChg chg="mod">
-          <ac:chgData name="Tiago Fonseca" userId="0bf00240-3020-4d01-a24b-06825a2f49d7" providerId="ADAL" clId="{76692306-DFA8-4EB1-855B-CE25E963310A}" dt="2023-04-12T11:43:20.747" v="3042" actId="122"/>
-          <ac:spMkLst>
-            <pc:docMk/>
-            <pc:sldMk cId="1489756019" sldId="277"/>
-            <ac:spMk id="2" creationId="{931451AD-4895-B705-D9DD-AE4EECD87102}"/>
-          </ac:spMkLst>
-        </pc:spChg>
-        <pc:spChg chg="mod">
-          <ac:chgData name="Tiago Fonseca" userId="0bf00240-3020-4d01-a24b-06825a2f49d7" providerId="ADAL" clId="{76692306-DFA8-4EB1-855B-CE25E963310A}" dt="2023-04-12T11:43:31.057" v="3072" actId="122"/>
-          <ac:spMkLst>
-            <pc:docMk/>
-            <pc:sldMk cId="1489756019" sldId="277"/>
-            <ac:spMk id="3" creationId="{19D03FC5-AAFD-D05F-F5BB-2BCF0AE0B45C}"/>
-          </ac:spMkLst>
-        </pc:spChg>
-        <pc:spChg chg="mod">
-          <ac:chgData name="Tiago Fonseca" userId="0bf00240-3020-4d01-a24b-06825a2f49d7" providerId="ADAL" clId="{76692306-DFA8-4EB1-855B-CE25E963310A}" dt="2023-04-12T11:48:28.043" v="3646" actId="122"/>
-          <ac:spMkLst>
-            <pc:docMk/>
-            <pc:sldMk cId="1489756019" sldId="277"/>
-            <ac:spMk id="4" creationId="{2721AF49-4A4E-A592-68FA-93F3A1029D40}"/>
-          </ac:spMkLst>
-        </pc:spChg>
-        <pc:spChg chg="mod">
-          <ac:chgData name="Tiago Fonseca" userId="0bf00240-3020-4d01-a24b-06825a2f49d7" providerId="ADAL" clId="{76692306-DFA8-4EB1-855B-CE25E963310A}" dt="2023-04-12T11:45:54.127" v="3392" actId="20577"/>
-          <ac:spMkLst>
-            <pc:docMk/>
-            <pc:sldMk cId="1489756019" sldId="277"/>
-            <ac:spMk id="5" creationId="{EA967136-6D3A-65E4-0498-29BD719A84A3}"/>
-          </ac:spMkLst>
-        </pc:spChg>
-        <pc:spChg chg="mod">
-          <ac:chgData name="Tiago Fonseca" userId="0bf00240-3020-4d01-a24b-06825a2f49d7" providerId="ADAL" clId="{76692306-DFA8-4EB1-855B-CE25E963310A}" dt="2023-04-12T11:48:23.327" v="3645" actId="20577"/>
-          <ac:spMkLst>
-            <pc:docMk/>
-            <pc:sldMk cId="1489756019" sldId="277"/>
-            <ac:spMk id="6" creationId="{E35D8F96-B8AD-CDB0-20C5-3C57BE40BF8F}"/>
-          </ac:spMkLst>
-        </pc:spChg>
-      </pc:sldChg>
-      <pc:sldChg chg="addSp delSp modSp add mod">
-        <pc:chgData name="Tiago Fonseca" userId="0bf00240-3020-4d01-a24b-06825a2f49d7" providerId="ADAL" clId="{76692306-DFA8-4EB1-855B-CE25E963310A}" dt="2023-04-12T11:58:53.049" v="4020" actId="14100"/>
-        <pc:sldMkLst>
-          <pc:docMk/>
-          <pc:sldMk cId="161939914" sldId="278"/>
-        </pc:sldMkLst>
-        <pc:spChg chg="mod">
-          <ac:chgData name="Tiago Fonseca" userId="0bf00240-3020-4d01-a24b-06825a2f49d7" providerId="ADAL" clId="{76692306-DFA8-4EB1-855B-CE25E963310A}" dt="2023-04-12T11:50:06.983" v="3669" actId="20577"/>
-          <ac:spMkLst>
-            <pc:docMk/>
-            <pc:sldMk cId="161939914" sldId="278"/>
-            <ac:spMk id="3" creationId="{19D03FC5-AAFD-D05F-F5BB-2BCF0AE0B45C}"/>
-          </ac:spMkLst>
-        </pc:spChg>
-        <pc:spChg chg="del mod">
-          <ac:chgData name="Tiago Fonseca" userId="0bf00240-3020-4d01-a24b-06825a2f49d7" providerId="ADAL" clId="{76692306-DFA8-4EB1-855B-CE25E963310A}" dt="2023-04-12T11:50:13.061" v="3673" actId="478"/>
-          <ac:spMkLst>
-            <pc:docMk/>
-            <pc:sldMk cId="161939914" sldId="278"/>
-            <ac:spMk id="4" creationId="{2721AF49-4A4E-A592-68FA-93F3A1029D40}"/>
-          </ac:spMkLst>
-        </pc:spChg>
-        <pc:spChg chg="mod">
-          <ac:chgData name="Tiago Fonseca" userId="0bf00240-3020-4d01-a24b-06825a2f49d7" providerId="ADAL" clId="{76692306-DFA8-4EB1-855B-CE25E963310A}" dt="2023-04-12T11:57:38.180" v="3836" actId="20577"/>
-          <ac:spMkLst>
-            <pc:docMk/>
-            <pc:sldMk cId="161939914" sldId="278"/>
-            <ac:spMk id="5" creationId="{EA967136-6D3A-65E4-0498-29BD719A84A3}"/>
-          </ac:spMkLst>
-        </pc:spChg>
-        <pc:spChg chg="mod">
-          <ac:chgData name="Tiago Fonseca" userId="0bf00240-3020-4d01-a24b-06825a2f49d7" providerId="ADAL" clId="{76692306-DFA8-4EB1-855B-CE25E963310A}" dt="2023-04-12T11:58:53.049" v="4020" actId="14100"/>
-          <ac:spMkLst>
-            <pc:docMk/>
-            <pc:sldMk cId="161939914" sldId="278"/>
-            <ac:spMk id="6" creationId="{E35D8F96-B8AD-CDB0-20C5-3C57BE40BF8F}"/>
-          </ac:spMkLst>
-        </pc:spChg>
-        <pc:spChg chg="add del mod">
-          <ac:chgData name="Tiago Fonseca" userId="0bf00240-3020-4d01-a24b-06825a2f49d7" providerId="ADAL" clId="{76692306-DFA8-4EB1-855B-CE25E963310A}" dt="2023-04-12T11:53:30.901" v="3727" actId="478"/>
-          <ac:spMkLst>
-            <pc:docMk/>
-            <pc:sldMk cId="161939914" sldId="278"/>
-            <ac:spMk id="7" creationId="{69707711-68FE-BAE2-56EC-35762EE33225}"/>
-          </ac:spMkLst>
-        </pc:spChg>
-        <pc:spChg chg="add mod">
-          <ac:chgData name="Tiago Fonseca" userId="0bf00240-3020-4d01-a24b-06825a2f49d7" providerId="ADAL" clId="{76692306-DFA8-4EB1-855B-CE25E963310A}" dt="2023-04-12T11:57:22.928" v="3805" actId="1076"/>
-          <ac:spMkLst>
-            <pc:docMk/>
-            <pc:sldMk cId="161939914" sldId="278"/>
-            <ac:spMk id="9" creationId="{944D995E-D83D-18C3-48AB-DB1B0B8096BE}"/>
-          </ac:spMkLst>
-        </pc:spChg>
-        <pc:spChg chg="add del mod">
-          <ac:chgData name="Tiago Fonseca" userId="0bf00240-3020-4d01-a24b-06825a2f49d7" providerId="ADAL" clId="{76692306-DFA8-4EB1-855B-CE25E963310A}" dt="2023-04-12T11:56:26.914" v="3788" actId="478"/>
-          <ac:spMkLst>
-            <pc:docMk/>
-            <pc:sldMk cId="161939914" sldId="278"/>
-            <ac:spMk id="11" creationId="{D5EC9E16-5DF7-E8A4-4A15-914612A44D0A}"/>
-          </ac:spMkLst>
-        </pc:spChg>
-        <pc:spChg chg="add del mod">
-          <ac:chgData name="Tiago Fonseca" userId="0bf00240-3020-4d01-a24b-06825a2f49d7" providerId="ADAL" clId="{76692306-DFA8-4EB1-855B-CE25E963310A}" dt="2023-04-12T11:55:42.191" v="3752" actId="478"/>
-          <ac:spMkLst>
-            <pc:docMk/>
-            <pc:sldMk cId="161939914" sldId="278"/>
-            <ac:spMk id="13" creationId="{80785B91-98E9-33F4-ED04-4235BD6BE59F}"/>
-          </ac:spMkLst>
-        </pc:spChg>
-        <pc:spChg chg="add mod">
-          <ac:chgData name="Tiago Fonseca" userId="0bf00240-3020-4d01-a24b-06825a2f49d7" providerId="ADAL" clId="{76692306-DFA8-4EB1-855B-CE25E963310A}" dt="2023-04-12T11:50:14.043" v="3674"/>
-          <ac:spMkLst>
-            <pc:docMk/>
-            <pc:sldMk cId="161939914" sldId="278"/>
-            <ac:spMk id="15" creationId="{4247156B-2B9A-A2A0-AA10-DDFD8C5FA830}"/>
-          </ac:spMkLst>
-        </pc:spChg>
-        <pc:spChg chg="add mod">
-          <ac:chgData name="Tiago Fonseca" userId="0bf00240-3020-4d01-a24b-06825a2f49d7" providerId="ADAL" clId="{76692306-DFA8-4EB1-855B-CE25E963310A}" dt="2023-04-12T11:55:57.803" v="3786" actId="20577"/>
-          <ac:spMkLst>
-            <pc:docMk/>
-            <pc:sldMk cId="161939914" sldId="278"/>
-            <ac:spMk id="16" creationId="{55636A7F-5BB6-BCDE-788B-0B57D5C493E0}"/>
-          </ac:spMkLst>
-        </pc:spChg>
-        <pc:spChg chg="add mod">
-          <ac:chgData name="Tiago Fonseca" userId="0bf00240-3020-4d01-a24b-06825a2f49d7" providerId="ADAL" clId="{76692306-DFA8-4EB1-855B-CE25E963310A}" dt="2023-04-12T11:50:14.043" v="3674"/>
-          <ac:spMkLst>
-            <pc:docMk/>
-            <pc:sldMk cId="161939914" sldId="278"/>
-            <ac:spMk id="17" creationId="{7FE6D273-1AA5-27FB-A178-EBDA6D82937E}"/>
-          </ac:spMkLst>
-        </pc:spChg>
-        <pc:spChg chg="add mod">
-          <ac:chgData name="Tiago Fonseca" userId="0bf00240-3020-4d01-a24b-06825a2f49d7" providerId="ADAL" clId="{76692306-DFA8-4EB1-855B-CE25E963310A}" dt="2023-04-12T11:56:43.224" v="3804" actId="20577"/>
-          <ac:spMkLst>
-            <pc:docMk/>
-            <pc:sldMk cId="161939914" sldId="278"/>
-            <ac:spMk id="18" creationId="{4DC04336-F4DD-24EF-10DB-31EFE23A002D}"/>
-          </ac:spMkLst>
-        </pc:spChg>
-        <pc:spChg chg="add mod">
-          <ac:chgData name="Tiago Fonseca" userId="0bf00240-3020-4d01-a24b-06825a2f49d7" providerId="ADAL" clId="{76692306-DFA8-4EB1-855B-CE25E963310A}" dt="2023-04-12T11:50:14.043" v="3674"/>
-          <ac:spMkLst>
-            <pc:docMk/>
-            <pc:sldMk cId="161939914" sldId="278"/>
-            <ac:spMk id="19" creationId="{F11F09F9-514C-F78A-9EAF-7A8D9526EFA4}"/>
-          </ac:spMkLst>
-        </pc:spChg>
-        <pc:spChg chg="add mod">
-          <ac:chgData name="Tiago Fonseca" userId="0bf00240-3020-4d01-a24b-06825a2f49d7" providerId="ADAL" clId="{76692306-DFA8-4EB1-855B-CE25E963310A}" dt="2023-04-12T11:51:01.297" v="3721"/>
-          <ac:spMkLst>
-            <pc:docMk/>
-            <pc:sldMk cId="161939914" sldId="278"/>
-            <ac:spMk id="20" creationId="{3AF3475E-35F2-B8F0-5AF1-97D81832BAAF}"/>
-          </ac:spMkLst>
-        </pc:spChg>
-        <pc:spChg chg="add mod">
-          <ac:chgData name="Tiago Fonseca" userId="0bf00240-3020-4d01-a24b-06825a2f49d7" providerId="ADAL" clId="{76692306-DFA8-4EB1-855B-CE25E963310A}" dt="2023-04-12T11:50:14.043" v="3674"/>
-          <ac:spMkLst>
-            <pc:docMk/>
-            <pc:sldMk cId="161939914" sldId="278"/>
-            <ac:spMk id="21" creationId="{2AA129E7-29F0-0EBC-A0D9-9B187A25618C}"/>
-          </ac:spMkLst>
-        </pc:spChg>
-        <pc:spChg chg="add mod">
-          <ac:chgData name="Tiago Fonseca" userId="0bf00240-3020-4d01-a24b-06825a2f49d7" providerId="ADAL" clId="{76692306-DFA8-4EB1-855B-CE25E963310A}" dt="2023-04-12T11:53:51.784" v="3747" actId="20577"/>
-          <ac:spMkLst>
-            <pc:docMk/>
-            <pc:sldMk cId="161939914" sldId="278"/>
-            <ac:spMk id="22" creationId="{02DED6E8-DCAB-A8EA-6E63-9E8200EAD292}"/>
-          </ac:spMkLst>
-        </pc:spChg>
-        <pc:spChg chg="add del">
-          <ac:chgData name="Tiago Fonseca" userId="0bf00240-3020-4d01-a24b-06825a2f49d7" providerId="ADAL" clId="{76692306-DFA8-4EB1-855B-CE25E963310A}" dt="2023-04-12T11:50:58.327" v="3720" actId="22"/>
-          <ac:spMkLst>
-            <pc:docMk/>
-            <pc:sldMk cId="161939914" sldId="278"/>
-            <ac:spMk id="24" creationId="{12E19AD0-0767-1A2E-4C4F-B45C94542B87}"/>
-          </ac:spMkLst>
-        </pc:spChg>
-        <pc:spChg chg="add mod">
-          <ac:chgData name="Tiago Fonseca" userId="0bf00240-3020-4d01-a24b-06825a2f49d7" providerId="ADAL" clId="{76692306-DFA8-4EB1-855B-CE25E963310A}" dt="2023-04-12T11:57:22.928" v="3805" actId="1076"/>
-          <ac:spMkLst>
-            <pc:docMk/>
-            <pc:sldMk cId="161939914" sldId="278"/>
-            <ac:spMk id="25" creationId="{1856EEED-6E7B-2275-368A-0AEC8FEF1D60}"/>
-          </ac:spMkLst>
-        </pc:spChg>
-        <pc:spChg chg="add mod">
-          <ac:chgData name="Tiago Fonseca" userId="0bf00240-3020-4d01-a24b-06825a2f49d7" providerId="ADAL" clId="{76692306-DFA8-4EB1-855B-CE25E963310A}" dt="2023-04-12T11:57:22.928" v="3805" actId="1076"/>
-          <ac:spMkLst>
-            <pc:docMk/>
-            <pc:sldMk cId="161939914" sldId="278"/>
-            <ac:spMk id="26" creationId="{C8DAACAB-519A-4567-A479-8972FE217083}"/>
-          </ac:spMkLst>
-        </pc:spChg>
-        <pc:spChg chg="add mod">
-          <ac:chgData name="Tiago Fonseca" userId="0bf00240-3020-4d01-a24b-06825a2f49d7" providerId="ADAL" clId="{76692306-DFA8-4EB1-855B-CE25E963310A}" dt="2023-04-12T11:57:22.928" v="3805" actId="1076"/>
-          <ac:spMkLst>
-            <pc:docMk/>
-            <pc:sldMk cId="161939914" sldId="278"/>
-            <ac:spMk id="27" creationId="{55BBC641-2F8E-6AC9-214D-B3666E0AB105}"/>
-          </ac:spMkLst>
-        </pc:spChg>
-        <pc:grpChg chg="add mod">
-          <ac:chgData name="Tiago Fonseca" userId="0bf00240-3020-4d01-a24b-06825a2f49d7" providerId="ADAL" clId="{76692306-DFA8-4EB1-855B-CE25E963310A}" dt="2023-04-12T11:57:22.928" v="3805" actId="1076"/>
-          <ac:grpSpMkLst>
-            <pc:docMk/>
-            <pc:sldMk cId="161939914" sldId="278"/>
-            <ac:grpSpMk id="8" creationId="{D103C0C7-88A6-DAA6-9E00-AEAA838178DF}"/>
-          </ac:grpSpMkLst>
-        </pc:grpChg>
-        <pc:grpChg chg="add mod">
-          <ac:chgData name="Tiago Fonseca" userId="0bf00240-3020-4d01-a24b-06825a2f49d7" providerId="ADAL" clId="{76692306-DFA8-4EB1-855B-CE25E963310A}" dt="2023-04-12T11:57:22.928" v="3805" actId="1076"/>
-          <ac:grpSpMkLst>
-            <pc:docMk/>
-            <pc:sldMk cId="161939914" sldId="278"/>
-            <ac:grpSpMk id="10" creationId="{7C0D1C03-E6C7-8A96-EF04-0207A6DCC379}"/>
-          </ac:grpSpMkLst>
-        </pc:grpChg>
-        <pc:grpChg chg="add mod">
-          <ac:chgData name="Tiago Fonseca" userId="0bf00240-3020-4d01-a24b-06825a2f49d7" providerId="ADAL" clId="{76692306-DFA8-4EB1-855B-CE25E963310A}" dt="2023-04-12T11:57:22.928" v="3805" actId="1076"/>
-          <ac:grpSpMkLst>
-            <pc:docMk/>
-            <pc:sldMk cId="161939914" sldId="278"/>
-            <ac:grpSpMk id="12" creationId="{9922C3A4-1571-F61F-D687-4CB5B0E06392}"/>
-          </ac:grpSpMkLst>
-        </pc:grpChg>
-        <pc:grpChg chg="add mod">
-          <ac:chgData name="Tiago Fonseca" userId="0bf00240-3020-4d01-a24b-06825a2f49d7" providerId="ADAL" clId="{76692306-DFA8-4EB1-855B-CE25E963310A}" dt="2023-04-12T11:57:22.928" v="3805" actId="1076"/>
-          <ac:grpSpMkLst>
-            <pc:docMk/>
-            <pc:sldMk cId="161939914" sldId="278"/>
-            <ac:grpSpMk id="14" creationId="{35EF173A-A155-7E28-9CA6-0EA171F89FF7}"/>
-          </ac:grpSpMkLst>
-        </pc:grpChg>
-      </pc:sldChg>
-      <pc:sldChg chg="delSp modSp add mod ord">
-        <pc:chgData name="Tiago Fonseca" userId="0bf00240-3020-4d01-a24b-06825a2f49d7" providerId="ADAL" clId="{76692306-DFA8-4EB1-855B-CE25E963310A}" dt="2023-04-12T12:04:05.420" v="4173" actId="20577"/>
-        <pc:sldMkLst>
-          <pc:docMk/>
-          <pc:sldMk cId="996926825" sldId="279"/>
-        </pc:sldMkLst>
-        <pc:spChg chg="mod">
-          <ac:chgData name="Tiago Fonseca" userId="0bf00240-3020-4d01-a24b-06825a2f49d7" providerId="ADAL" clId="{76692306-DFA8-4EB1-855B-CE25E963310A}" dt="2023-04-12T12:04:05.420" v="4173" actId="20577"/>
-          <ac:spMkLst>
-            <pc:docMk/>
-            <pc:sldMk cId="996926825" sldId="279"/>
-            <ac:spMk id="2" creationId="{E734342C-2173-4B23-9C3C-2950C6A3983D}"/>
-          </ac:spMkLst>
-        </pc:spChg>
-        <pc:spChg chg="del mod">
-          <ac:chgData name="Tiago Fonseca" userId="0bf00240-3020-4d01-a24b-06825a2f49d7" providerId="ADAL" clId="{76692306-DFA8-4EB1-855B-CE25E963310A}" dt="2023-04-12T12:03:53.177" v="4141" actId="478"/>
-          <ac:spMkLst>
-            <pc:docMk/>
-            <pc:sldMk cId="996926825" sldId="279"/>
-            <ac:spMk id="3" creationId="{6A75989C-CEF6-4790-9F3D-DDEC3CEECEF5}"/>
-          </ac:spMkLst>
-        </pc:spChg>
-        <pc:spChg chg="del">
-          <ac:chgData name="Tiago Fonseca" userId="0bf00240-3020-4d01-a24b-06825a2f49d7" providerId="ADAL" clId="{76692306-DFA8-4EB1-855B-CE25E963310A}" dt="2023-04-12T12:03:56.285" v="4142" actId="478"/>
-          <ac:spMkLst>
-            <pc:docMk/>
-            <pc:sldMk cId="996926825" sldId="279"/>
-            <ac:spMk id="4" creationId="{F71B7273-E2EE-1174-E617-78EF32D51BA2}"/>
-          </ac:spMkLst>
-        </pc:spChg>
-      </pc:sldChg>
-      <pc:sldChg chg="modSp add mod ord">
-        <pc:chgData name="Tiago Fonseca" userId="0bf00240-3020-4d01-a24b-06825a2f49d7" providerId="ADAL" clId="{76692306-DFA8-4EB1-855B-CE25E963310A}" dt="2023-04-12T12:04:32.374" v="4248" actId="20577"/>
-        <pc:sldMkLst>
-          <pc:docMk/>
-          <pc:sldMk cId="825530817" sldId="280"/>
-        </pc:sldMkLst>
-        <pc:spChg chg="mod">
-          <ac:chgData name="Tiago Fonseca" userId="0bf00240-3020-4d01-a24b-06825a2f49d7" providerId="ADAL" clId="{76692306-DFA8-4EB1-855B-CE25E963310A}" dt="2023-04-12T12:04:32.374" v="4248" actId="20577"/>
-          <ac:spMkLst>
-            <pc:docMk/>
-            <pc:sldMk cId="825530817" sldId="280"/>
-            <ac:spMk id="2" creationId="{E734342C-2173-4B23-9C3C-2950C6A3983D}"/>
-          </ac:spMkLst>
-        </pc:spChg>
-      </pc:sldChg>
-      <pc:sldChg chg="modSp add mod ord">
-        <pc:chgData name="Tiago Fonseca" userId="0bf00240-3020-4d01-a24b-06825a2f49d7" providerId="ADAL" clId="{76692306-DFA8-4EB1-855B-CE25E963310A}" dt="2023-04-12T12:04:52.549" v="4278" actId="20577"/>
-        <pc:sldMkLst>
-          <pc:docMk/>
-          <pc:sldMk cId="1850968765" sldId="281"/>
-        </pc:sldMkLst>
-        <pc:spChg chg="mod">
-          <ac:chgData name="Tiago Fonseca" userId="0bf00240-3020-4d01-a24b-06825a2f49d7" providerId="ADAL" clId="{76692306-DFA8-4EB1-855B-CE25E963310A}" dt="2023-04-12T12:04:52.549" v="4278" actId="20577"/>
-          <ac:spMkLst>
-            <pc:docMk/>
-            <pc:sldMk cId="1850968765" sldId="281"/>
-            <ac:spMk id="2" creationId="{E734342C-2173-4B23-9C3C-2950C6A3983D}"/>
-          </ac:spMkLst>
-        </pc:spChg>
-      </pc:sldChg>
-    </pc:docChg>
-  </pc:docChgLst>
-  <pc:docChgLst>
-    <pc:chgData name="Tiago Fonseca" userId="0bf00240-3020-4d01-a24b-06825a2f49d7" providerId="ADAL" clId="{3560B347-D4E4-4F91-A83E-BCFB5DC5A660}"/>
-    <pc:docChg chg="modSld">
-      <pc:chgData name="Tiago Fonseca" userId="0bf00240-3020-4d01-a24b-06825a2f49d7" providerId="ADAL" clId="{3560B347-D4E4-4F91-A83E-BCFB5DC5A660}" dt="2023-04-13T10:21:52.360" v="43" actId="20577"/>
-      <pc:docMkLst>
-        <pc:docMk/>
-      </pc:docMkLst>
-      <pc:sldChg chg="modSp mod">
-        <pc:chgData name="Tiago Fonseca" userId="0bf00240-3020-4d01-a24b-06825a2f49d7" providerId="ADAL" clId="{3560B347-D4E4-4F91-A83E-BCFB5DC5A660}" dt="2023-04-13T10:21:52.360" v="43" actId="20577"/>
-        <pc:sldMkLst>
-          <pc:docMk/>
-          <pc:sldMk cId="2113348865" sldId="271"/>
-        </pc:sldMkLst>
-        <pc:spChg chg="mod">
-          <ac:chgData name="Tiago Fonseca" userId="0bf00240-3020-4d01-a24b-06825a2f49d7" providerId="ADAL" clId="{3560B347-D4E4-4F91-A83E-BCFB5DC5A660}" dt="2023-04-13T10:21:52.360" v="43" actId="20577"/>
-          <ac:spMkLst>
-            <pc:docMk/>
-            <pc:sldMk cId="2113348865" sldId="271"/>
-            <ac:spMk id="3" creationId="{E82AFDAC-88B1-3AB9-A268-4DF9CBD41DFE}"/>
-          </ac:spMkLst>
-        </pc:spChg>
-      </pc:sldChg>
-      <pc:sldChg chg="modSp mod">
-        <pc:chgData name="Tiago Fonseca" userId="0bf00240-3020-4d01-a24b-06825a2f49d7" providerId="ADAL" clId="{3560B347-D4E4-4F91-A83E-BCFB5DC5A660}" dt="2023-04-13T08:03:28.687" v="37" actId="20577"/>
-        <pc:sldMkLst>
-          <pc:docMk/>
-          <pc:sldMk cId="1489756019" sldId="277"/>
-        </pc:sldMkLst>
-        <pc:spChg chg="mod">
-          <ac:chgData name="Tiago Fonseca" userId="0bf00240-3020-4d01-a24b-06825a2f49d7" providerId="ADAL" clId="{3560B347-D4E4-4F91-A83E-BCFB5DC5A660}" dt="2023-04-13T08:03:15.575" v="8" actId="20577"/>
-          <ac:spMkLst>
-            <pc:docMk/>
-            <pc:sldMk cId="1489756019" sldId="277"/>
-            <ac:spMk id="4" creationId="{2721AF49-4A4E-A592-68FA-93F3A1029D40}"/>
-          </ac:spMkLst>
-        </pc:spChg>
-        <pc:spChg chg="mod">
-          <ac:chgData name="Tiago Fonseca" userId="0bf00240-3020-4d01-a24b-06825a2f49d7" providerId="ADAL" clId="{3560B347-D4E4-4F91-A83E-BCFB5DC5A660}" dt="2023-04-13T08:03:28.687" v="37" actId="20577"/>
-          <ac:spMkLst>
-            <pc:docMk/>
-            <pc:sldMk cId="1489756019" sldId="277"/>
-            <ac:spMk id="6" creationId="{E35D8F96-B8AD-CDB0-20C5-3C57BE40BF8F}"/>
-          </ac:spMkLst>
-        </pc:spChg>
-      </pc:sldChg>
-    </pc:docChg>
-  </pc:docChgLst>
-  <pc:docChgLst>
-    <pc:chgData name="Tiago Fonseca" userId="0bf00240-3020-4d01-a24b-06825a2f49d7" providerId="ADAL" clId="{7F501EE3-BA3E-4F2E-8F95-0FA7922C07FC}"/>
-    <pc:docChg chg="undo custSel addSld delSld modSld sldOrd">
-      <pc:chgData name="Tiago Fonseca" userId="0bf00240-3020-4d01-a24b-06825a2f49d7" providerId="ADAL" clId="{7F501EE3-BA3E-4F2E-8F95-0FA7922C07FC}" dt="2023-05-31T12:12:02.691" v="388"/>
-      <pc:docMkLst>
-        <pc:docMk/>
-      </pc:docMkLst>
-      <pc:sldChg chg="modSp mod">
-        <pc:chgData name="Tiago Fonseca" userId="0bf00240-3020-4d01-a24b-06825a2f49d7" providerId="ADAL" clId="{7F501EE3-BA3E-4F2E-8F95-0FA7922C07FC}" dt="2023-05-31T12:03:16.827" v="24" actId="20577"/>
-        <pc:sldMkLst>
-          <pc:docMk/>
-          <pc:sldMk cId="300101176" sldId="256"/>
-        </pc:sldMkLst>
-        <pc:spChg chg="mod">
-          <ac:chgData name="Tiago Fonseca" userId="0bf00240-3020-4d01-a24b-06825a2f49d7" providerId="ADAL" clId="{7F501EE3-BA3E-4F2E-8F95-0FA7922C07FC}" dt="2023-05-31T12:03:16.827" v="24" actId="20577"/>
-          <ac:spMkLst>
-            <pc:docMk/>
-            <pc:sldMk cId="300101176" sldId="256"/>
-            <ac:spMk id="3" creationId="{1D090625-51CE-4ECB-81A4-C4905F3FBFE9}"/>
-          </ac:spMkLst>
-        </pc:spChg>
-      </pc:sldChg>
-      <pc:sldChg chg="modSp mod">
-        <pc:chgData name="Tiago Fonseca" userId="0bf00240-3020-4d01-a24b-06825a2f49d7" providerId="ADAL" clId="{7F501EE3-BA3E-4F2E-8F95-0FA7922C07FC}" dt="2023-05-31T12:04:17.140" v="101" actId="20577"/>
-        <pc:sldMkLst>
-          <pc:docMk/>
-          <pc:sldMk cId="3065993080" sldId="272"/>
-        </pc:sldMkLst>
-        <pc:spChg chg="mod">
-          <ac:chgData name="Tiago Fonseca" userId="0bf00240-3020-4d01-a24b-06825a2f49d7" providerId="ADAL" clId="{7F501EE3-BA3E-4F2E-8F95-0FA7922C07FC}" dt="2023-05-31T12:03:39.018" v="84" actId="20577"/>
-          <ac:spMkLst>
-            <pc:docMk/>
-            <pc:sldMk cId="3065993080" sldId="272"/>
-            <ac:spMk id="2" creationId="{98A32DE6-6B29-7489-635B-950DAAB3B577}"/>
-          </ac:spMkLst>
-        </pc:spChg>
-        <pc:spChg chg="mod">
-          <ac:chgData name="Tiago Fonseca" userId="0bf00240-3020-4d01-a24b-06825a2f49d7" providerId="ADAL" clId="{7F501EE3-BA3E-4F2E-8F95-0FA7922C07FC}" dt="2023-05-31T12:04:17.140" v="101" actId="20577"/>
-          <ac:spMkLst>
-            <pc:docMk/>
-            <pc:sldMk cId="3065993080" sldId="272"/>
-            <ac:spMk id="7" creationId="{4CDF2A1F-BDE4-7ECC-7CEB-42822AAE7A2D}"/>
-          </ac:spMkLst>
-        </pc:spChg>
-      </pc:sldChg>
-      <pc:sldChg chg="del">
-        <pc:chgData name="Tiago Fonseca" userId="0bf00240-3020-4d01-a24b-06825a2f49d7" providerId="ADAL" clId="{7F501EE3-BA3E-4F2E-8F95-0FA7922C07FC}" dt="2023-05-31T12:10:19.904" v="320" actId="47"/>
-        <pc:sldMkLst>
-          <pc:docMk/>
-          <pc:sldMk cId="1489756019" sldId="277"/>
-        </pc:sldMkLst>
-      </pc:sldChg>
-      <pc:sldChg chg="modSp mod">
-        <pc:chgData name="Tiago Fonseca" userId="0bf00240-3020-4d01-a24b-06825a2f49d7" providerId="ADAL" clId="{7F501EE3-BA3E-4F2E-8F95-0FA7922C07FC}" dt="2023-05-31T12:03:29.301" v="53" actId="20577"/>
-        <pc:sldMkLst>
-          <pc:docMk/>
-          <pc:sldMk cId="996926825" sldId="279"/>
-        </pc:sldMkLst>
-        <pc:spChg chg="mod">
-          <ac:chgData name="Tiago Fonseca" userId="0bf00240-3020-4d01-a24b-06825a2f49d7" providerId="ADAL" clId="{7F501EE3-BA3E-4F2E-8F95-0FA7922C07FC}" dt="2023-05-31T12:03:29.301" v="53" actId="20577"/>
-          <ac:spMkLst>
-            <pc:docMk/>
-            <pc:sldMk cId="996926825" sldId="279"/>
-            <ac:spMk id="2" creationId="{E734342C-2173-4B23-9C3C-2950C6A3983D}"/>
-          </ac:spMkLst>
-        </pc:spChg>
-      </pc:sldChg>
-      <pc:sldChg chg="modSp mod">
-        <pc:chgData name="Tiago Fonseca" userId="0bf00240-3020-4d01-a24b-06825a2f49d7" providerId="ADAL" clId="{7F501EE3-BA3E-4F2E-8F95-0FA7922C07FC}" dt="2023-05-31T12:04:44.606" v="117" actId="20577"/>
-        <pc:sldMkLst>
-          <pc:docMk/>
-          <pc:sldMk cId="825530817" sldId="280"/>
-        </pc:sldMkLst>
-        <pc:spChg chg="mod">
-          <ac:chgData name="Tiago Fonseca" userId="0bf00240-3020-4d01-a24b-06825a2f49d7" providerId="ADAL" clId="{7F501EE3-BA3E-4F2E-8F95-0FA7922C07FC}" dt="2023-05-31T12:04:44.606" v="117" actId="20577"/>
-          <ac:spMkLst>
-            <pc:docMk/>
-            <pc:sldMk cId="825530817" sldId="280"/>
-            <ac:spMk id="2" creationId="{E734342C-2173-4B23-9C3C-2950C6A3983D}"/>
-          </ac:spMkLst>
-        </pc:spChg>
-      </pc:sldChg>
-      <pc:sldChg chg="modSp mod">
-        <pc:chgData name="Tiago Fonseca" userId="0bf00240-3020-4d01-a24b-06825a2f49d7" providerId="ADAL" clId="{7F501EE3-BA3E-4F2E-8F95-0FA7922C07FC}" dt="2023-05-31T12:10:16.280" v="319" actId="20577"/>
-        <pc:sldMkLst>
-          <pc:docMk/>
-          <pc:sldMk cId="1850968765" sldId="281"/>
-        </pc:sldMkLst>
-        <pc:spChg chg="mod">
-          <ac:chgData name="Tiago Fonseca" userId="0bf00240-3020-4d01-a24b-06825a2f49d7" providerId="ADAL" clId="{7F501EE3-BA3E-4F2E-8F95-0FA7922C07FC}" dt="2023-05-31T12:10:16.280" v="319" actId="20577"/>
-          <ac:spMkLst>
-            <pc:docMk/>
-            <pc:sldMk cId="1850968765" sldId="281"/>
-            <ac:spMk id="2" creationId="{E734342C-2173-4B23-9C3C-2950C6A3983D}"/>
-          </ac:spMkLst>
-        </pc:spChg>
-      </pc:sldChg>
-      <pc:sldChg chg="del">
-        <pc:chgData name="Tiago Fonseca" userId="0bf00240-3020-4d01-a24b-06825a2f49d7" providerId="ADAL" clId="{7F501EE3-BA3E-4F2E-8F95-0FA7922C07FC}" dt="2023-05-31T12:09:49.820" v="271" actId="47"/>
-        <pc:sldMkLst>
-          <pc:docMk/>
-          <pc:sldMk cId="2855269777" sldId="282"/>
-        </pc:sldMkLst>
-      </pc:sldChg>
-      <pc:sldChg chg="del">
-        <pc:chgData name="Tiago Fonseca" userId="0bf00240-3020-4d01-a24b-06825a2f49d7" providerId="ADAL" clId="{7F501EE3-BA3E-4F2E-8F95-0FA7922C07FC}" dt="2023-05-31T12:10:20.591" v="321" actId="47"/>
-        <pc:sldMkLst>
-          <pc:docMk/>
-          <pc:sldMk cId="1498194460" sldId="284"/>
-        </pc:sldMkLst>
-      </pc:sldChg>
-      <pc:sldChg chg="modSp mod">
-        <pc:chgData name="Tiago Fonseca" userId="0bf00240-3020-4d01-a24b-06825a2f49d7" providerId="ADAL" clId="{7F501EE3-BA3E-4F2E-8F95-0FA7922C07FC}" dt="2023-05-31T12:10:56.538" v="350"/>
-        <pc:sldMkLst>
-          <pc:docMk/>
-          <pc:sldMk cId="4239780882" sldId="286"/>
-        </pc:sldMkLst>
-        <pc:spChg chg="mod">
-          <ac:chgData name="Tiago Fonseca" userId="0bf00240-3020-4d01-a24b-06825a2f49d7" providerId="ADAL" clId="{7F501EE3-BA3E-4F2E-8F95-0FA7922C07FC}" dt="2023-05-31T12:10:30.839" v="344" actId="20577"/>
-          <ac:spMkLst>
-            <pc:docMk/>
-            <pc:sldMk cId="4239780882" sldId="286"/>
-            <ac:spMk id="2" creationId="{931451AD-4895-B705-D9DD-AE4EECD87102}"/>
-          </ac:spMkLst>
-        </pc:spChg>
-        <pc:spChg chg="mod">
-          <ac:chgData name="Tiago Fonseca" userId="0bf00240-3020-4d01-a24b-06825a2f49d7" providerId="ADAL" clId="{7F501EE3-BA3E-4F2E-8F95-0FA7922C07FC}" dt="2023-05-31T12:10:56.538" v="350"/>
-          <ac:spMkLst>
-            <pc:docMk/>
-            <pc:sldMk cId="4239780882" sldId="286"/>
-            <ac:spMk id="7" creationId="{3781BB72-06CF-6EC3-7E08-64DE68C0CE29}"/>
-          </ac:spMkLst>
-        </pc:spChg>
-      </pc:sldChg>
-      <pc:sldChg chg="modSp mod ord">
-        <pc:chgData name="Tiago Fonseca" userId="0bf00240-3020-4d01-a24b-06825a2f49d7" providerId="ADAL" clId="{7F501EE3-BA3E-4F2E-8F95-0FA7922C07FC}" dt="2023-05-31T12:05:45.622" v="165" actId="20577"/>
-        <pc:sldMkLst>
-          <pc:docMk/>
-          <pc:sldMk cId="831434331" sldId="287"/>
-        </pc:sldMkLst>
-        <pc:spChg chg="mod">
-          <ac:chgData name="Tiago Fonseca" userId="0bf00240-3020-4d01-a24b-06825a2f49d7" providerId="ADAL" clId="{7F501EE3-BA3E-4F2E-8F95-0FA7922C07FC}" dt="2023-05-31T12:04:58.901" v="154" actId="20577"/>
-          <ac:spMkLst>
-            <pc:docMk/>
-            <pc:sldMk cId="831434331" sldId="287"/>
-            <ac:spMk id="2" creationId="{98A32DE6-6B29-7489-635B-950DAAB3B577}"/>
-          </ac:spMkLst>
-        </pc:spChg>
-        <pc:spChg chg="mod">
-          <ac:chgData name="Tiago Fonseca" userId="0bf00240-3020-4d01-a24b-06825a2f49d7" providerId="ADAL" clId="{7F501EE3-BA3E-4F2E-8F95-0FA7922C07FC}" dt="2023-05-31T12:05:45.622" v="165" actId="20577"/>
-          <ac:spMkLst>
-            <pc:docMk/>
-            <pc:sldMk cId="831434331" sldId="287"/>
-            <ac:spMk id="7" creationId="{4CDF2A1F-BDE4-7ECC-7CEB-42822AAE7A2D}"/>
-          </ac:spMkLst>
-        </pc:spChg>
-      </pc:sldChg>
-      <pc:sldChg chg="modSp mod">
-        <pc:chgData name="Tiago Fonseca" userId="0bf00240-3020-4d01-a24b-06825a2f49d7" providerId="ADAL" clId="{7F501EE3-BA3E-4F2E-8F95-0FA7922C07FC}" dt="2023-05-31T12:12:02.691" v="388"/>
-        <pc:sldMkLst>
-          <pc:docMk/>
-          <pc:sldMk cId="2100602676" sldId="288"/>
-        </pc:sldMkLst>
-        <pc:spChg chg="mod">
-          <ac:chgData name="Tiago Fonseca" userId="0bf00240-3020-4d01-a24b-06825a2f49d7" providerId="ADAL" clId="{7F501EE3-BA3E-4F2E-8F95-0FA7922C07FC}" dt="2023-05-31T12:11:39.574" v="377" actId="20577"/>
-          <ac:spMkLst>
-            <pc:docMk/>
-            <pc:sldMk cId="2100602676" sldId="288"/>
-            <ac:spMk id="2" creationId="{931451AD-4895-B705-D9DD-AE4EECD87102}"/>
-          </ac:spMkLst>
-        </pc:spChg>
-        <pc:spChg chg="mod">
-          <ac:chgData name="Tiago Fonseca" userId="0bf00240-3020-4d01-a24b-06825a2f49d7" providerId="ADAL" clId="{7F501EE3-BA3E-4F2E-8F95-0FA7922C07FC}" dt="2023-05-31T12:12:02.691" v="388"/>
-          <ac:spMkLst>
-            <pc:docMk/>
-            <pc:sldMk cId="2100602676" sldId="288"/>
-            <ac:spMk id="7" creationId="{3781BB72-06CF-6EC3-7E08-64DE68C0CE29}"/>
-          </ac:spMkLst>
-        </pc:spChg>
-      </pc:sldChg>
-      <pc:sldChg chg="modSp add mod">
-        <pc:chgData name="Tiago Fonseca" userId="0bf00240-3020-4d01-a24b-06825a2f49d7" providerId="ADAL" clId="{7F501EE3-BA3E-4F2E-8F95-0FA7922C07FC}" dt="2023-05-31T12:06:29.333" v="198"/>
-        <pc:sldMkLst>
-          <pc:docMk/>
-          <pc:sldMk cId="1519722166" sldId="289"/>
-        </pc:sldMkLst>
-        <pc:spChg chg="mod">
-          <ac:chgData name="Tiago Fonseca" userId="0bf00240-3020-4d01-a24b-06825a2f49d7" providerId="ADAL" clId="{7F501EE3-BA3E-4F2E-8F95-0FA7922C07FC}" dt="2023-05-31T12:06:02.281" v="183" actId="20577"/>
-          <ac:spMkLst>
-            <pc:docMk/>
-            <pc:sldMk cId="1519722166" sldId="289"/>
-            <ac:spMk id="2" creationId="{98A32DE6-6B29-7489-635B-950DAAB3B577}"/>
-          </ac:spMkLst>
-        </pc:spChg>
-        <pc:spChg chg="mod">
-          <ac:chgData name="Tiago Fonseca" userId="0bf00240-3020-4d01-a24b-06825a2f49d7" providerId="ADAL" clId="{7F501EE3-BA3E-4F2E-8F95-0FA7922C07FC}" dt="2023-05-31T12:06:29.333" v="198"/>
-          <ac:spMkLst>
-            <pc:docMk/>
-            <pc:sldMk cId="1519722166" sldId="289"/>
-            <ac:spMk id="7" creationId="{4CDF2A1F-BDE4-7ECC-7CEB-42822AAE7A2D}"/>
-          </ac:spMkLst>
-        </pc:spChg>
-      </pc:sldChg>
-      <pc:sldChg chg="modSp add mod">
-        <pc:chgData name="Tiago Fonseca" userId="0bf00240-3020-4d01-a24b-06825a2f49d7" providerId="ADAL" clId="{7F501EE3-BA3E-4F2E-8F95-0FA7922C07FC}" dt="2023-05-31T12:07:08.513" v="210" actId="20577"/>
-        <pc:sldMkLst>
-          <pc:docMk/>
-          <pc:sldMk cId="2509704459" sldId="290"/>
-        </pc:sldMkLst>
-        <pc:spChg chg="mod">
-          <ac:chgData name="Tiago Fonseca" userId="0bf00240-3020-4d01-a24b-06825a2f49d7" providerId="ADAL" clId="{7F501EE3-BA3E-4F2E-8F95-0FA7922C07FC}" dt="2023-05-31T12:06:46.744" v="201" actId="20577"/>
-          <ac:spMkLst>
-            <pc:docMk/>
-            <pc:sldMk cId="2509704459" sldId="290"/>
-            <ac:spMk id="2" creationId="{98A32DE6-6B29-7489-635B-950DAAB3B577}"/>
-          </ac:spMkLst>
-        </pc:spChg>
-        <pc:spChg chg="mod">
-          <ac:chgData name="Tiago Fonseca" userId="0bf00240-3020-4d01-a24b-06825a2f49d7" providerId="ADAL" clId="{7F501EE3-BA3E-4F2E-8F95-0FA7922C07FC}" dt="2023-05-31T12:07:08.513" v="210" actId="20577"/>
-          <ac:spMkLst>
-            <pc:docMk/>
-            <pc:sldMk cId="2509704459" sldId="290"/>
-            <ac:spMk id="7" creationId="{4CDF2A1F-BDE4-7ECC-7CEB-42822AAE7A2D}"/>
-          </ac:spMkLst>
-        </pc:spChg>
-      </pc:sldChg>
-      <pc:sldChg chg="addSp delSp modSp add mod">
-        <pc:chgData name="Tiago Fonseca" userId="0bf00240-3020-4d01-a24b-06825a2f49d7" providerId="ADAL" clId="{7F501EE3-BA3E-4F2E-8F95-0FA7922C07FC}" dt="2023-05-31T12:09:32.601" v="270" actId="1076"/>
-        <pc:sldMkLst>
-          <pc:docMk/>
-          <pc:sldMk cId="4192160152" sldId="291"/>
-        </pc:sldMkLst>
-        <pc:spChg chg="mod">
-          <ac:chgData name="Tiago Fonseca" userId="0bf00240-3020-4d01-a24b-06825a2f49d7" providerId="ADAL" clId="{7F501EE3-BA3E-4F2E-8F95-0FA7922C07FC}" dt="2023-05-31T12:07:22.599" v="212"/>
-          <ac:spMkLst>
-            <pc:docMk/>
-            <pc:sldMk cId="4192160152" sldId="291"/>
-            <ac:spMk id="2" creationId="{98A32DE6-6B29-7489-635B-950DAAB3B577}"/>
-          </ac:spMkLst>
-        </pc:spChg>
-        <pc:spChg chg="add mod">
-          <ac:chgData name="Tiago Fonseca" userId="0bf00240-3020-4d01-a24b-06825a2f49d7" providerId="ADAL" clId="{7F501EE3-BA3E-4F2E-8F95-0FA7922C07FC}" dt="2023-05-31T12:08:28.868" v="239" actId="14100"/>
-          <ac:spMkLst>
-            <pc:docMk/>
-            <pc:sldMk cId="4192160152" sldId="291"/>
-            <ac:spMk id="3" creationId="{BF09446D-C6D8-006A-8A01-D7A4D8A7B490}"/>
-          </ac:spMkLst>
-        </pc:spChg>
-        <pc:spChg chg="add del mod">
-          <ac:chgData name="Tiago Fonseca" userId="0bf00240-3020-4d01-a24b-06825a2f49d7" providerId="ADAL" clId="{7F501EE3-BA3E-4F2E-8F95-0FA7922C07FC}" dt="2023-05-31T12:08:36.293" v="242"/>
-          <ac:spMkLst>
-            <pc:docMk/>
-            <pc:sldMk cId="4192160152" sldId="291"/>
-            <ac:spMk id="4" creationId="{2E51F97A-CD76-D142-AB40-3019E23A934B}"/>
-          </ac:spMkLst>
-        </pc:spChg>
-        <pc:spChg chg="add mod">
-          <ac:chgData name="Tiago Fonseca" userId="0bf00240-3020-4d01-a24b-06825a2f49d7" providerId="ADAL" clId="{7F501EE3-BA3E-4F2E-8F95-0FA7922C07FC}" dt="2023-05-31T12:09:23.023" v="269" actId="20577"/>
-          <ac:spMkLst>
-            <pc:docMk/>
-            <pc:sldMk cId="4192160152" sldId="291"/>
-            <ac:spMk id="5" creationId="{2AF94BD6-0FDD-D65A-10FD-994322D200A9}"/>
-          </ac:spMkLst>
-        </pc:spChg>
-        <pc:spChg chg="add del mod">
-          <ac:chgData name="Tiago Fonseca" userId="0bf00240-3020-4d01-a24b-06825a2f49d7" providerId="ADAL" clId="{7F501EE3-BA3E-4F2E-8F95-0FA7922C07FC}" dt="2023-05-31T12:09:32.601" v="270" actId="1076"/>
-          <ac:spMkLst>
-            <pc:docMk/>
-            <pc:sldMk cId="4192160152" sldId="291"/>
-            <ac:spMk id="7" creationId="{4CDF2A1F-BDE4-7ECC-7CEB-42822AAE7A2D}"/>
-          </ac:spMkLst>
-        </pc:spChg>
-      </pc:sldChg>
-      <pc:sldChg chg="modSp add mod">
-        <pc:chgData name="Tiago Fonseca" userId="0bf00240-3020-4d01-a24b-06825a2f49d7" providerId="ADAL" clId="{7F501EE3-BA3E-4F2E-8F95-0FA7922C07FC}" dt="2023-05-31T12:11:20.163" v="357" actId="20577"/>
-        <pc:sldMkLst>
-          <pc:docMk/>
-          <pc:sldMk cId="2775588976" sldId="292"/>
-        </pc:sldMkLst>
-        <pc:spChg chg="mod">
-          <ac:chgData name="Tiago Fonseca" userId="0bf00240-3020-4d01-a24b-06825a2f49d7" providerId="ADAL" clId="{7F501EE3-BA3E-4F2E-8F95-0FA7922C07FC}" dt="2023-05-31T12:11:20.163" v="357" actId="20577"/>
-          <ac:spMkLst>
-            <pc:docMk/>
-            <pc:sldMk cId="2775588976" sldId="292"/>
             <ac:spMk id="7" creationId="{3781BB72-06CF-6EC3-7E08-64DE68C0CE29}"/>
           </ac:spMkLst>
         </pc:spChg>
@@ -2105,7 +2145,7 @@
           <a:p>
             <a:fld id="{D2D36A62-A875-4277-8A16-493F38412961}" type="datetime1">
               <a:rPr lang="pt-PT" smtClean="0"/>
-              <a:t>31/05/2023</a:t>
+              <a:t>01/06/2023</a:t>
             </a:fld>
             <a:endParaRPr lang="pt-PT" dirty="0"/>
           </a:p>
@@ -2283,7 +2323,7 @@
             <a:fld id="{972DF3F9-B67B-4F27-BE75-227E70802F2F}" type="datetime1">
               <a:rPr lang="pt-PT" smtClean="0"/>
               <a:pPr/>
-              <a:t>31/05/2023</a:t>
+              <a:t>01/06/2023</a:t>
             </a:fld>
             <a:endParaRPr lang="pt-PT" dirty="0"/>
           </a:p>
@@ -3110,7 +3150,7 @@
             <a:pPr rtl="0"/>
             <a:fld id="{C8F587F8-FA17-455A-8A00-703CCEE25921}" type="datetime1">
               <a:rPr lang="pt-PT" noProof="0" smtClean="0"/>
-              <a:t>31/05/2023</a:t>
+              <a:t>01/06/2023</a:t>
             </a:fld>
             <a:endParaRPr lang="pt-PT" noProof="0"/>
           </a:p>
@@ -3323,7 +3363,7 @@
             <a:pPr rtl="0"/>
             <a:fld id="{0DD3EE91-6B45-4017-AD42-B2329289C442}" type="datetime1">
               <a:rPr lang="pt-PT" noProof="0" smtClean="0"/>
-              <a:t>31/05/2023</a:t>
+              <a:t>01/06/2023</a:t>
             </a:fld>
             <a:endParaRPr lang="pt-PT" noProof="0"/>
           </a:p>
@@ -3540,7 +3580,7 @@
             <a:pPr rtl="0"/>
             <a:fld id="{86E0D85C-D33A-4C75-B1F4-90B4B43E0A2E}" type="datetime1">
               <a:rPr lang="pt-PT" noProof="0" smtClean="0"/>
-              <a:t>31/05/2023</a:t>
+              <a:t>01/06/2023</a:t>
             </a:fld>
             <a:endParaRPr lang="pt-PT" noProof="0"/>
           </a:p>
@@ -3743,7 +3783,7 @@
             <a:pPr rtl="0"/>
             <a:fld id="{69E31215-3AA2-4E07-BD89-8366B4EADC19}" type="datetime1">
               <a:rPr lang="pt-PT" noProof="0" smtClean="0"/>
-              <a:t>31/05/2023</a:t>
+              <a:t>01/06/2023</a:t>
             </a:fld>
             <a:endParaRPr lang="pt-PT" noProof="0"/>
           </a:p>
@@ -4025,7 +4065,7 @@
             <a:pPr rtl="0"/>
             <a:fld id="{ECA80334-0323-4E20-AD7A-8ACCF6B591D0}" type="datetime1">
               <a:rPr lang="pt-PT" noProof="0" smtClean="0"/>
-              <a:t>31/05/2023</a:t>
+              <a:t>01/06/2023</a:t>
             </a:fld>
             <a:endParaRPr lang="pt-PT" noProof="0"/>
           </a:p>
@@ -4294,7 +4334,7 @@
             <a:pPr rtl="0"/>
             <a:fld id="{80F38C40-5F7E-4311-AF5A-B29D2C969CD2}" type="datetime1">
               <a:rPr lang="pt-PT" noProof="0" smtClean="0"/>
-              <a:t>31/05/2023</a:t>
+              <a:t>01/06/2023</a:t>
             </a:fld>
             <a:endParaRPr lang="pt-PT" noProof="0"/>
           </a:p>
@@ -4711,7 +4751,7 @@
             <a:pPr rtl="0"/>
             <a:fld id="{C325681A-4BE1-41EB-B484-891CF1CBCA06}" type="datetime1">
               <a:rPr lang="pt-PT" noProof="0" smtClean="0"/>
-              <a:t>31/05/2023</a:t>
+              <a:t>01/06/2023</a:t>
             </a:fld>
             <a:endParaRPr lang="pt-PT" noProof="0"/>
           </a:p>
@@ -4863,7 +4903,7 @@
             <a:pPr rtl="0"/>
             <a:fld id="{3D25063B-819E-492C-A7C2-E1829FA159C4}" type="datetime1">
               <a:rPr lang="pt-PT" noProof="0" smtClean="0"/>
-              <a:t>31/05/2023</a:t>
+              <a:t>01/06/2023</a:t>
             </a:fld>
             <a:endParaRPr lang="pt-PT" noProof="0"/>
           </a:p>
@@ -4992,7 +5032,7 @@
             <a:pPr rtl="0"/>
             <a:fld id="{38C1FFB3-F6B6-4411-A5F4-B2FC50F77E82}" type="datetime1">
               <a:rPr lang="pt-PT" noProof="0" smtClean="0"/>
-              <a:t>31/05/2023</a:t>
+              <a:t>01/06/2023</a:t>
             </a:fld>
             <a:endParaRPr lang="pt-PT" noProof="0"/>
           </a:p>
@@ -5245,7 +5285,7 @@
             <a:pPr rtl="0"/>
             <a:fld id="{F2757A85-4FE8-47BC-A31A-F7326AAD7004}" type="datetime1">
               <a:rPr lang="pt-PT" noProof="0" smtClean="0"/>
-              <a:t>31/05/2023</a:t>
+              <a:t>01/06/2023</a:t>
             </a:fld>
             <a:endParaRPr lang="pt-PT" noProof="0"/>
           </a:p>
@@ -5693,7 +5733,7 @@
             <a:pPr rtl="0"/>
             <a:fld id="{F08BED7F-40FB-4334-A984-6AEE9A357FE3}" type="datetime1">
               <a:rPr lang="pt-PT" noProof="0" smtClean="0"/>
-              <a:t>31/05/2023</a:t>
+              <a:t>01/06/2023</a:t>
             </a:fld>
             <a:endParaRPr lang="pt-PT" noProof="0"/>
           </a:p>
@@ -6022,7 +6062,7 @@
             <a:pPr rtl="0"/>
             <a:fld id="{65E81E91-8178-42DA-ACD7-17B3FDA5134B}" type="datetime1">
               <a:rPr lang="pt-PT" noProof="0" smtClean="0"/>
-              <a:t>31/05/2023</a:t>
+              <a:t>01/06/2023</a:t>
             </a:fld>
             <a:endParaRPr lang="pt-PT" noProof="0"/>
           </a:p>
@@ -7696,6 +7736,36 @@
           </a:p>
         </p:txBody>
       </p:sp>
+      <p:pic>
+        <p:nvPicPr>
+          <p:cNvPr id="6" name="Imagem 5" descr="Uma imagem com padrão, quadrado, Gráficos, captura de ecrã&#10;&#10;Descrição gerada automaticamente">
+            <a:extLst>
+              <a:ext uri="{FF2B5EF4-FFF2-40B4-BE49-F238E27FC236}">
+                <a16:creationId xmlns:a16="http://schemas.microsoft.com/office/drawing/2014/main" id="{0F6404C2-456B-6034-F67E-0530E0A7B169}"/>
+              </a:ext>
+            </a:extLst>
+          </p:cNvPr>
+          <p:cNvPicPr>
+            <a:picLocks noChangeAspect="1"/>
+          </p:cNvPicPr>
+          <p:nvPr/>
+        </p:nvPicPr>
+        <p:blipFill>
+          <a:blip r:embed="rId5"/>
+          <a:stretch>
+            <a:fillRect/>
+          </a:stretch>
+        </p:blipFill>
+        <p:spPr>
+          <a:xfrm>
+            <a:off x="357057" y="729586"/>
+            <a:ext cx="2800226" cy="3224927"/>
+          </a:xfrm>
+          <a:prstGeom prst="rect">
+            <a:avLst/>
+          </a:prstGeom>
+        </p:spPr>
+      </p:pic>
     </p:spTree>
     <p:extLst>
       <p:ext uri="{BB962C8B-B14F-4D97-AF65-F5344CB8AC3E}">
@@ -11109,15 +11179,6 @@
 </file>
 
 <file path=customXml/item1.xml><?xml version="1.0" encoding="utf-8"?>
-<?mso-contentType ?>
-<FormTemplates xmlns="http://schemas.microsoft.com/sharepoint/v3/contenttype/forms">
-  <Display>DocumentLibraryForm</Display>
-  <Edit>DocumentLibraryForm</Edit>
-  <New>DocumentLibraryForm</New>
-</FormTemplates>
-</file>
-
-<file path=customXml/item2.xml><?xml version="1.0" encoding="utf-8"?>
 <ct:contentTypeSchema xmlns:ct="http://schemas.microsoft.com/office/2006/metadata/contentType" xmlns:ma="http://schemas.microsoft.com/office/2006/metadata/properties/metaAttributes" ct:_="" ma:_="" ma:contentTypeName="Document" ma:contentTypeID="0x01010079F111ED35F8CC479449609E8A0923A6" ma:contentTypeVersion="11" ma:contentTypeDescription="Create a new document." ma:contentTypeScope="" ma:versionID="1c2eb7a32e66fb6e4260f3771546a5e2">
   <xsd:schema xmlns:xsd="http://www.w3.org/2001/XMLSchema" xmlns:xs="http://www.w3.org/2001/XMLSchema" xmlns:p="http://schemas.microsoft.com/office/2006/metadata/properties" xmlns:ns2="71af3243-3dd4-4a8d-8c0d-dd76da1f02a5" xmlns:ns3="16c05727-aa75-4e4a-9b5f-8a80a1165891" targetNamespace="http://schemas.microsoft.com/office/2006/metadata/properties" ma:root="true" ma:fieldsID="04e1f6479c48b08974ba73b5ca973489" ns2:_="" ns3:_="">
     <xsd:import namespace="71af3243-3dd4-4a8d-8c0d-dd76da1f02a5"/>
@@ -11328,6 +11389,15 @@
 </ct:contentTypeSchema>
 </file>
 
+<file path=customXml/item2.xml><?xml version="1.0" encoding="utf-8"?>
+<?mso-contentType ?>
+<FormTemplates xmlns="http://schemas.microsoft.com/sharepoint/v3/contenttype/forms">
+  <Display>DocumentLibraryForm</Display>
+  <Edit>DocumentLibraryForm</Edit>
+  <New>DocumentLibraryForm</New>
+</FormTemplates>
+</file>
+
 <file path=customXml/item3.xml><?xml version="1.0" encoding="utf-8"?>
 <p:properties xmlns:p="http://schemas.microsoft.com/office/2006/metadata/properties" xmlns:xsi="http://www.w3.org/2001/XMLSchema-instance" xmlns:pc="http://schemas.microsoft.com/office/infopath/2007/PartnerControls">
   <documentManagement>
@@ -11337,14 +11407,6 @@
 </file>
 
 <file path=customXml/itemProps1.xml><?xml version="1.0" encoding="utf-8"?>
-<ds:datastoreItem xmlns:ds="http://schemas.openxmlformats.org/officeDocument/2006/customXml" ds:itemID="{BCF9EC99-89FF-486C-9E02-31E13FD72E16}">
-  <ds:schemaRefs>
-    <ds:schemaRef ds:uri="http://schemas.microsoft.com/sharepoint/v3/contenttype/forms"/>
-  </ds:schemaRefs>
-</ds:datastoreItem>
-</file>
-
-<file path=customXml/itemProps2.xml><?xml version="1.0" encoding="utf-8"?>
 <ds:datastoreItem xmlns:ds="http://schemas.openxmlformats.org/officeDocument/2006/customXml" ds:itemID="{596CF9D2-F3E0-450F-B184-8D2A0EB8B18B}">
   <ds:schemaRefs>
     <ds:schemaRef ds:uri="http://schemas.microsoft.com/office/2006/metadata/contentType"/>
@@ -11359,6 +11421,14 @@
     <ds:schemaRef ds:uri="http://purl.org/dc/elements/1.1/"/>
     <ds:schemaRef ds:uri="http://purl.org/dc/terms/"/>
     <ds:schemaRef ds:uri="http://schemas.microsoft.com/internal/obd"/>
+  </ds:schemaRefs>
+</ds:datastoreItem>
+</file>
+
+<file path=customXml/itemProps2.xml><?xml version="1.0" encoding="utf-8"?>
+<ds:datastoreItem xmlns:ds="http://schemas.openxmlformats.org/officeDocument/2006/customXml" ds:itemID="{BCF9EC99-89FF-486C-9E02-31E13FD72E16}">
+  <ds:schemaRefs>
+    <ds:schemaRef ds:uri="http://schemas.microsoft.com/sharepoint/v3/contenttype/forms"/>
   </ds:schemaRefs>
 </ds:datastoreItem>
 </file>

</xml_diff>